<commit_message>
Updated for Diego and Azure compat.
</commit_message>
<xml_diff>
--- a/presentations/Session_4_Services_Overview.pptx
+++ b/presentations/Session_4_Services_Overview.pptx
@@ -5,7 +5,7 @@
     <p:sldMasterId id="2147483679" r:id="rId1"/>
   </p:sldMasterIdLst>
   <p:notesMasterIdLst>
-    <p:notesMasterId r:id="rId23"/>
+    <p:notesMasterId r:id="rId24"/>
   </p:notesMasterIdLst>
   <p:sldIdLst>
     <p:sldId id="256" r:id="rId2"/>
@@ -29,6 +29,7 @@
     <p:sldId id="493" r:id="rId20"/>
     <p:sldId id="494" r:id="rId21"/>
     <p:sldId id="495" r:id="rId22"/>
+    <p:sldId id="497" r:id="rId23"/>
   </p:sldIdLst>
   <p:sldSz cx="9144000" cy="5143500" type="screen16x9"/>
   <p:notesSz cx="6858000" cy="9144000"/>
@@ -269,6 +270,7 @@
             <p14:sldId id="493"/>
             <p14:sldId id="494"/>
             <p14:sldId id="495"/>
+            <p14:sldId id="497"/>
           </p14:sldIdLst>
         </p14:section>
       </p14:sectionLst>
@@ -1140,6 +1142,117 @@
 </p:notes>
 </file>
 
+<file path=ppt/notesSlides/notesSlide17.xml><?xml version="1.0" encoding="utf-8"?>
+<p:notes xmlns:a="http://schemas.openxmlformats.org/drawingml/2006/main" xmlns:r="http://schemas.openxmlformats.org/officeDocument/2006/relationships" xmlns:p="http://schemas.openxmlformats.org/presentationml/2006/main" showMasterSp="0" showMasterPhAnim="0">
+  <p:cSld>
+    <p:spTree>
+      <p:nvGrpSpPr>
+        <p:cNvPr id="1" name="Shape 287"/>
+        <p:cNvGrpSpPr/>
+        <p:nvPr/>
+      </p:nvGrpSpPr>
+      <p:grpSpPr>
+        <a:xfrm>
+          <a:off x="0" y="0"/>
+          <a:ext cx="0" cy="0"/>
+          <a:chOff x="0" y="0"/>
+          <a:chExt cx="0" cy="0"/>
+        </a:xfrm>
+      </p:grpSpPr>
+      <p:sp>
+        <p:nvSpPr>
+          <p:cNvPr id="288" name="Shape 288"/>
+          <p:cNvSpPr>
+            <a:spLocks noGrp="1" noRot="1" noChangeAspect="1"/>
+          </p:cNvSpPr>
+          <p:nvPr>
+            <p:ph type="sldImg" idx="2"/>
+          </p:nvPr>
+        </p:nvSpPr>
+        <p:spPr>
+          <a:xfrm>
+            <a:off x="381187" y="685800"/>
+            <a:ext cx="6096299" cy="3429000"/>
+          </a:xfrm>
+          <a:custGeom>
+            <a:avLst/>
+            <a:gdLst/>
+            <a:ahLst/>
+            <a:cxnLst/>
+            <a:rect l="0" t="0" r="0" b="0"/>
+            <a:pathLst>
+              <a:path w="120000" h="120000" extrusionOk="0">
+                <a:moveTo>
+                  <a:pt x="0" y="0"/>
+                </a:moveTo>
+                <a:lnTo>
+                  <a:pt x="120000" y="0"/>
+                </a:lnTo>
+                <a:lnTo>
+                  <a:pt x="120000" y="120000"/>
+                </a:lnTo>
+                <a:lnTo>
+                  <a:pt x="0" y="120000"/>
+                </a:lnTo>
+                <a:close/>
+              </a:path>
+            </a:pathLst>
+          </a:custGeom>
+          <a:noFill/>
+          <a:ln w="9525" cap="flat">
+            <a:solidFill>
+              <a:srgbClr val="000000"/>
+            </a:solidFill>
+            <a:prstDash val="solid"/>
+            <a:round/>
+            <a:headEnd type="none" w="med" len="med"/>
+            <a:tailEnd type="none" w="med" len="med"/>
+          </a:ln>
+        </p:spPr>
+      </p:sp>
+      <p:sp>
+        <p:nvSpPr>
+          <p:cNvPr id="289" name="Shape 289"/>
+          <p:cNvSpPr txBox="1">
+            <a:spLocks noGrp="1"/>
+          </p:cNvSpPr>
+          <p:nvPr>
+            <p:ph type="body" idx="1"/>
+          </p:nvPr>
+        </p:nvSpPr>
+        <p:spPr>
+          <a:xfrm>
+            <a:off x="685800" y="4343400"/>
+            <a:ext cx="5486399" cy="4114800"/>
+          </a:xfrm>
+          <a:prstGeom prst="rect">
+            <a:avLst/>
+          </a:prstGeom>
+        </p:spPr>
+        <p:txBody>
+          <a:bodyPr lIns="91425" tIns="91425" rIns="91425" bIns="91425" anchor="t" anchorCtr="0">
+            <a:noAutofit/>
+          </a:bodyPr>
+          <a:lstStyle/>
+          <a:p>
+            <a:pPr>
+              <a:spcBef>
+                <a:spcPts val="0"/>
+              </a:spcBef>
+              <a:buNone/>
+            </a:pPr>
+            <a:endParaRPr/>
+          </a:p>
+        </p:txBody>
+      </p:sp>
+    </p:spTree>
+  </p:cSld>
+  <p:clrMapOvr>
+    <a:masterClrMapping/>
+  </p:clrMapOvr>
+</p:notes>
+</file>
+
 <file path=ppt/notesSlides/notesSlide2.xml><?xml version="1.0" encoding="utf-8"?>
 <p:notes xmlns:a="http://schemas.openxmlformats.org/drawingml/2006/main" xmlns:r="http://schemas.openxmlformats.org/officeDocument/2006/relationships" xmlns:p="http://schemas.openxmlformats.org/presentationml/2006/main">
   <p:cSld>
@@ -1627,11 +1740,7 @@
             </a:pPr>
             <a:r>
               <a:rPr lang="en-US" dirty="0"/>
-              <a:t>Deployed with a multi-node cluster; </a:t>
-            </a:r>
-            <a:r>
-              <a:rPr lang="en-US" dirty="0"/>
-              <a:t>Balanced across Availability zones</a:t>
+              <a:t>Deployed with a multi-node cluster; Balanced across Availability zones</a:t>
             </a:r>
             <a:endParaRPr lang="en-US" dirty="0">
               <a:solidFill>
@@ -6752,7 +6861,6 @@
               <a:rPr lang="en-US" sz="2800" dirty="0" smtClean="0"/>
               <a:t>Services</a:t>
             </a:r>
-            <a:endParaRPr lang="en-US" sz="2800" dirty="0" smtClean="0"/>
           </a:p>
         </p:txBody>
       </p:sp>
@@ -6831,11 +6939,6 @@
               </a:rPr>
               <a:t>Vision: Make all data products cloud-ready.</a:t>
             </a:r>
-            <a:endParaRPr lang="en-US" sz="2800" dirty="0">
-              <a:solidFill>
-                <a:srgbClr val="2C95DD"/>
-              </a:solidFill>
-            </a:endParaRPr>
           </a:p>
         </p:txBody>
       </p:sp>
@@ -7079,11 +7182,6 @@
               </a:rPr>
               <a:t>/Geode</a:t>
             </a:r>
-            <a:endParaRPr lang="en-US" dirty="0" smtClean="0">
-              <a:solidFill>
-                <a:schemeClr val="bg2"/>
-              </a:solidFill>
-            </a:endParaRPr>
           </a:p>
           <a:p>
             <a:pPr marL="285750" indent="-285750">
@@ -7112,21 +7210,8 @@
                   <a:schemeClr val="bg2"/>
                 </a:solidFill>
               </a:rPr>
-              <a:t> (includes HAWQ), Spring </a:t>
-            </a:r>
-            <a:r>
-              <a:rPr lang="en-US" dirty="0" smtClean="0">
-                <a:solidFill>
-                  <a:schemeClr val="bg2"/>
-                </a:solidFill>
-              </a:rPr>
-              <a:t>XD</a:t>
-            </a:r>
-            <a:endParaRPr lang="en-US" dirty="0" smtClean="0">
-              <a:solidFill>
-                <a:schemeClr val="bg2"/>
-              </a:solidFill>
-            </a:endParaRPr>
+              <a:t> (includes HAWQ), Spring XD</a:t>
+            </a:r>
           </a:p>
         </p:txBody>
       </p:sp>
@@ -7590,21 +7675,8 @@
                   <a:srgbClr val="2C95DD"/>
                 </a:solidFill>
               </a:rPr>
-              <a:t>for Pivotal </a:t>
-            </a:r>
-            <a:r>
-              <a:rPr lang="en-US" sz="2800" dirty="0">
-                <a:solidFill>
-                  <a:srgbClr val="2C95DD"/>
-                </a:solidFill>
-              </a:rPr>
-              <a:t>Cloud Foundry</a:t>
-            </a:r>
-            <a:endParaRPr lang="en-US" sz="2800" dirty="0">
-              <a:solidFill>
-                <a:srgbClr val="2C95DD"/>
-              </a:solidFill>
-            </a:endParaRPr>
+              <a:t>for Pivotal Cloud Foundry</a:t>
+            </a:r>
           </a:p>
         </p:txBody>
       </p:sp>
@@ -7969,29 +8041,8 @@
                   <a:srgbClr val="2C95DD"/>
                 </a:solidFill>
               </a:rPr>
-              <a:t>for </a:t>
-            </a:r>
-            <a:r>
-              <a:rPr lang="en-US" sz="2800" dirty="0">
-                <a:solidFill>
-                  <a:srgbClr val="2C95DD"/>
-                </a:solidFill>
-              </a:rPr>
-              <a:t>Pivotal </a:t>
-            </a:r>
-            <a:r>
-              <a:rPr lang="en-US" sz="2800" dirty="0">
-                <a:solidFill>
-                  <a:srgbClr val="2C95DD"/>
-                </a:solidFill>
-              </a:rPr>
-              <a:t>Cloud Foundry </a:t>
-            </a:r>
-            <a:endParaRPr lang="en-US" sz="2800" dirty="0">
-              <a:solidFill>
-                <a:srgbClr val="2C95DD"/>
-              </a:solidFill>
-            </a:endParaRPr>
+              <a:t>for Pivotal Cloud Foundry </a:t>
+            </a:r>
           </a:p>
         </p:txBody>
       </p:sp>
@@ -8036,23 +8087,7 @@
                   <a:srgbClr val="FFFFFF"/>
                 </a:solidFill>
               </a:rPr>
-              <a:t>-provision a </a:t>
-            </a:r>
-            <a:r>
-              <a:rPr lang="en-US" sz="2000" dirty="0">
-                <a:solidFill>
-                  <a:srgbClr val="FFFFFF"/>
-                </a:solidFill>
-              </a:rPr>
-              <a:t>pool</a:t>
-            </a:r>
-            <a:r>
-              <a:rPr lang="en-US" sz="2000" dirty="0">
-                <a:solidFill>
-                  <a:srgbClr val="FFFFFF"/>
-                </a:solidFill>
-              </a:rPr>
-              <a:t> of </a:t>
+              <a:t>-provision a pool of </a:t>
             </a:r>
             <a:r>
               <a:rPr lang="en-US" sz="2000" dirty="0" err="1">
@@ -9192,29 +9227,8 @@
                   <a:srgbClr val="2C95DD"/>
                 </a:solidFill>
               </a:rPr>
-              <a:t>for </a:t>
-            </a:r>
-            <a:r>
-              <a:rPr lang="en-US" sz="2800" dirty="0">
-                <a:solidFill>
-                  <a:srgbClr val="2C95DD"/>
-                </a:solidFill>
-              </a:rPr>
-              <a:t>Pivotal </a:t>
-            </a:r>
-            <a:r>
-              <a:rPr lang="en-US" sz="2800" dirty="0">
-                <a:solidFill>
-                  <a:srgbClr val="2C95DD"/>
-                </a:solidFill>
-              </a:rPr>
-              <a:t>Cloud Foundry</a:t>
-            </a:r>
-            <a:endParaRPr lang="en-US" sz="2800" dirty="0">
-              <a:solidFill>
-                <a:srgbClr val="2C95DD"/>
-              </a:solidFill>
-            </a:endParaRPr>
+              <a:t>for Pivotal Cloud Foundry</a:t>
+            </a:r>
           </a:p>
         </p:txBody>
       </p:sp>
@@ -9868,14 +9882,21 @@
   <p:clrMapOvr>
     <a:masterClrMapping/>
   </p:clrMapOvr>
-  <mc:AlternateContent xmlns:mc="http://schemas.openxmlformats.org/markup-compatibility/2006">
-    <mc:Choice xmlns:p14="http://schemas.microsoft.com/office/powerpoint/2010/main" Requires="p14">
+  <mc:AlternateContent xmlns:mc="http://schemas.openxmlformats.org/markup-compatibility/2006" xmlns:p14="http://schemas.microsoft.com/office/powerpoint/2010/main">
+    <mc:Choice Requires="p14">
       <p:transition spd="slow" p14:dur="2000"/>
     </mc:Choice>
-    <mc:Fallback>
+    <mc:Fallback xmlns="">
       <p:transition xmlns:p14="http://schemas.microsoft.com/office/powerpoint/2010/main" spd="slow"/>
     </mc:Fallback>
   </mc:AlternateContent>
+  <p:timing>
+    <p:tnLst>
+      <p:par>
+        <p:cTn xmlns:p14="http://schemas.microsoft.com/office/powerpoint/2010/main" id="1" dur="indefinite" restart="never" nodeType="tmRoot"/>
+      </p:par>
+    </p:tnLst>
+  </p:timing>
 </p:sld>
 </file>
 
@@ -9978,11 +9999,11 @@
   <p:clrMapOvr>
     <a:masterClrMapping/>
   </p:clrMapOvr>
-  <mc:AlternateContent xmlns:mc="http://schemas.openxmlformats.org/markup-compatibility/2006">
-    <mc:Choice xmlns:p14="http://schemas.microsoft.com/office/powerpoint/2010/main" Requires="p14">
+  <mc:AlternateContent xmlns:mc="http://schemas.openxmlformats.org/markup-compatibility/2006" xmlns:p14="http://schemas.microsoft.com/office/powerpoint/2010/main">
+    <mc:Choice Requires="p14">
       <p:transition spd="slow" p14:dur="2000"/>
     </mc:Choice>
-    <mc:Fallback>
+    <mc:Fallback xmlns="">
       <p:transition xmlns:p14="http://schemas.microsoft.com/office/powerpoint/2010/main" spd="slow"/>
     </mc:Fallback>
   </mc:AlternateContent>
@@ -10488,11 +10509,6 @@
               </a:rPr>
               <a:t>CF Mobile Services</a:t>
             </a:r>
-            <a:endParaRPr lang="en-US" sz="2800" dirty="0">
-              <a:solidFill>
-                <a:srgbClr val="2C95DD"/>
-              </a:solidFill>
-            </a:endParaRPr>
           </a:p>
         </p:txBody>
       </p:sp>
@@ -11329,11 +11345,11 @@
   <p:clrMapOvr>
     <a:masterClrMapping/>
   </p:clrMapOvr>
-  <mc:AlternateContent xmlns:mc="http://schemas.openxmlformats.org/markup-compatibility/2006">
-    <mc:Choice xmlns:p14="http://schemas.microsoft.com/office/powerpoint/2010/main" Requires="p14">
+  <mc:AlternateContent xmlns:mc="http://schemas.openxmlformats.org/markup-compatibility/2006" xmlns:p14="http://schemas.microsoft.com/office/powerpoint/2010/main">
+    <mc:Choice Requires="p14">
       <p:transition spd="slow" p14:dur="2000"/>
     </mc:Choice>
-    <mc:Fallback>
+    <mc:Fallback xmlns="">
       <p:transition xmlns:p14="http://schemas.microsoft.com/office/powerpoint/2010/main" spd="slow"/>
     </mc:Fallback>
   </mc:AlternateContent>
@@ -11399,11 +11415,6 @@
               </a:rPr>
               <a:t>Notifications</a:t>
             </a:r>
-            <a:endParaRPr lang="en-US" sz="2800" dirty="0">
-              <a:solidFill>
-                <a:srgbClr val="2C95DD"/>
-              </a:solidFill>
-            </a:endParaRPr>
           </a:p>
         </p:txBody>
       </p:sp>
@@ -11524,15 +11535,7 @@
                   <a:srgbClr val="FFFFFF"/>
                 </a:solidFill>
               </a:rPr>
-              <a:t> push providers with services behind the </a:t>
-            </a:r>
-            <a:r>
-              <a:rPr lang="en-US" sz="1800" dirty="0" smtClean="0">
-                <a:solidFill>
-                  <a:srgbClr val="FFFFFF"/>
-                </a:solidFill>
-              </a:rPr>
-              <a:t>firewall</a:t>
+              <a:t> push providers with services behind the firewall</a:t>
             </a:r>
           </a:p>
           <a:p>
@@ -11655,11 +11658,11 @@
   <p:clrMapOvr>
     <a:masterClrMapping/>
   </p:clrMapOvr>
-  <mc:AlternateContent xmlns:mc="http://schemas.openxmlformats.org/markup-compatibility/2006">
-    <mc:Choice xmlns:p14="http://schemas.microsoft.com/office/powerpoint/2010/main" Requires="p14">
+  <mc:AlternateContent xmlns:mc="http://schemas.openxmlformats.org/markup-compatibility/2006" xmlns:p14="http://schemas.microsoft.com/office/powerpoint/2010/main">
+    <mc:Choice Requires="p14">
       <p:transition spd="slow" p14:dur="2000"/>
     </mc:Choice>
-    <mc:Fallback>
+    <mc:Fallback xmlns="">
       <p:transition xmlns:p14="http://schemas.microsoft.com/office/powerpoint/2010/main" spd="slow"/>
     </mc:Fallback>
   </mc:AlternateContent>
@@ -11725,11 +11728,6 @@
               </a:rPr>
               <a:t>Sync</a:t>
             </a:r>
-            <a:endParaRPr lang="en-US" sz="2800" dirty="0">
-              <a:solidFill>
-                <a:srgbClr val="2C95DD"/>
-              </a:solidFill>
-            </a:endParaRPr>
           </a:p>
         </p:txBody>
       </p:sp>
@@ -11820,15 +11818,7 @@
                   <a:srgbClr val="FFFFFF"/>
                 </a:solidFill>
               </a:rPr>
-              <a:t>Existing services provide public cloud “black box” </a:t>
-            </a:r>
-            <a:r>
-              <a:rPr lang="en-US" sz="1800" dirty="0" smtClean="0">
-                <a:solidFill>
-                  <a:srgbClr val="FFFFFF"/>
-                </a:solidFill>
-              </a:rPr>
-              <a:t>storage</a:t>
+              <a:t>Existing services provide public cloud “black box” storage</a:t>
             </a:r>
           </a:p>
           <a:p>
@@ -11926,11 +11916,11 @@
   <p:clrMapOvr>
     <a:masterClrMapping/>
   </p:clrMapOvr>
-  <mc:AlternateContent xmlns:mc="http://schemas.openxmlformats.org/markup-compatibility/2006">
-    <mc:Choice xmlns:p14="http://schemas.microsoft.com/office/powerpoint/2010/main" Requires="p14">
+  <mc:AlternateContent xmlns:mc="http://schemas.openxmlformats.org/markup-compatibility/2006" xmlns:p14="http://schemas.microsoft.com/office/powerpoint/2010/main">
+    <mc:Choice Requires="p14">
       <p:transition spd="slow" p14:dur="2000"/>
     </mc:Choice>
-    <mc:Fallback>
+    <mc:Fallback xmlns="">
       <p:transition xmlns:p14="http://schemas.microsoft.com/office/powerpoint/2010/main" spd="slow"/>
     </mc:Fallback>
   </mc:AlternateContent>
@@ -14881,15 +14871,7 @@
                   <a:srgbClr val="2C95DD"/>
                 </a:solidFill>
               </a:rPr>
-              <a:t>Cloud Native Application </a:t>
-            </a:r>
-            <a:r>
-              <a:rPr lang="en-US" sz="2800" dirty="0" smtClean="0">
-                <a:solidFill>
-                  <a:srgbClr val="2C95DD"/>
-                </a:solidFill>
-              </a:rPr>
-              <a:t>Platform - Services</a:t>
+              <a:t>Cloud Native Application Platform - Services</a:t>
             </a:r>
             <a:endParaRPr lang="en-US" sz="2800" dirty="0">
               <a:solidFill>
@@ -14965,29 +14947,8 @@
                   <a:srgbClr val="2C95DD"/>
                 </a:solidFill>
               </a:rPr>
-              <a:t>API </a:t>
-            </a:r>
-            <a:r>
-              <a:rPr lang="en-US" sz="2800" dirty="0">
-                <a:solidFill>
-                  <a:srgbClr val="2C95DD"/>
-                </a:solidFill>
-              </a:rPr>
-              <a:t>G</a:t>
-            </a:r>
-            <a:r>
-              <a:rPr lang="en-US" sz="2800" dirty="0">
-                <a:solidFill>
-                  <a:srgbClr val="2C95DD"/>
-                </a:solidFill>
-              </a:rPr>
-              <a:t>ateway</a:t>
-            </a:r>
-            <a:endParaRPr lang="en-US" sz="2800" dirty="0">
-              <a:solidFill>
-                <a:srgbClr val="2C95DD"/>
-              </a:solidFill>
-            </a:endParaRPr>
+              <a:t>API Gateway</a:t>
+            </a:r>
           </a:p>
         </p:txBody>
       </p:sp>
@@ -15076,15 +15037,7 @@
                   <a:srgbClr val="FFFFFF"/>
                 </a:solidFill>
               </a:rPr>
-              <a:t>Mobile apps often require several API calls to display a single page of </a:t>
-            </a:r>
-            <a:r>
-              <a:rPr lang="en-US" sz="1800" dirty="0" smtClean="0">
-                <a:solidFill>
-                  <a:srgbClr val="FFFFFF"/>
-                </a:solidFill>
-              </a:rPr>
-              <a:t>content</a:t>
+              <a:t>Mobile apps often require several API calls to display a single page of content</a:t>
             </a:r>
           </a:p>
           <a:p>
@@ -15172,11 +15125,11 @@
   <p:clrMapOvr>
     <a:masterClrMapping/>
   </p:clrMapOvr>
-  <mc:AlternateContent xmlns:mc="http://schemas.openxmlformats.org/markup-compatibility/2006">
-    <mc:Choice xmlns:p14="http://schemas.microsoft.com/office/powerpoint/2010/main" Requires="p14">
+  <mc:AlternateContent xmlns:mc="http://schemas.openxmlformats.org/markup-compatibility/2006" xmlns:p14="http://schemas.microsoft.com/office/powerpoint/2010/main">
+    <mc:Choice Requires="p14">
       <p:transition spd="slow" p14:dur="2000"/>
     </mc:Choice>
-    <mc:Fallback>
+    <mc:Fallback xmlns="">
       <p:transition xmlns:p14="http://schemas.microsoft.com/office/powerpoint/2010/main" spd="slow"/>
     </mc:Fallback>
   </mc:AlternateContent>
@@ -15230,11 +15183,6 @@
               </a:rPr>
               <a:t>App Distribution</a:t>
             </a:r>
-            <a:endParaRPr lang="en-US" sz="2800" dirty="0">
-              <a:solidFill>
-                <a:srgbClr val="2C95DD"/>
-              </a:solidFill>
-            </a:endParaRPr>
           </a:p>
         </p:txBody>
       </p:sp>
@@ -15309,15 +15257,7 @@
                   <a:srgbClr val="FFFFFF"/>
                 </a:solidFill>
               </a:rPr>
-              <a:t>Existing solutions are public </a:t>
-            </a:r>
-            <a:r>
-              <a:rPr lang="en-US" sz="1800" dirty="0" smtClean="0">
-                <a:solidFill>
-                  <a:srgbClr val="FFFFFF"/>
-                </a:solidFill>
-              </a:rPr>
-              <a:t>cloud</a:t>
+              <a:t>Existing solutions are public cloud</a:t>
             </a:r>
           </a:p>
           <a:p>
@@ -15443,14 +15383,54 @@
   <p:clrMapOvr>
     <a:masterClrMapping/>
   </p:clrMapOvr>
-  <mc:AlternateContent xmlns:mc="http://schemas.openxmlformats.org/markup-compatibility/2006">
-    <mc:Choice xmlns:p14="http://schemas.microsoft.com/office/powerpoint/2010/main" Requires="p14">
+  <mc:AlternateContent xmlns:mc="http://schemas.openxmlformats.org/markup-compatibility/2006" xmlns:p14="http://schemas.microsoft.com/office/powerpoint/2010/main">
+    <mc:Choice Requires="p14">
       <p:transition spd="slow" p14:dur="2000"/>
     </mc:Choice>
-    <mc:Fallback>
+    <mc:Fallback xmlns="">
       <p:transition xmlns:p14="http://schemas.microsoft.com/office/powerpoint/2010/main" spd="slow"/>
     </mc:Fallback>
   </mc:AlternateContent>
+  <p:timing>
+    <p:tnLst>
+      <p:par>
+        <p:cTn xmlns:p14="http://schemas.microsoft.com/office/powerpoint/2010/main" id="1" dur="indefinite" restart="never" nodeType="tmRoot"/>
+      </p:par>
+    </p:tnLst>
+  </p:timing>
+</p:sld>
+</file>
+
+<file path=ppt/slides/slide22.xml><?xml version="1.0" encoding="utf-8"?>
+<p:sld xmlns:a="http://schemas.openxmlformats.org/drawingml/2006/main" xmlns:r="http://schemas.openxmlformats.org/officeDocument/2006/relationships" xmlns:p="http://schemas.openxmlformats.org/presentationml/2006/main">
+  <p:cSld>
+    <p:spTree>
+      <p:nvGrpSpPr>
+        <p:cNvPr id="1" name="Shape 286"/>
+        <p:cNvGrpSpPr/>
+        <p:nvPr/>
+      </p:nvGrpSpPr>
+      <p:grpSpPr>
+        <a:xfrm>
+          <a:off x="0" y="0"/>
+          <a:ext cx="0" cy="0"/>
+          <a:chOff x="0" y="0"/>
+          <a:chExt cx="0" cy="0"/>
+        </a:xfrm>
+      </p:grpSpPr>
+    </p:spTree>
+    <p:extLst>
+      <p:ext uri="{BB962C8B-B14F-4D97-AF65-F5344CB8AC3E}">
+        <p14:creationId xmlns:p14="http://schemas.microsoft.com/office/powerpoint/2010/main" val="2366141541"/>
+      </p:ext>
+    </p:extLst>
+  </p:cSld>
+  <p:clrMapOvr>
+    <a:masterClrMapping/>
+  </p:clrMapOvr>
+  <p:transition xmlns:p14="http://schemas.microsoft.com/office/powerpoint/2010/main" spd="slow">
+    <p:cut/>
+  </p:transition>
   <p:timing>
     <p:tnLst>
       <p:par>
@@ -15517,23 +15497,7 @@
                   <a:srgbClr val="FFFFFF"/>
                 </a:solidFill>
               </a:rPr>
-              <a:t>Allows </a:t>
-            </a:r>
-            <a:r>
-              <a:rPr lang="en-US" sz="1800" dirty="0">
-                <a:solidFill>
-                  <a:srgbClr val="FFFFFF"/>
-                </a:solidFill>
-              </a:rPr>
-              <a:t>resources to be easily provisioned on-</a:t>
-            </a:r>
-            <a:r>
-              <a:rPr lang="en-US" sz="1800" dirty="0">
-                <a:solidFill>
-                  <a:srgbClr val="FFFFFF"/>
-                </a:solidFill>
-              </a:rPr>
-              <a:t>demand</a:t>
+              <a:t>Allows resources to be easily provisioned on-demand</a:t>
             </a:r>
           </a:p>
           <a:p>
@@ -15553,23 +15517,7 @@
                   <a:srgbClr val="FFFFFF"/>
                 </a:solidFill>
               </a:rPr>
-              <a:t>Typically </a:t>
-            </a:r>
-            <a:r>
-              <a:rPr lang="en-US" sz="1800" dirty="0">
-                <a:solidFill>
-                  <a:srgbClr val="FFFFFF"/>
-                </a:solidFill>
-              </a:rPr>
-              <a:t>middleware, frameworks, and other “components” </a:t>
-            </a:r>
-            <a:r>
-              <a:rPr lang="en-US" sz="1800" dirty="0">
-                <a:solidFill>
-                  <a:srgbClr val="FFFFFF"/>
-                </a:solidFill>
-              </a:rPr>
-              <a:t>necessary for applications</a:t>
+              <a:t>Typically middleware, frameworks, and other “components” necessary for applications</a:t>
             </a:r>
           </a:p>
           <a:p>
@@ -15607,11 +15555,6 @@
               </a:rPr>
               <a:t> layer</a:t>
             </a:r>
-            <a:endParaRPr lang="en-US" sz="1800" dirty="0">
-              <a:solidFill>
-                <a:srgbClr val="FFFFFF"/>
-              </a:solidFill>
-            </a:endParaRPr>
           </a:p>
         </p:txBody>
       </p:sp>
@@ -15723,11 +15666,11 @@
   <p:clrMapOvr>
     <a:masterClrMapping/>
   </p:clrMapOvr>
-  <mc:AlternateContent xmlns:mc="http://schemas.openxmlformats.org/markup-compatibility/2006">
-    <mc:Choice xmlns:p14="http://schemas.microsoft.com/office/powerpoint/2010/main" Requires="p14">
+  <mc:AlternateContent xmlns:mc="http://schemas.openxmlformats.org/markup-compatibility/2006" xmlns:p14="http://schemas.microsoft.com/office/powerpoint/2010/main">
+    <mc:Choice Requires="p14">
       <p:transition spd="slow" p14:dur="2000"/>
     </mc:Choice>
-    <mc:Fallback>
+    <mc:Fallback xmlns="">
       <p:transition xmlns:p14="http://schemas.microsoft.com/office/powerpoint/2010/main" spd="slow"/>
     </mc:Fallback>
   </mc:AlternateContent>
@@ -15822,11 +15765,6 @@
               </a:rPr>
               <a:t>Types of Services</a:t>
             </a:r>
-            <a:endParaRPr lang="en-US" sz="2800" dirty="0">
-              <a:solidFill>
-                <a:srgbClr val="2C95DD"/>
-              </a:solidFill>
-            </a:endParaRPr>
           </a:p>
         </p:txBody>
       </p:sp>
@@ -17851,11 +17789,6 @@
               </a:rPr>
               <a:t>Broker</a:t>
             </a:r>
-            <a:endParaRPr lang="en-US" sz="2800" dirty="0">
-              <a:solidFill>
-                <a:srgbClr val="2C95DD"/>
-              </a:solidFill>
-            </a:endParaRPr>
           </a:p>
         </p:txBody>
       </p:sp>
@@ -18042,7 +17975,7 @@
                 <a:buNone/>
               </a:pPr>
               <a:r>
-                <a:rPr lang="en-US" sz="1200" b="0" i="0" u="none" strike="noStrike" cap="none" baseline="0">
+                <a:rPr lang="en-US" sz="1200" b="0" i="0" u="none" strike="noStrike" cap="none" baseline="0" dirty="0" smtClean="0">
                   <a:solidFill>
                     <a:srgbClr val="F2F2F2"/>
                   </a:solidFill>
@@ -18052,8 +17985,18 @@
                   <a:sym typeface="Calibri"/>
                   <a:rtl val="0"/>
                 </a:rPr>
-                <a:t>DEA</a:t>
+                <a:t>Cell</a:t>
               </a:r>
+              <a:endParaRPr lang="en-US" sz="1200" b="0" i="0" u="none" strike="noStrike" cap="none" baseline="0" dirty="0">
+                <a:solidFill>
+                  <a:srgbClr val="F2F2F2"/>
+                </a:solidFill>
+                <a:latin typeface="Calibri"/>
+                <a:ea typeface="Calibri"/>
+                <a:cs typeface="Calibri"/>
+                <a:sym typeface="Calibri"/>
+                <a:rtl val="0"/>
+              </a:endParaRPr>
             </a:p>
           </p:txBody>
         </p:sp>
@@ -20028,11 +19971,11 @@
   <p:clrMapOvr>
     <a:masterClrMapping/>
   </p:clrMapOvr>
-  <mc:AlternateContent xmlns:mc="http://schemas.openxmlformats.org/markup-compatibility/2006">
-    <mc:Choice xmlns:p14="http://schemas.microsoft.com/office/powerpoint/2010/main" Requires="p14">
+  <mc:AlternateContent xmlns:mc="http://schemas.openxmlformats.org/markup-compatibility/2006" xmlns:p14="http://schemas.microsoft.com/office/powerpoint/2010/main">
+    <mc:Choice Requires="p14">
       <p:transition spd="slow" p14:dur="2000"/>
     </mc:Choice>
-    <mc:Fallback>
+    <mc:Fallback xmlns="">
       <p:transition xmlns:p14="http://schemas.microsoft.com/office/powerpoint/2010/main" spd="slow"/>
     </mc:Fallback>
   </mc:AlternateContent>
@@ -23456,11 +23399,6 @@
               </a:rPr>
               <a:t>Cloud Foundry Services</a:t>
             </a:r>
-            <a:endParaRPr lang="en-US" sz="2800" dirty="0">
-              <a:solidFill>
-                <a:srgbClr val="2C95DD"/>
-              </a:solidFill>
-            </a:endParaRPr>
           </a:p>
         </p:txBody>
       </p:sp>
@@ -23882,11 +23820,6 @@
               </a:rPr>
               <a:t>Marketplace</a:t>
             </a:r>
-            <a:endParaRPr lang="en-US" sz="2800" dirty="0">
-              <a:solidFill>
-                <a:srgbClr val="2C95DD"/>
-              </a:solidFill>
-            </a:endParaRPr>
           </a:p>
         </p:txBody>
       </p:sp>
@@ -24198,21 +24131,8 @@
                   <a:srgbClr val="FFFFFF"/>
                 </a:solidFill>
               </a:rPr>
-              <a:t>Broad Services </a:t>
-            </a:r>
-            <a:r>
-              <a:rPr lang="en-US" sz="2400" dirty="0" smtClean="0">
-                <a:solidFill>
-                  <a:srgbClr val="FFFFFF"/>
-                </a:solidFill>
-              </a:rPr>
-              <a:t>Ecosystem</a:t>
-            </a:r>
-            <a:endParaRPr lang="en-US" sz="2400" dirty="0" smtClean="0">
-              <a:solidFill>
-                <a:srgbClr val="FFFFFF"/>
-              </a:solidFill>
-            </a:endParaRPr>
+              <a:t>Broad Services Ecosystem</a:t>
+            </a:r>
           </a:p>
           <a:p>
             <a:pPr marL="342900" indent="-342900">
@@ -24232,15 +24152,7 @@
                   <a:srgbClr val="FFFFFF"/>
                 </a:solidFill>
               </a:rPr>
-              <a:t>Easy </a:t>
-            </a:r>
-            <a:r>
-              <a:rPr lang="en-US" sz="2400" dirty="0" smtClean="0">
-                <a:solidFill>
-                  <a:srgbClr val="FFFFFF"/>
-                </a:solidFill>
-              </a:rPr>
-              <a:t>accessibility</a:t>
+              <a:t>Easy accessibility</a:t>
             </a:r>
             <a:endParaRPr lang="en-US" sz="2400" dirty="0">
               <a:solidFill>

</xml_diff>

<commit_message>
Updated for new content
</commit_message>
<xml_diff>
--- a/presentations/Session_4_Services_Overview.pptx
+++ b/presentations/Session_4_Services_Overview.pptx
@@ -12,7 +12,7 @@
     <p:sldId id="476" r:id="rId3"/>
     <p:sldId id="477" r:id="rId4"/>
     <p:sldId id="478" r:id="rId5"/>
-    <p:sldId id="496" r:id="rId6"/>
+    <p:sldId id="498" r:id="rId6"/>
     <p:sldId id="480" r:id="rId7"/>
     <p:sldId id="481" r:id="rId8"/>
     <p:sldId id="482" r:id="rId9"/>
@@ -253,7 +253,7 @@
             <p14:sldId id="476"/>
             <p14:sldId id="477"/>
             <p14:sldId id="478"/>
-            <p14:sldId id="496"/>
+            <p14:sldId id="498"/>
             <p14:sldId id="480"/>
             <p14:sldId id="481"/>
             <p14:sldId id="482"/>
@@ -16114,6 +16114,70 @@
       </p:grpSpPr>
       <p:sp>
         <p:nvSpPr>
+          <p:cNvPr id="71" name="Rectangle 70"/>
+          <p:cNvSpPr/>
+          <p:nvPr/>
+        </p:nvSpPr>
+        <p:spPr>
+          <a:xfrm>
+            <a:off x="5191759" y="894080"/>
+            <a:ext cx="1879600" cy="1806788"/>
+          </a:xfrm>
+          <a:prstGeom prst="rect">
+            <a:avLst/>
+          </a:prstGeom>
+          <a:solidFill>
+            <a:srgbClr val="D9D9D9"/>
+          </a:solidFill>
+          <a:ln w="12700">
+            <a:solidFill>
+              <a:schemeClr val="bg2"/>
+            </a:solidFill>
+          </a:ln>
+        </p:spPr>
+        <p:style>
+          <a:lnRef idx="2">
+            <a:schemeClr val="accent1">
+              <a:shade val="50000"/>
+            </a:schemeClr>
+          </a:lnRef>
+          <a:fillRef idx="1">
+            <a:schemeClr val="accent1"/>
+          </a:fillRef>
+          <a:effectRef idx="0">
+            <a:schemeClr val="accent1"/>
+          </a:effectRef>
+          <a:fontRef idx="minor">
+            <a:schemeClr val="lt1"/>
+          </a:fontRef>
+        </p:style>
+        <p:txBody>
+          <a:bodyPr rtlCol="0" anchor="t"/>
+          <a:lstStyle/>
+          <a:p>
+            <a:pPr algn="ctr"/>
+            <a:r>
+              <a:rPr lang="en-US" sz="1800" b="1" dirty="0" smtClean="0">
+                <a:solidFill>
+                  <a:srgbClr val="000000"/>
+                </a:solidFill>
+              </a:rPr>
+              <a:t>CI/CD</a:t>
+            </a:r>
+            <a:endParaRPr lang="en-US" sz="1800" b="1" dirty="0" smtClean="0">
+              <a:solidFill>
+                <a:srgbClr val="000000"/>
+              </a:solidFill>
+            </a:endParaRPr>
+          </a:p>
+          <a:p>
+            <a:pPr algn="ctr"/>
+            <a:endParaRPr lang="en-US" dirty="0"/>
+          </a:p>
+        </p:txBody>
+      </p:sp>
+      <p:sp>
+        <p:nvSpPr>
           <p:cNvPr id="34" name="Rectangle 33"/>
           <p:cNvSpPr/>
           <p:nvPr/>
@@ -16127,9 +16191,8 @@
             <a:avLst/>
           </a:prstGeom>
           <a:solidFill>
-            <a:schemeClr val="accent1">
-              <a:lumMod val="60000"/>
-              <a:lumOff val="40000"/>
+            <a:schemeClr val="bg1">
+              <a:lumMod val="85000"/>
             </a:schemeClr>
           </a:solidFill>
           <a:ln w="12700">
@@ -16160,7 +16223,7 @@
           <a:p>
             <a:pPr algn="ctr"/>
             <a:r>
-              <a:rPr lang="en-US" sz="2000" b="1" dirty="0" smtClean="0">
+              <a:rPr lang="en-US" sz="1800" b="1" dirty="0" smtClean="0">
                 <a:solidFill>
                   <a:srgbClr val="000000"/>
                 </a:solidFill>
@@ -16227,16 +16290,13 @@
         <p:spPr>
           <a:xfrm>
             <a:off x="142240" y="894080"/>
-            <a:ext cx="1869440" cy="3657600"/>
+            <a:ext cx="1869440" cy="2191083"/>
           </a:xfrm>
           <a:prstGeom prst="rect">
             <a:avLst/>
           </a:prstGeom>
           <a:solidFill>
-            <a:schemeClr val="accent1">
-              <a:lumMod val="60000"/>
-              <a:lumOff val="40000"/>
-            </a:schemeClr>
+            <a:srgbClr val="D9D9D9"/>
           </a:solidFill>
           <a:ln w="12700">
             <a:solidFill>
@@ -16266,7 +16326,7 @@
           <a:p>
             <a:pPr algn="ctr"/>
             <a:r>
-              <a:rPr lang="en-US" sz="2000" b="1" dirty="0" smtClean="0">
+              <a:rPr lang="en-US" sz="1800" b="1" dirty="0" smtClean="0">
                 <a:solidFill>
                   <a:schemeClr val="tx2"/>
                 </a:solidFill>
@@ -16283,23 +16343,20 @@
       </p:sp>
       <p:sp>
         <p:nvSpPr>
-          <p:cNvPr id="5" name="Rectangle 4"/>
+          <p:cNvPr id="6" name="Rectangle 5"/>
           <p:cNvSpPr/>
           <p:nvPr/>
         </p:nvSpPr>
         <p:spPr>
           <a:xfrm>
-            <a:off x="5191760" y="894080"/>
-            <a:ext cx="1879600" cy="3647440"/>
+            <a:off x="7122160" y="894080"/>
+            <a:ext cx="1889760" cy="3669482"/>
           </a:xfrm>
           <a:prstGeom prst="rect">
             <a:avLst/>
           </a:prstGeom>
           <a:solidFill>
-            <a:schemeClr val="accent1">
-              <a:lumMod val="60000"/>
-              <a:lumOff val="40000"/>
-            </a:schemeClr>
+            <a:srgbClr val="D9D9D9"/>
           </a:solidFill>
           <a:ln w="12700">
             <a:solidFill>
@@ -16329,75 +16386,18 @@
           <a:p>
             <a:pPr algn="ctr"/>
             <a:r>
-              <a:rPr lang="en-US" sz="2000" b="1" dirty="0" smtClean="0">
+              <a:rPr lang="en-US" sz="1800" b="1" dirty="0" smtClean="0">
                 <a:solidFill>
                   <a:srgbClr val="000000"/>
                 </a:solidFill>
               </a:rPr>
-              <a:t>Other</a:t>
-            </a:r>
-          </a:p>
-          <a:p>
-            <a:pPr algn="ctr"/>
-            <a:endParaRPr lang="en-US" dirty="0"/>
-          </a:p>
-        </p:txBody>
-      </p:sp>
-      <p:sp>
-        <p:nvSpPr>
-          <p:cNvPr id="6" name="Rectangle 5"/>
-          <p:cNvSpPr/>
-          <p:nvPr/>
-        </p:nvSpPr>
-        <p:spPr>
-          <a:xfrm>
-            <a:off x="7122160" y="894080"/>
-            <a:ext cx="1889760" cy="3637280"/>
-          </a:xfrm>
-          <a:prstGeom prst="rect">
-            <a:avLst/>
-          </a:prstGeom>
-          <a:solidFill>
-            <a:schemeClr val="accent1">
-              <a:lumMod val="60000"/>
-              <a:lumOff val="40000"/>
-            </a:schemeClr>
-          </a:solidFill>
-          <a:ln w="12700">
-            <a:solidFill>
-              <a:schemeClr val="bg2"/>
-            </a:solidFill>
-          </a:ln>
-        </p:spPr>
-        <p:style>
-          <a:lnRef idx="2">
-            <a:schemeClr val="accent1">
-              <a:shade val="50000"/>
-            </a:schemeClr>
-          </a:lnRef>
-          <a:fillRef idx="1">
-            <a:schemeClr val="accent1"/>
-          </a:fillRef>
-          <a:effectRef idx="0">
-            <a:schemeClr val="accent1"/>
-          </a:effectRef>
-          <a:fontRef idx="minor">
-            <a:schemeClr val="lt1"/>
-          </a:fontRef>
-        </p:style>
-        <p:txBody>
-          <a:bodyPr rtlCol="0" anchor="t"/>
-          <a:lstStyle/>
-          <a:p>
-            <a:pPr algn="ctr"/>
-            <a:r>
-              <a:rPr lang="en-US" sz="2000" b="1" dirty="0" smtClean="0">
-                <a:solidFill>
-                  <a:srgbClr val="000000"/>
-                </a:solidFill>
-              </a:rPr>
-              <a:t>Spring Cloud</a:t>
-            </a:r>
+              <a:t>Cloud Native</a:t>
+            </a:r>
+            <a:endParaRPr lang="en-US" sz="1800" b="1" dirty="0" smtClean="0">
+              <a:solidFill>
+                <a:srgbClr val="000000"/>
+              </a:solidFill>
+            </a:endParaRPr>
           </a:p>
           <a:p>
             <a:pPr algn="ctr"/>
@@ -16415,6 +16415,7 @@
         </p:nvPicPr>
         <p:blipFill>
           <a:blip r:embed="rId3" cstate="screen">
+            <a:alphaModFix/>
             <a:extLst>
               <a:ext uri="{28A0092B-C50C-407E-A947-70E740481C1C}">
                 <a14:useLocalDpi xmlns:a14="http://schemas.microsoft.com/office/drawing/2010/main"/>
@@ -16427,7 +16428,7 @@
         </p:blipFill>
         <p:spPr>
           <a:xfrm>
-            <a:off x="335280" y="1625600"/>
+            <a:off x="234406" y="1501513"/>
             <a:ext cx="640080" cy="640080"/>
           </a:xfrm>
           <a:prstGeom prst="rect">
@@ -16457,7 +16458,7 @@
         </p:blipFill>
         <p:spPr>
           <a:xfrm>
-            <a:off x="5384800" y="2346960"/>
+            <a:off x="5273810" y="1935481"/>
             <a:ext cx="640080" cy="640080"/>
           </a:xfrm>
           <a:prstGeom prst="rect">
@@ -16487,37 +16488,7 @@
         </p:blipFill>
         <p:spPr>
           <a:xfrm>
-            <a:off x="3535680" y="1625600"/>
-            <a:ext cx="640080" cy="640080"/>
-          </a:xfrm>
-          <a:prstGeom prst="rect">
-            <a:avLst/>
-          </a:prstGeom>
-        </p:spPr>
-      </p:pic>
-      <p:pic>
-        <p:nvPicPr>
-          <p:cNvPr id="21" name="Picture 20" descr="icon_datasync_cf@2x.png"/>
-          <p:cNvPicPr>
-            <a:picLocks noChangeAspect="1"/>
-          </p:cNvPicPr>
-          <p:nvPr/>
-        </p:nvPicPr>
-        <p:blipFill>
-          <a:blip r:embed="rId6" cstate="screen">
-            <a:extLst>
-              <a:ext uri="{28A0092B-C50C-407E-A947-70E740481C1C}">
-                <a14:useLocalDpi xmlns:a14="http://schemas.microsoft.com/office/drawing/2010/main"/>
-              </a:ext>
-            </a:extLst>
-          </a:blip>
-          <a:stretch>
-            <a:fillRect/>
-          </a:stretch>
-        </p:blipFill>
-        <p:spPr>
-          <a:xfrm>
-            <a:off x="335280" y="3097828"/>
+            <a:off x="3622809" y="1295401"/>
             <a:ext cx="640080" cy="640080"/>
           </a:xfrm>
           <a:prstGeom prst="rect">
@@ -16534,8 +16505,8 @@
           <p:nvPr/>
         </p:nvPicPr>
         <p:blipFill>
-          <a:blip r:embed="rId7" cstate="screen">
-            <a:alphaModFix amt="47000"/>
+          <a:blip r:embed="rId6" cstate="screen">
+            <a:alphaModFix/>
             <a:extLst>
               <a:ext uri="{28A0092B-C50C-407E-A947-70E740481C1C}">
                 <a14:useLocalDpi xmlns:a14="http://schemas.microsoft.com/office/drawing/2010/main"/>
@@ -16548,7 +16519,7 @@
         </p:blipFill>
         <p:spPr>
           <a:xfrm>
-            <a:off x="3535680" y="2346960"/>
+            <a:off x="3615403" y="3754844"/>
             <a:ext cx="640080" cy="640080"/>
           </a:xfrm>
           <a:prstGeom prst="rect">
@@ -16559,6 +16530,36 @@
       <p:pic>
         <p:nvPicPr>
           <p:cNvPr id="23" name="Picture 22" descr="icon_pushnotification_cf@2x.png"/>
+          <p:cNvPicPr>
+            <a:picLocks noChangeAspect="1"/>
+          </p:cNvPicPr>
+          <p:nvPr/>
+        </p:nvPicPr>
+        <p:blipFill>
+          <a:blip r:embed="rId7" cstate="screen">
+            <a:extLst>
+              <a:ext uri="{28A0092B-C50C-407E-A947-70E740481C1C}">
+                <a14:useLocalDpi xmlns:a14="http://schemas.microsoft.com/office/drawing/2010/main"/>
+              </a:ext>
+            </a:extLst>
+          </a:blip>
+          <a:stretch>
+            <a:fillRect/>
+          </a:stretch>
+        </p:blipFill>
+        <p:spPr>
+          <a:xfrm>
+            <a:off x="239486" y="2357121"/>
+            <a:ext cx="640079" cy="640079"/>
+          </a:xfrm>
+          <a:prstGeom prst="rect">
+            <a:avLst/>
+          </a:prstGeom>
+        </p:spPr>
+      </p:pic>
+      <p:pic>
+        <p:nvPicPr>
+          <p:cNvPr id="24" name="Picture 23" descr="icon_rabbitmq_cf@2x.png"/>
           <p:cNvPicPr>
             <a:picLocks noChangeAspect="1"/>
           </p:cNvPicPr>
@@ -16578,8 +16579,8 @@
         </p:blipFill>
         <p:spPr>
           <a:xfrm>
-            <a:off x="335281" y="2357121"/>
-            <a:ext cx="640079" cy="640079"/>
+            <a:off x="3630429" y="2139053"/>
+            <a:ext cx="637540" cy="637540"/>
           </a:xfrm>
           <a:prstGeom prst="rect">
             <a:avLst/>
@@ -16588,7 +16589,7 @@
       </p:pic>
       <p:pic>
         <p:nvPicPr>
-          <p:cNvPr id="24" name="Picture 23" descr="icon_rabbitmq_cf@2x.png"/>
+          <p:cNvPr id="25" name="Picture 24" descr="icon_redis_cf@2x.png"/>
           <p:cNvPicPr>
             <a:picLocks noChangeAspect="1"/>
           </p:cNvPicPr>
@@ -16608,37 +16609,7 @@
         </p:blipFill>
         <p:spPr>
           <a:xfrm>
-            <a:off x="5387340" y="1617980"/>
-            <a:ext cx="637540" cy="637540"/>
-          </a:xfrm>
-          <a:prstGeom prst="rect">
-            <a:avLst/>
-          </a:prstGeom>
-        </p:spPr>
-      </p:pic>
-      <p:pic>
-        <p:nvPicPr>
-          <p:cNvPr id="25" name="Picture 24" descr="icon_redis_cf@2x.png"/>
-          <p:cNvPicPr>
-            <a:picLocks noChangeAspect="1"/>
-          </p:cNvPicPr>
-          <p:nvPr/>
-        </p:nvPicPr>
-        <p:blipFill>
-          <a:blip r:embed="rId10" cstate="screen">
-            <a:extLst>
-              <a:ext uri="{28A0092B-C50C-407E-A947-70E740481C1C}">
-                <a14:useLocalDpi xmlns:a14="http://schemas.microsoft.com/office/drawing/2010/main"/>
-              </a:ext>
-            </a:extLst>
-          </a:blip>
-          <a:stretch>
-            <a:fillRect/>
-          </a:stretch>
-        </p:blipFill>
-        <p:spPr>
-          <a:xfrm>
-            <a:off x="2135674" y="1628762"/>
+            <a:off x="2135674" y="1308722"/>
             <a:ext cx="638006" cy="638006"/>
           </a:xfrm>
           <a:prstGeom prst="rect">
@@ -16655,7 +16626,7 @@
           <p:nvPr/>
         </p:nvPicPr>
         <p:blipFill>
-          <a:blip r:embed="rId11" cstate="screen">
+          <a:blip r:embed="rId10" cstate="screen">
             <a:alphaModFix/>
             <a:extLst>
               <a:ext uri="{28A0092B-C50C-407E-A947-70E740481C1C}">
@@ -16669,7 +16640,7 @@
         </p:blipFill>
         <p:spPr>
           <a:xfrm>
-            <a:off x="5384800" y="3088640"/>
+            <a:off x="2135674" y="2933989"/>
             <a:ext cx="640080" cy="640080"/>
           </a:xfrm>
           <a:prstGeom prst="rect">
@@ -16679,7 +16650,37 @@
       </p:pic>
       <p:pic>
         <p:nvPicPr>
-          <p:cNvPr id="27" name="Picture 26"/>
+          <p:cNvPr id="28" name="Picture 27"/>
+          <p:cNvPicPr>
+            <a:picLocks noChangeAspect="1"/>
+          </p:cNvPicPr>
+          <p:nvPr/>
+        </p:nvPicPr>
+        <p:blipFill>
+          <a:blip r:embed="rId11" cstate="screen">
+            <a:extLst>
+              <a:ext uri="{28A0092B-C50C-407E-A947-70E740481C1C}">
+                <a14:useLocalDpi xmlns:a14="http://schemas.microsoft.com/office/drawing/2010/main"/>
+              </a:ext>
+            </a:extLst>
+          </a:blip>
+          <a:stretch>
+            <a:fillRect/>
+          </a:stretch>
+        </p:blipFill>
+        <p:spPr>
+          <a:xfrm>
+            <a:off x="2133898" y="2141593"/>
+            <a:ext cx="639782" cy="639782"/>
+          </a:xfrm>
+          <a:prstGeom prst="rect">
+            <a:avLst/>
+          </a:prstGeom>
+        </p:spPr>
+      </p:pic>
+      <p:pic>
+        <p:nvPicPr>
+          <p:cNvPr id="31" name="Picture 30"/>
           <p:cNvPicPr>
             <a:picLocks noChangeAspect="1"/>
           </p:cNvPicPr>
@@ -16699,8 +16700,8 @@
         </p:blipFill>
         <p:spPr>
           <a:xfrm>
-            <a:off x="335280" y="3835400"/>
-            <a:ext cx="635000" cy="635000"/>
+            <a:off x="2128268" y="3779753"/>
+            <a:ext cx="640080" cy="640080"/>
           </a:xfrm>
           <a:prstGeom prst="rect">
             <a:avLst/>
@@ -16709,10 +16710,8 @@
       </p:pic>
       <p:pic>
         <p:nvPicPr>
-          <p:cNvPr id="28" name="Picture 27"/>
-          <p:cNvPicPr>
-            <a:picLocks noChangeAspect="1"/>
-          </p:cNvPicPr>
+          <p:cNvPr id="35" name="pasted-image.png"/>
+          <p:cNvPicPr/>
           <p:nvPr/>
         </p:nvPicPr>
         <p:blipFill>
@@ -16729,156 +16728,7 @@
         </p:blipFill>
         <p:spPr>
           <a:xfrm>
-            <a:off x="2133898" y="2352040"/>
-            <a:ext cx="639782" cy="639782"/>
-          </a:xfrm>
-          <a:prstGeom prst="rect">
-            <a:avLst/>
-          </a:prstGeom>
-        </p:spPr>
-      </p:pic>
-      <p:pic>
-        <p:nvPicPr>
-          <p:cNvPr id="29" name="Picture 28"/>
-          <p:cNvPicPr>
-            <a:picLocks noChangeAspect="1"/>
-          </p:cNvPicPr>
-          <p:nvPr/>
-        </p:nvPicPr>
-        <p:blipFill>
-          <a:blip r:embed="rId14" cstate="screen">
-            <a:alphaModFix/>
-            <a:extLst>
-              <a:ext uri="{28A0092B-C50C-407E-A947-70E740481C1C}">
-                <a14:useLocalDpi xmlns:a14="http://schemas.microsoft.com/office/drawing/2010/main"/>
-              </a:ext>
-            </a:extLst>
-          </a:blip>
-          <a:stretch>
-            <a:fillRect/>
-          </a:stretch>
-        </p:blipFill>
-        <p:spPr>
-          <a:xfrm>
-            <a:off x="5384800" y="3830320"/>
-            <a:ext cx="635000" cy="635000"/>
-          </a:xfrm>
-          <a:prstGeom prst="rect">
-            <a:avLst/>
-          </a:prstGeom>
-        </p:spPr>
-      </p:pic>
-      <p:pic>
-        <p:nvPicPr>
-          <p:cNvPr id="31" name="Picture 30"/>
-          <p:cNvPicPr>
-            <a:picLocks noChangeAspect="1"/>
-          </p:cNvPicPr>
-          <p:nvPr/>
-        </p:nvPicPr>
-        <p:blipFill>
-          <a:blip r:embed="rId15" cstate="screen">
-            <a:extLst>
-              <a:ext uri="{28A0092B-C50C-407E-A947-70E740481C1C}">
-                <a14:useLocalDpi xmlns:a14="http://schemas.microsoft.com/office/drawing/2010/main"/>
-              </a:ext>
-            </a:extLst>
-          </a:blip>
-          <a:stretch>
-            <a:fillRect/>
-          </a:stretch>
-        </p:blipFill>
-        <p:spPr>
-          <a:xfrm>
-            <a:off x="2133600" y="3098800"/>
-            <a:ext cx="640080" cy="640080"/>
-          </a:xfrm>
-          <a:prstGeom prst="rect">
-            <a:avLst/>
-          </a:prstGeom>
-        </p:spPr>
-      </p:pic>
-      <p:pic>
-        <p:nvPicPr>
-          <p:cNvPr id="8" name="Picture 7" descr="icon_mongodb_cf@2x.png"/>
-          <p:cNvPicPr>
-            <a:picLocks noChangeAspect="1"/>
-          </p:cNvPicPr>
-          <p:nvPr/>
-        </p:nvPicPr>
-        <p:blipFill>
-          <a:blip r:embed="rId16" cstate="screen">
-            <a:extLst>
-              <a:ext uri="{28A0092B-C50C-407E-A947-70E740481C1C}">
-                <a14:useLocalDpi xmlns:a14="http://schemas.microsoft.com/office/drawing/2010/main"/>
-              </a:ext>
-            </a:extLst>
-          </a:blip>
-          <a:stretch>
-            <a:fillRect/>
-          </a:stretch>
-        </p:blipFill>
-        <p:spPr>
-          <a:xfrm>
-            <a:off x="3535680" y="3799840"/>
-            <a:ext cx="640080" cy="640080"/>
-          </a:xfrm>
-          <a:prstGeom prst="rect">
-            <a:avLst/>
-          </a:prstGeom>
-        </p:spPr>
-      </p:pic>
-      <p:pic>
-        <p:nvPicPr>
-          <p:cNvPr id="9" name="Picture 8" descr="icon_node4j_cf@2x.png"/>
-          <p:cNvPicPr>
-            <a:picLocks noChangeAspect="1"/>
-          </p:cNvPicPr>
-          <p:nvPr/>
-        </p:nvPicPr>
-        <p:blipFill>
-          <a:blip r:embed="rId17" cstate="screen">
-            <a:extLst>
-              <a:ext uri="{28A0092B-C50C-407E-A947-70E740481C1C}">
-                <a14:useLocalDpi xmlns:a14="http://schemas.microsoft.com/office/drawing/2010/main"/>
-              </a:ext>
-            </a:extLst>
-          </a:blip>
-          <a:stretch>
-            <a:fillRect/>
-          </a:stretch>
-        </p:blipFill>
-        <p:spPr>
-          <a:xfrm>
-            <a:off x="2133600" y="3799840"/>
-            <a:ext cx="640080" cy="640080"/>
-          </a:xfrm>
-          <a:prstGeom prst="rect">
-            <a:avLst/>
-          </a:prstGeom>
-        </p:spPr>
-      </p:pic>
-      <p:pic>
-        <p:nvPicPr>
-          <p:cNvPr id="35" name="pasted-image.png"/>
-          <p:cNvPicPr/>
-          <p:nvPr/>
-        </p:nvPicPr>
-        <p:blipFill>
-          <a:blip r:embed="rId18" cstate="screen">
-            <a:extLst>
-              <a:ext uri="{28A0092B-C50C-407E-A947-70E740481C1C}">
-                <a14:useLocalDpi xmlns:a14="http://schemas.microsoft.com/office/drawing/2010/main"/>
-              </a:ext>
-            </a:extLst>
-          </a:blip>
-          <a:stretch>
-            <a:fillRect/>
-          </a:stretch>
-        </p:blipFill>
-        <p:spPr>
-          <a:xfrm>
-            <a:off x="7327059" y="1614831"/>
+            <a:off x="7327059" y="1277834"/>
             <a:ext cx="640689" cy="640690"/>
           </a:xfrm>
           <a:prstGeom prst="rect">
@@ -16898,7 +16748,7 @@
           <p:nvPr/>
         </p:nvPicPr>
         <p:blipFill>
-          <a:blip r:embed="rId19" cstate="screen">
+          <a:blip r:embed="rId14" cstate="screen">
             <a:extLst>
               <a:ext uri="{28A0092B-C50C-407E-A947-70E740481C1C}">
                 <a14:useLocalDpi xmlns:a14="http://schemas.microsoft.com/office/drawing/2010/main"/>
@@ -16911,7 +16761,7 @@
         </p:blipFill>
         <p:spPr>
           <a:xfrm>
-            <a:off x="7331951" y="2343467"/>
+            <a:off x="7331951" y="2006470"/>
             <a:ext cx="633413" cy="633413"/>
           </a:xfrm>
           <a:prstGeom prst="rect">
@@ -16931,7 +16781,7 @@
           <p:nvPr/>
         </p:nvPicPr>
         <p:blipFill>
-          <a:blip r:embed="rId20" cstate="screen">
+          <a:blip r:embed="rId15" cstate="screen">
             <a:extLst>
               <a:ext uri="{28A0092B-C50C-407E-A947-70E740481C1C}">
                 <a14:useLocalDpi xmlns:a14="http://schemas.microsoft.com/office/drawing/2010/main"/>
@@ -16944,7 +16794,7 @@
         </p:blipFill>
         <p:spPr>
           <a:xfrm>
-            <a:off x="7334131" y="3085163"/>
+            <a:off x="7334131" y="2748166"/>
             <a:ext cx="633398" cy="633397"/>
           </a:xfrm>
           <a:prstGeom prst="rect">
@@ -16966,7 +16816,7 @@
           <p:nvPr/>
         </p:nvPicPr>
         <p:blipFill>
-          <a:blip r:embed="rId21" cstate="screen">
+          <a:blip r:embed="rId16" cstate="screen">
             <a:extLst>
               <a:ext uri="{28A0092B-C50C-407E-A947-70E740481C1C}">
                 <a14:useLocalDpi xmlns:a14="http://schemas.microsoft.com/office/drawing/2010/main"/>
@@ -16979,7 +16829,7 @@
         </p:blipFill>
         <p:spPr>
           <a:xfrm>
-            <a:off x="3535680" y="3098800"/>
+            <a:off x="3630429" y="2941609"/>
             <a:ext cx="632460" cy="632460"/>
           </a:xfrm>
           <a:prstGeom prst="rect">
@@ -16995,7 +16845,171 @@
         </p:nvSpPr>
         <p:spPr>
           <a:xfrm>
-            <a:off x="985519" y="1625600"/>
+            <a:off x="985519" y="1501513"/>
+            <a:ext cx="1005841" cy="461665"/>
+          </a:xfrm>
+          <a:prstGeom prst="rect">
+            <a:avLst/>
+          </a:prstGeom>
+          <a:noFill/>
+        </p:spPr>
+        <p:txBody>
+          <a:bodyPr wrap="square" rtlCol="0">
+            <a:spAutoFit/>
+          </a:bodyPr>
+          <a:lstStyle/>
+          <a:p>
+            <a:r>
+              <a:rPr lang="en-US" sz="1200" dirty="0" smtClean="0">
+                <a:solidFill>
+                  <a:schemeClr val="accent1"/>
+                </a:solidFill>
+                <a:latin typeface="FreightSans Pro Medium"/>
+                <a:cs typeface="FreightSans Pro Medium"/>
+              </a:rPr>
+              <a:t>API Gateway</a:t>
+            </a:r>
+          </a:p>
+        </p:txBody>
+      </p:sp>
+      <p:sp>
+        <p:nvSpPr>
+          <p:cNvPr id="38" name="TextBox 37"/>
+          <p:cNvSpPr txBox="1"/>
+          <p:nvPr/>
+        </p:nvSpPr>
+        <p:spPr>
+          <a:xfrm>
+            <a:off x="975359" y="2336800"/>
+            <a:ext cx="1036321" cy="461665"/>
+          </a:xfrm>
+          <a:prstGeom prst="rect">
+            <a:avLst/>
+          </a:prstGeom>
+          <a:noFill/>
+        </p:spPr>
+        <p:txBody>
+          <a:bodyPr wrap="square" rtlCol="0">
+            <a:spAutoFit/>
+          </a:bodyPr>
+          <a:lstStyle/>
+          <a:p>
+            <a:r>
+              <a:rPr lang="en-US" sz="1200" dirty="0" smtClean="0">
+                <a:solidFill>
+                  <a:schemeClr val="bg2"/>
+                </a:solidFill>
+                <a:latin typeface="FreightSans Pro Medium"/>
+                <a:cs typeface="FreightSans Pro Medium"/>
+              </a:rPr>
+              <a:t>Push </a:t>
+            </a:r>
+            <a:r>
+              <a:rPr lang="en-US" sz="1200" dirty="0" smtClean="0">
+                <a:solidFill>
+                  <a:schemeClr val="bg2"/>
+                </a:solidFill>
+                <a:latin typeface="FreightSans Pro Medium"/>
+                <a:cs typeface="FreightSans Pro Medium"/>
+              </a:rPr>
+              <a:t>Notifications</a:t>
+            </a:r>
+            <a:endParaRPr lang="en-US" sz="1200" dirty="0" smtClean="0">
+              <a:solidFill>
+                <a:schemeClr val="bg2"/>
+              </a:solidFill>
+              <a:latin typeface="FreightSans Pro Medium"/>
+              <a:cs typeface="FreightSans Pro Medium"/>
+            </a:endParaRPr>
+          </a:p>
+        </p:txBody>
+      </p:sp>
+      <p:sp>
+        <p:nvSpPr>
+          <p:cNvPr id="41" name="TextBox 40"/>
+          <p:cNvSpPr txBox="1"/>
+          <p:nvPr/>
+        </p:nvSpPr>
+        <p:spPr>
+          <a:xfrm>
+            <a:off x="4281291" y="2280357"/>
+            <a:ext cx="910469" cy="276999"/>
+          </a:xfrm>
+          <a:prstGeom prst="rect">
+            <a:avLst/>
+          </a:prstGeom>
+          <a:noFill/>
+        </p:spPr>
+        <p:txBody>
+          <a:bodyPr wrap="square" rtlCol="0">
+            <a:spAutoFit/>
+          </a:bodyPr>
+          <a:lstStyle/>
+          <a:p>
+            <a:r>
+              <a:rPr lang="en-US" sz="1200" dirty="0" err="1" smtClean="0">
+                <a:solidFill>
+                  <a:schemeClr val="bg2"/>
+                </a:solidFill>
+                <a:latin typeface="FreightSans Pro Medium"/>
+                <a:cs typeface="FreightSans Pro Medium"/>
+              </a:rPr>
+              <a:t>RabbitMQ</a:t>
+            </a:r>
+            <a:endParaRPr lang="en-US" sz="1200" dirty="0" smtClean="0">
+              <a:solidFill>
+                <a:schemeClr val="bg2"/>
+              </a:solidFill>
+              <a:latin typeface="FreightSans Pro Medium"/>
+              <a:cs typeface="FreightSans Pro Medium"/>
+            </a:endParaRPr>
+          </a:p>
+        </p:txBody>
+      </p:sp>
+      <p:sp>
+        <p:nvSpPr>
+          <p:cNvPr id="42" name="TextBox 41"/>
+          <p:cNvSpPr txBox="1"/>
+          <p:nvPr/>
+        </p:nvSpPr>
+        <p:spPr>
+          <a:xfrm>
+            <a:off x="5901405" y="1975131"/>
+            <a:ext cx="1005841" cy="461665"/>
+          </a:xfrm>
+          <a:prstGeom prst="rect">
+            <a:avLst/>
+          </a:prstGeom>
+          <a:noFill/>
+        </p:spPr>
+        <p:txBody>
+          <a:bodyPr wrap="square" rtlCol="0">
+            <a:spAutoFit/>
+          </a:bodyPr>
+          <a:lstStyle/>
+          <a:p>
+            <a:r>
+              <a:rPr lang="en-US" sz="1200" dirty="0" smtClean="0">
+                <a:solidFill>
+                  <a:schemeClr val="bg2"/>
+                </a:solidFill>
+                <a:latin typeface="FreightSans Pro Medium"/>
+                <a:cs typeface="FreightSans Pro Medium"/>
+              </a:rPr>
+              <a:t>Jenkins Enterprise</a:t>
+            </a:r>
+          </a:p>
+        </p:txBody>
+      </p:sp>
+      <p:sp>
+        <p:nvSpPr>
+          <p:cNvPr id="43" name="TextBox 42"/>
+          <p:cNvSpPr txBox="1"/>
+          <p:nvPr/>
+        </p:nvSpPr>
+        <p:spPr>
+          <a:xfrm>
+            <a:off x="2733039" y="3108908"/>
             <a:ext cx="1005841" cy="276999"/>
           </a:xfrm>
           <a:prstGeom prst="rect">
@@ -17017,20 +17031,27 @@
                 <a:latin typeface="FreightSans Pro Medium"/>
                 <a:cs typeface="FreightSans Pro Medium"/>
               </a:rPr>
-              <a:t>API Gateway</a:t>
-            </a:r>
+              <a:t>Data Flow</a:t>
+            </a:r>
+            <a:endParaRPr lang="en-US" sz="1200" dirty="0" smtClean="0">
+              <a:solidFill>
+                <a:schemeClr val="bg2"/>
+              </a:solidFill>
+              <a:latin typeface="FreightSans Pro Medium"/>
+              <a:cs typeface="FreightSans Pro Medium"/>
+            </a:endParaRPr>
           </a:p>
         </p:txBody>
       </p:sp>
       <p:sp>
         <p:nvSpPr>
-          <p:cNvPr id="38" name="TextBox 37"/>
+          <p:cNvPr id="45" name="TextBox 44"/>
           <p:cNvSpPr txBox="1"/>
           <p:nvPr/>
         </p:nvSpPr>
         <p:spPr>
           <a:xfrm>
-            <a:off x="975359" y="2336800"/>
+            <a:off x="8006079" y="1375230"/>
             <a:ext cx="1005841" cy="461665"/>
           </a:xfrm>
           <a:prstGeom prst="rect">
@@ -17045,27 +17066,211 @@
           <a:lstStyle/>
           <a:p>
             <a:r>
-              <a:rPr lang="en-US" sz="1200" dirty="0" smtClean="0">
+              <a:rPr lang="en-US" sz="1200" dirty="0" err="1" smtClean="0">
                 <a:solidFill>
                   <a:schemeClr val="bg2"/>
                 </a:solidFill>
                 <a:latin typeface="FreightSans Pro Medium"/>
                 <a:cs typeface="FreightSans Pro Medium"/>
               </a:rPr>
-              <a:t>Push Notification</a:t>
-            </a:r>
+              <a:t>Config</a:t>
+            </a:r>
+            <a:r>
+              <a:rPr lang="en-US" sz="1200" dirty="0" smtClean="0">
+                <a:solidFill>
+                  <a:schemeClr val="bg2"/>
+                </a:solidFill>
+                <a:latin typeface="FreightSans Pro Medium"/>
+                <a:cs typeface="FreightSans Pro Medium"/>
+              </a:rPr>
+              <a:t> </a:t>
+            </a:r>
+            <a:r>
+              <a:rPr lang="en-US" sz="1200" dirty="0" smtClean="0">
+                <a:solidFill>
+                  <a:schemeClr val="bg2"/>
+                </a:solidFill>
+                <a:latin typeface="FreightSans Pro Medium"/>
+                <a:cs typeface="FreightSans Pro Medium"/>
+              </a:rPr>
+              <a:t>Server</a:t>
+            </a:r>
+            <a:endParaRPr lang="en-US" sz="1200" dirty="0" smtClean="0">
+              <a:solidFill>
+                <a:schemeClr val="bg2"/>
+              </a:solidFill>
+              <a:latin typeface="FreightSans Pro Medium"/>
+              <a:cs typeface="FreightSans Pro Medium"/>
+            </a:endParaRPr>
           </a:p>
         </p:txBody>
       </p:sp>
       <p:sp>
         <p:nvSpPr>
-          <p:cNvPr id="39" name="TextBox 38"/>
+          <p:cNvPr id="46" name="TextBox 45"/>
           <p:cNvSpPr txBox="1"/>
           <p:nvPr/>
         </p:nvSpPr>
         <p:spPr>
           <a:xfrm>
-            <a:off x="985519" y="3108960"/>
+            <a:off x="8009287" y="2099799"/>
+            <a:ext cx="1005841" cy="461665"/>
+          </a:xfrm>
+          <a:prstGeom prst="rect">
+            <a:avLst/>
+          </a:prstGeom>
+          <a:noFill/>
+        </p:spPr>
+        <p:txBody>
+          <a:bodyPr wrap="square" rtlCol="0">
+            <a:spAutoFit/>
+          </a:bodyPr>
+          <a:lstStyle/>
+          <a:p>
+            <a:r>
+              <a:rPr lang="en-US" sz="1200" dirty="0" smtClean="0">
+                <a:solidFill>
+                  <a:schemeClr val="bg2"/>
+                </a:solidFill>
+                <a:latin typeface="FreightSans Pro Medium"/>
+                <a:cs typeface="FreightSans Pro Medium"/>
+              </a:rPr>
+              <a:t>Service Directory</a:t>
+            </a:r>
+          </a:p>
+        </p:txBody>
+      </p:sp>
+      <p:sp>
+        <p:nvSpPr>
+          <p:cNvPr id="47" name="TextBox 46"/>
+          <p:cNvSpPr txBox="1"/>
+          <p:nvPr/>
+        </p:nvSpPr>
+        <p:spPr>
+          <a:xfrm>
+            <a:off x="8006079" y="2818486"/>
+            <a:ext cx="1005841" cy="461665"/>
+          </a:xfrm>
+          <a:prstGeom prst="rect">
+            <a:avLst/>
+          </a:prstGeom>
+          <a:noFill/>
+        </p:spPr>
+        <p:txBody>
+          <a:bodyPr wrap="square" rtlCol="0">
+            <a:spAutoFit/>
+          </a:bodyPr>
+          <a:lstStyle/>
+          <a:p>
+            <a:r>
+              <a:rPr lang="en-US" sz="1200" dirty="0" smtClean="0">
+                <a:solidFill>
+                  <a:schemeClr val="bg2"/>
+                </a:solidFill>
+                <a:latin typeface="FreightSans Pro Medium"/>
+                <a:cs typeface="FreightSans Pro Medium"/>
+              </a:rPr>
+              <a:t>Circuit Breaker</a:t>
+            </a:r>
+          </a:p>
+        </p:txBody>
+      </p:sp>
+      <p:sp>
+        <p:nvSpPr>
+          <p:cNvPr id="49" name="TextBox 48"/>
+          <p:cNvSpPr txBox="1"/>
+          <p:nvPr/>
+        </p:nvSpPr>
+        <p:spPr>
+          <a:xfrm>
+            <a:off x="4255483" y="1305560"/>
+            <a:ext cx="1005841" cy="461665"/>
+          </a:xfrm>
+          <a:prstGeom prst="rect">
+            <a:avLst/>
+          </a:prstGeom>
+          <a:noFill/>
+        </p:spPr>
+        <p:txBody>
+          <a:bodyPr wrap="square" rtlCol="0">
+            <a:spAutoFit/>
+          </a:bodyPr>
+          <a:lstStyle/>
+          <a:p>
+            <a:r>
+              <a:rPr lang="en-US" sz="1200" dirty="0" err="1" smtClean="0">
+                <a:solidFill>
+                  <a:schemeClr val="bg2"/>
+                </a:solidFill>
+                <a:latin typeface="FreightSans Pro Medium"/>
+                <a:cs typeface="FreightSans Pro Medium"/>
+              </a:rPr>
+              <a:t>DataStax</a:t>
+            </a:r>
+            <a:r>
+              <a:rPr lang="en-US" sz="1200" dirty="0" smtClean="0">
+                <a:solidFill>
+                  <a:schemeClr val="bg2"/>
+                </a:solidFill>
+                <a:latin typeface="FreightSans Pro Medium"/>
+                <a:cs typeface="FreightSans Pro Medium"/>
+              </a:rPr>
+              <a:t> Cassandra</a:t>
+            </a:r>
+          </a:p>
+        </p:txBody>
+      </p:sp>
+      <p:sp>
+        <p:nvSpPr>
+          <p:cNvPr id="50" name="TextBox 49"/>
+          <p:cNvSpPr txBox="1"/>
+          <p:nvPr/>
+        </p:nvSpPr>
+        <p:spPr>
+          <a:xfrm>
+            <a:off x="4261400" y="3989767"/>
+            <a:ext cx="882314" cy="276999"/>
+          </a:xfrm>
+          <a:prstGeom prst="rect">
+            <a:avLst/>
+          </a:prstGeom>
+          <a:noFill/>
+        </p:spPr>
+        <p:txBody>
+          <a:bodyPr wrap="square" rtlCol="0">
+            <a:spAutoFit/>
+          </a:bodyPr>
+          <a:lstStyle/>
+          <a:p>
+            <a:r>
+              <a:rPr lang="en-US" sz="1200" dirty="0" err="1" smtClean="0">
+                <a:solidFill>
+                  <a:schemeClr val="bg2"/>
+                </a:solidFill>
+                <a:latin typeface="FreightSans Pro Medium"/>
+                <a:cs typeface="FreightSans Pro Medium"/>
+              </a:rPr>
+              <a:t>GemFire</a:t>
+            </a:r>
+            <a:endParaRPr lang="en-US" sz="1200" dirty="0" smtClean="0">
+              <a:solidFill>
+                <a:schemeClr val="bg2"/>
+              </a:solidFill>
+              <a:latin typeface="FreightSans Pro Medium"/>
+              <a:cs typeface="FreightSans Pro Medium"/>
+            </a:endParaRPr>
+          </a:p>
+        </p:txBody>
+      </p:sp>
+      <p:sp>
+        <p:nvSpPr>
+          <p:cNvPr id="52" name="TextBox 51"/>
+          <p:cNvSpPr txBox="1"/>
+          <p:nvPr/>
+        </p:nvSpPr>
+        <p:spPr>
+          <a:xfrm>
+            <a:off x="4267969" y="3108908"/>
             <a:ext cx="1005841" cy="276999"/>
           </a:xfrm>
           <a:prstGeom prst="rect">
@@ -17080,27 +17285,447 @@
           <a:lstStyle/>
           <a:p>
             <a:r>
-              <a:rPr lang="en-US" sz="1200" dirty="0" smtClean="0">
+              <a:rPr lang="en-US" sz="1200" dirty="0" err="1" smtClean="0">
                 <a:solidFill>
                   <a:schemeClr val="bg2"/>
                 </a:solidFill>
                 <a:latin typeface="FreightSans Pro Medium"/>
                 <a:cs typeface="FreightSans Pro Medium"/>
               </a:rPr>
-              <a:t>Data Sync</a:t>
-            </a:r>
+              <a:t>PivotalHD</a:t>
+            </a:r>
+            <a:endParaRPr lang="en-US" sz="1200" dirty="0" smtClean="0">
+              <a:solidFill>
+                <a:schemeClr val="bg2"/>
+              </a:solidFill>
+              <a:latin typeface="FreightSans Pro Medium"/>
+              <a:cs typeface="FreightSans Pro Medium"/>
+            </a:endParaRPr>
           </a:p>
         </p:txBody>
       </p:sp>
       <p:sp>
         <p:nvSpPr>
-          <p:cNvPr id="40" name="TextBox 39"/>
+          <p:cNvPr id="53" name="TextBox 52"/>
           <p:cNvSpPr txBox="1"/>
           <p:nvPr/>
         </p:nvSpPr>
         <p:spPr>
           <a:xfrm>
-            <a:off x="985519" y="3840480"/>
+            <a:off x="2722879" y="1432833"/>
+            <a:ext cx="1005841" cy="276999"/>
+          </a:xfrm>
+          <a:prstGeom prst="rect">
+            <a:avLst/>
+          </a:prstGeom>
+          <a:noFill/>
+        </p:spPr>
+        <p:txBody>
+          <a:bodyPr wrap="square" rtlCol="0">
+            <a:spAutoFit/>
+          </a:bodyPr>
+          <a:lstStyle/>
+          <a:p>
+            <a:r>
+              <a:rPr lang="en-US" sz="1200" dirty="0" err="1" smtClean="0">
+                <a:solidFill>
+                  <a:schemeClr val="bg2"/>
+                </a:solidFill>
+                <a:latin typeface="FreightSans Pro Medium"/>
+                <a:cs typeface="FreightSans Pro Medium"/>
+              </a:rPr>
+              <a:t>Redis</a:t>
+            </a:r>
+            <a:endParaRPr lang="en-US" sz="1200" dirty="0" smtClean="0">
+              <a:solidFill>
+                <a:schemeClr val="bg2"/>
+              </a:solidFill>
+              <a:latin typeface="FreightSans Pro Medium"/>
+              <a:cs typeface="FreightSans Pro Medium"/>
+            </a:endParaRPr>
+          </a:p>
+        </p:txBody>
+      </p:sp>
+      <p:sp>
+        <p:nvSpPr>
+          <p:cNvPr id="54" name="TextBox 53"/>
+          <p:cNvSpPr txBox="1"/>
+          <p:nvPr/>
+        </p:nvSpPr>
+        <p:spPr>
+          <a:xfrm>
+            <a:off x="2722879" y="2304048"/>
+            <a:ext cx="1005841" cy="276999"/>
+          </a:xfrm>
+          <a:prstGeom prst="rect">
+            <a:avLst/>
+          </a:prstGeom>
+          <a:noFill/>
+        </p:spPr>
+        <p:txBody>
+          <a:bodyPr wrap="square" rtlCol="0">
+            <a:spAutoFit/>
+          </a:bodyPr>
+          <a:lstStyle/>
+          <a:p>
+            <a:r>
+              <a:rPr lang="en-US" sz="1200" dirty="0" smtClean="0">
+                <a:solidFill>
+                  <a:schemeClr val="bg2"/>
+                </a:solidFill>
+                <a:latin typeface="FreightSans Pro Medium"/>
+                <a:cs typeface="FreightSans Pro Medium"/>
+              </a:rPr>
+              <a:t>MySQL</a:t>
+            </a:r>
+          </a:p>
+        </p:txBody>
+      </p:sp>
+      <p:sp>
+        <p:nvSpPr>
+          <p:cNvPr id="56" name="TextBox 55"/>
+          <p:cNvSpPr txBox="1"/>
+          <p:nvPr/>
+        </p:nvSpPr>
+        <p:spPr>
+          <a:xfrm>
+            <a:off x="2725633" y="3779753"/>
+            <a:ext cx="934721" cy="646331"/>
+          </a:xfrm>
+          <a:prstGeom prst="rect">
+            <a:avLst/>
+          </a:prstGeom>
+          <a:noFill/>
+        </p:spPr>
+        <p:txBody>
+          <a:bodyPr wrap="square" rtlCol="0">
+            <a:spAutoFit/>
+          </a:bodyPr>
+          <a:lstStyle/>
+          <a:p>
+            <a:r>
+              <a:rPr lang="en-US" sz="1200" dirty="0" smtClean="0">
+                <a:solidFill>
+                  <a:schemeClr val="bg2"/>
+                </a:solidFill>
+                <a:latin typeface="FreightSans Pro Medium"/>
+                <a:cs typeface="FreightSans Pro Medium"/>
+              </a:rPr>
+              <a:t>Session </a:t>
+            </a:r>
+            <a:r>
+              <a:rPr lang="en-US" sz="1200" dirty="0" smtClean="0">
+                <a:solidFill>
+                  <a:schemeClr val="bg2"/>
+                </a:solidFill>
+                <a:latin typeface="FreightSans Pro Medium"/>
+                <a:cs typeface="FreightSans Pro Medium"/>
+              </a:rPr>
+              <a:t>state caching</a:t>
+            </a:r>
+            <a:endParaRPr lang="en-US" sz="1000" dirty="0" smtClean="0">
+              <a:solidFill>
+                <a:schemeClr val="bg2"/>
+              </a:solidFill>
+              <a:latin typeface="FreightSans Pro Medium"/>
+              <a:cs typeface="FreightSans Pro Medium"/>
+            </a:endParaRPr>
+          </a:p>
+        </p:txBody>
+      </p:sp>
+      <p:sp>
+        <p:nvSpPr>
+          <p:cNvPr id="48" name="Rectangle 47"/>
+          <p:cNvSpPr/>
+          <p:nvPr/>
+        </p:nvSpPr>
+        <p:spPr>
+          <a:xfrm>
+            <a:off x="142240" y="3129727"/>
+            <a:ext cx="1869440" cy="1421954"/>
+          </a:xfrm>
+          <a:prstGeom prst="rect">
+            <a:avLst/>
+          </a:prstGeom>
+          <a:solidFill>
+            <a:srgbClr val="D9D9D9"/>
+          </a:solidFill>
+          <a:ln w="12700">
+            <a:solidFill>
+              <a:schemeClr val="bg2"/>
+            </a:solidFill>
+          </a:ln>
+        </p:spPr>
+        <p:style>
+          <a:lnRef idx="2">
+            <a:schemeClr val="accent1">
+              <a:shade val="50000"/>
+            </a:schemeClr>
+          </a:lnRef>
+          <a:fillRef idx="1">
+            <a:schemeClr val="accent1"/>
+          </a:fillRef>
+          <a:effectRef idx="0">
+            <a:schemeClr val="accent1"/>
+          </a:effectRef>
+          <a:fontRef idx="minor">
+            <a:schemeClr val="lt1"/>
+          </a:fontRef>
+        </p:style>
+        <p:txBody>
+          <a:bodyPr rtlCol="0" anchor="t"/>
+          <a:lstStyle/>
+          <a:p>
+            <a:pPr algn="ctr"/>
+            <a:r>
+              <a:rPr lang="en-US" sz="1800" b="1" dirty="0" smtClean="0">
+                <a:solidFill>
+                  <a:schemeClr val="tx2"/>
+                </a:solidFill>
+              </a:rPr>
+              <a:t>Security</a:t>
+            </a:r>
+            <a:endParaRPr lang="en-US" dirty="0" smtClean="0">
+              <a:solidFill>
+                <a:schemeClr val="tx2"/>
+              </a:solidFill>
+            </a:endParaRPr>
+          </a:p>
+        </p:txBody>
+      </p:sp>
+      <p:pic>
+        <p:nvPicPr>
+          <p:cNvPr id="57" name="Picture 56"/>
+          <p:cNvPicPr>
+            <a:picLocks noChangeAspect="1"/>
+          </p:cNvPicPr>
+          <p:nvPr/>
+        </p:nvPicPr>
+        <p:blipFill>
+          <a:blip r:embed="rId17" cstate="screen">
+            <a:alphaModFix/>
+            <a:extLst>
+              <a:ext uri="{28A0092B-C50C-407E-A947-70E740481C1C}">
+                <a14:useLocalDpi xmlns:a14="http://schemas.microsoft.com/office/drawing/2010/main"/>
+              </a:ext>
+            </a:extLst>
+          </a:blip>
+          <a:stretch>
+            <a:fillRect/>
+          </a:stretch>
+        </p:blipFill>
+        <p:spPr>
+          <a:xfrm>
+            <a:off x="239486" y="3675380"/>
+            <a:ext cx="635000" cy="635000"/>
+          </a:xfrm>
+          <a:prstGeom prst="rect">
+            <a:avLst/>
+          </a:prstGeom>
+        </p:spPr>
+      </p:pic>
+      <p:sp>
+        <p:nvSpPr>
+          <p:cNvPr id="58" name="TextBox 57"/>
+          <p:cNvSpPr txBox="1"/>
+          <p:nvPr/>
+        </p:nvSpPr>
+        <p:spPr>
+          <a:xfrm>
+            <a:off x="807357" y="3799840"/>
+            <a:ext cx="1173843" cy="276999"/>
+          </a:xfrm>
+          <a:prstGeom prst="rect">
+            <a:avLst/>
+          </a:prstGeom>
+          <a:noFill/>
+        </p:spPr>
+        <p:txBody>
+          <a:bodyPr wrap="square" rtlCol="0">
+            <a:spAutoFit/>
+          </a:bodyPr>
+          <a:lstStyle/>
+          <a:p>
+            <a:r>
+              <a:rPr lang="en-US" sz="1200" dirty="0" smtClean="0">
+                <a:solidFill>
+                  <a:schemeClr val="bg2"/>
+                </a:solidFill>
+                <a:latin typeface="FreightSans Pro Medium"/>
+                <a:cs typeface="FreightSans Pro Medium"/>
+              </a:rPr>
+              <a:t>Single Sign-on</a:t>
+            </a:r>
+          </a:p>
+        </p:txBody>
+      </p:sp>
+      <p:sp>
+        <p:nvSpPr>
+          <p:cNvPr id="59" name="Rectangle 58"/>
+          <p:cNvSpPr/>
+          <p:nvPr/>
+        </p:nvSpPr>
+        <p:spPr>
+          <a:xfrm>
+            <a:off x="5189572" y="2739867"/>
+            <a:ext cx="1879600" cy="1823695"/>
+          </a:xfrm>
+          <a:prstGeom prst="rect">
+            <a:avLst/>
+          </a:prstGeom>
+          <a:solidFill>
+            <a:srgbClr val="D9D9D9"/>
+          </a:solidFill>
+          <a:ln w="12700">
+            <a:solidFill>
+              <a:schemeClr val="bg2"/>
+            </a:solidFill>
+          </a:ln>
+        </p:spPr>
+        <p:style>
+          <a:lnRef idx="2">
+            <a:schemeClr val="accent1">
+              <a:shade val="50000"/>
+            </a:schemeClr>
+          </a:lnRef>
+          <a:fillRef idx="1">
+            <a:schemeClr val="accent1"/>
+          </a:fillRef>
+          <a:effectRef idx="0">
+            <a:schemeClr val="accent1"/>
+          </a:effectRef>
+          <a:fontRef idx="minor">
+            <a:schemeClr val="lt1"/>
+          </a:fontRef>
+        </p:style>
+        <p:txBody>
+          <a:bodyPr rtlCol="0" anchor="t"/>
+          <a:lstStyle/>
+          <a:p>
+            <a:pPr algn="ctr"/>
+            <a:r>
+              <a:rPr lang="en-US" sz="1800" b="1" dirty="0" smtClean="0">
+                <a:solidFill>
+                  <a:srgbClr val="000000"/>
+                </a:solidFill>
+              </a:rPr>
+              <a:t>Monitoring</a:t>
+            </a:r>
+            <a:endParaRPr lang="en-US" sz="2000" b="1" dirty="0" smtClean="0">
+              <a:solidFill>
+                <a:srgbClr val="000000"/>
+              </a:solidFill>
+            </a:endParaRPr>
+          </a:p>
+          <a:p>
+            <a:pPr algn="ctr"/>
+            <a:endParaRPr lang="en-US" dirty="0"/>
+          </a:p>
+        </p:txBody>
+      </p:sp>
+      <p:sp>
+        <p:nvSpPr>
+          <p:cNvPr id="60" name="TextBox 59"/>
+          <p:cNvSpPr txBox="1"/>
+          <p:nvPr/>
+        </p:nvSpPr>
+        <p:spPr>
+          <a:xfrm>
+            <a:off x="5913891" y="1415780"/>
+            <a:ext cx="944110" cy="276999"/>
+          </a:xfrm>
+          <a:prstGeom prst="rect">
+            <a:avLst/>
+          </a:prstGeom>
+          <a:noFill/>
+        </p:spPr>
+        <p:txBody>
+          <a:bodyPr wrap="square" rtlCol="0">
+            <a:spAutoFit/>
+          </a:bodyPr>
+          <a:lstStyle/>
+          <a:p>
+            <a:r>
+              <a:rPr lang="en-US" sz="1200" dirty="0" err="1" smtClean="0">
+                <a:solidFill>
+                  <a:schemeClr val="bg2"/>
+                </a:solidFill>
+                <a:latin typeface="FreightSans Pro Medium"/>
+                <a:cs typeface="FreightSans Pro Medium"/>
+              </a:rPr>
+              <a:t>Git</a:t>
+            </a:r>
+            <a:r>
+              <a:rPr lang="en-US" sz="1200" dirty="0" smtClean="0">
+                <a:solidFill>
+                  <a:schemeClr val="bg2"/>
+                </a:solidFill>
+                <a:latin typeface="FreightSans Pro Medium"/>
+                <a:cs typeface="FreightSans Pro Medium"/>
+              </a:rPr>
+              <a:t> Lab</a:t>
+            </a:r>
+            <a:endParaRPr lang="en-US" sz="1200" dirty="0" smtClean="0">
+              <a:solidFill>
+                <a:schemeClr val="bg2"/>
+              </a:solidFill>
+              <a:latin typeface="FreightSans Pro Medium"/>
+              <a:cs typeface="FreightSans Pro Medium"/>
+            </a:endParaRPr>
+          </a:p>
+        </p:txBody>
+      </p:sp>
+      <p:sp>
+        <p:nvSpPr>
+          <p:cNvPr id="62" name="TextBox 61"/>
+          <p:cNvSpPr txBox="1"/>
+          <p:nvPr/>
+        </p:nvSpPr>
+        <p:spPr>
+          <a:xfrm>
+            <a:off x="5972803" y="4117925"/>
+            <a:ext cx="1005841" cy="276999"/>
+          </a:xfrm>
+          <a:prstGeom prst="rect">
+            <a:avLst/>
+          </a:prstGeom>
+          <a:noFill/>
+        </p:spPr>
+        <p:txBody>
+          <a:bodyPr wrap="square" rtlCol="0">
+            <a:spAutoFit/>
+          </a:bodyPr>
+          <a:lstStyle/>
+          <a:p>
+            <a:r>
+              <a:rPr lang="en-US" sz="1200" dirty="0" smtClean="0">
+                <a:solidFill>
+                  <a:schemeClr val="bg2"/>
+                </a:solidFill>
+                <a:latin typeface="FreightSans Pro Medium"/>
+                <a:cs typeface="FreightSans Pro Medium"/>
+              </a:rPr>
+              <a:t>New Relic</a:t>
+            </a:r>
+            <a:endParaRPr lang="en-US" sz="1200" dirty="0" smtClean="0">
+              <a:solidFill>
+                <a:schemeClr val="bg2"/>
+              </a:solidFill>
+              <a:latin typeface="FreightSans Pro Medium"/>
+              <a:cs typeface="FreightSans Pro Medium"/>
+            </a:endParaRPr>
+          </a:p>
+        </p:txBody>
+      </p:sp>
+      <p:sp>
+        <p:nvSpPr>
+          <p:cNvPr id="63" name="TextBox 62"/>
+          <p:cNvSpPr txBox="1"/>
+          <p:nvPr/>
+        </p:nvSpPr>
+        <p:spPr>
+          <a:xfrm>
+            <a:off x="5972803" y="3226168"/>
             <a:ext cx="1005841" cy="461665"/>
           </a:xfrm>
           <a:prstGeom prst="rect">
@@ -17122,21 +17747,181 @@
                 <a:latin typeface="FreightSans Pro Medium"/>
                 <a:cs typeface="FreightSans Pro Medium"/>
               </a:rPr>
-              <a:t>App Distribution</a:t>
-            </a:r>
+              <a:t>ELK (</a:t>
+            </a:r>
+            <a:r>
+              <a:rPr lang="en-US" sz="1200" dirty="0" err="1" smtClean="0">
+                <a:solidFill>
+                  <a:schemeClr val="bg2"/>
+                </a:solidFill>
+                <a:latin typeface="FreightSans Pro Medium"/>
+                <a:cs typeface="FreightSans Pro Medium"/>
+              </a:rPr>
+              <a:t>StayUp.io</a:t>
+            </a:r>
+            <a:r>
+              <a:rPr lang="en-US" sz="1200" dirty="0" smtClean="0">
+                <a:solidFill>
+                  <a:schemeClr val="bg2"/>
+                </a:solidFill>
+                <a:latin typeface="FreightSans Pro Medium"/>
+                <a:cs typeface="FreightSans Pro Medium"/>
+              </a:rPr>
+              <a:t>)</a:t>
+            </a:r>
+            <a:endParaRPr lang="en-US" sz="1200" dirty="0" smtClean="0">
+              <a:solidFill>
+                <a:schemeClr val="bg2"/>
+              </a:solidFill>
+              <a:latin typeface="FreightSans Pro Medium"/>
+              <a:cs typeface="FreightSans Pro Medium"/>
+            </a:endParaRPr>
           </a:p>
         </p:txBody>
       </p:sp>
+      <p:pic>
+        <p:nvPicPr>
+          <p:cNvPr id="30" name="Picture 29" descr="gitlab.png"/>
+          <p:cNvPicPr>
+            <a:picLocks noChangeAspect="1"/>
+          </p:cNvPicPr>
+          <p:nvPr/>
+        </p:nvPicPr>
+        <p:blipFill>
+          <a:blip r:embed="rId18">
+            <a:extLst>
+              <a:ext uri="{28A0092B-C50C-407E-A947-70E740481C1C}">
+                <a14:useLocalDpi xmlns:a14="http://schemas.microsoft.com/office/drawing/2010/main" val="0"/>
+              </a:ext>
+            </a:extLst>
+          </a:blip>
+          <a:stretch>
+            <a:fillRect/>
+          </a:stretch>
+        </p:blipFill>
+        <p:spPr>
+          <a:xfrm>
+            <a:off x="5261324" y="1215207"/>
+            <a:ext cx="640081" cy="640081"/>
+          </a:xfrm>
+          <a:prstGeom prst="rect">
+            <a:avLst/>
+          </a:prstGeom>
+        </p:spPr>
+      </p:pic>
+      <p:pic>
+        <p:nvPicPr>
+          <p:cNvPr id="32" name="Picture 31" descr="elk.png"/>
+          <p:cNvPicPr>
+            <a:picLocks noChangeAspect="1"/>
+          </p:cNvPicPr>
+          <p:nvPr/>
+        </p:nvPicPr>
+        <p:blipFill>
+          <a:blip r:embed="rId19">
+            <a:extLst>
+              <a:ext uri="{28A0092B-C50C-407E-A947-70E740481C1C}">
+                <a14:useLocalDpi xmlns:a14="http://schemas.microsoft.com/office/drawing/2010/main" val="0"/>
+              </a:ext>
+            </a:extLst>
+          </a:blip>
+          <a:stretch>
+            <a:fillRect/>
+          </a:stretch>
+        </p:blipFill>
+        <p:spPr>
+          <a:xfrm>
+            <a:off x="5274646" y="3129726"/>
+            <a:ext cx="639244" cy="636325"/>
+          </a:xfrm>
+          <a:prstGeom prst="rect">
+            <a:avLst/>
+          </a:prstGeom>
+        </p:spPr>
+      </p:pic>
+      <p:pic>
+        <p:nvPicPr>
+          <p:cNvPr id="70" name="Picture 69" descr="newrelic.png"/>
+          <p:cNvPicPr>
+            <a:picLocks noChangeAspect="1"/>
+          </p:cNvPicPr>
+          <p:nvPr/>
+        </p:nvPicPr>
+        <p:blipFill>
+          <a:blip r:embed="rId20">
+            <a:extLst>
+              <a:ext uri="{28A0092B-C50C-407E-A947-70E740481C1C}">
+                <a14:useLocalDpi xmlns:a14="http://schemas.microsoft.com/office/drawing/2010/main" val="0"/>
+              </a:ext>
+            </a:extLst>
+          </a:blip>
+          <a:stretch>
+            <a:fillRect/>
+          </a:stretch>
+        </p:blipFill>
+        <p:spPr>
+          <a:xfrm>
+            <a:off x="5287132" y="3858465"/>
+            <a:ext cx="626759" cy="626759"/>
+          </a:xfrm>
+          <a:prstGeom prst="rect">
+            <a:avLst/>
+          </a:prstGeom>
+        </p:spPr>
+      </p:pic>
+      <p:pic>
+        <p:nvPicPr>
+          <p:cNvPr id="72" name="Picture 2" descr="http://photos4.meetupstatic.com/photos/event/7/8/f/c/global_249990972.jpeg"/>
+          <p:cNvPicPr>
+            <a:picLocks noChangeAspect="1" noChangeArrowheads="1"/>
+          </p:cNvPicPr>
+          <p:nvPr/>
+        </p:nvPicPr>
+        <p:blipFill>
+          <a:blip r:embed="rId21" cstate="print">
+            <a:extLst>
+              <a:ext uri="{28A0092B-C50C-407E-A947-70E740481C1C}">
+                <a14:useLocalDpi xmlns:a14="http://schemas.microsoft.com/office/drawing/2010/main" val="0"/>
+              </a:ext>
+            </a:extLst>
+          </a:blip>
+          <a:srcRect/>
+          <a:stretch>
+            <a:fillRect/>
+          </a:stretch>
+        </p:blipFill>
+        <p:spPr bwMode="auto">
+          <a:xfrm>
+            <a:off x="8260969" y="3836140"/>
+            <a:ext cx="583693" cy="583693"/>
+          </a:xfrm>
+          <a:prstGeom prst="roundRect">
+            <a:avLst>
+              <a:gd name="adj" fmla="val 22615"/>
+            </a:avLst>
+          </a:prstGeom>
+          <a:solidFill>
+            <a:srgbClr val="FFFFFF">
+              <a:shade val="85000"/>
+            </a:srgbClr>
+          </a:solidFill>
+          <a:ln>
+            <a:noFill/>
+          </a:ln>
+          <a:effectLst/>
+          <a:extLst/>
+        </p:spPr>
+      </p:pic>
       <p:sp>
         <p:nvSpPr>
-          <p:cNvPr id="41" name="TextBox 40"/>
+          <p:cNvPr id="73" name="TextBox 72"/>
           <p:cNvSpPr txBox="1"/>
           <p:nvPr/>
         </p:nvSpPr>
         <p:spPr>
           <a:xfrm>
-            <a:off x="6082096" y="1759284"/>
-            <a:ext cx="1005841" cy="276999"/>
+            <a:off x="7276738" y="3993535"/>
+            <a:ext cx="1127883" cy="276999"/>
           </a:xfrm>
           <a:prstGeom prst="rect">
             <a:avLst/>
@@ -17150,563 +17935,18 @@
           <a:lstStyle/>
           <a:p>
             <a:r>
-              <a:rPr lang="en-US" sz="1200" dirty="0" err="1" smtClean="0">
-                <a:solidFill>
-                  <a:schemeClr val="bg2"/>
+              <a:rPr lang="en-US" sz="1200" dirty="0" smtClean="0">
+                <a:solidFill>
+                  <a:schemeClr val="tx1"/>
                 </a:solidFill>
                 <a:latin typeface="FreightSans Pro Medium"/>
                 <a:cs typeface="FreightSans Pro Medium"/>
               </a:rPr>
-              <a:t>RabbitMQ</a:t>
+              <a:t>Powered by</a:t>
             </a:r>
             <a:endParaRPr lang="en-US" sz="1200" dirty="0" smtClean="0">
               <a:solidFill>
-                <a:schemeClr val="bg2"/>
-              </a:solidFill>
-              <a:latin typeface="FreightSans Pro Medium"/>
-              <a:cs typeface="FreightSans Pro Medium"/>
-            </a:endParaRPr>
-          </a:p>
-        </p:txBody>
-      </p:sp>
-      <p:sp>
-        <p:nvSpPr>
-          <p:cNvPr id="42" name="TextBox 41"/>
-          <p:cNvSpPr txBox="1"/>
-          <p:nvPr/>
-        </p:nvSpPr>
-        <p:spPr>
-          <a:xfrm>
-            <a:off x="6045199" y="2336800"/>
-            <a:ext cx="1005841" cy="461665"/>
-          </a:xfrm>
-          <a:prstGeom prst="rect">
-            <a:avLst/>
-          </a:prstGeom>
-          <a:noFill/>
-        </p:spPr>
-        <p:txBody>
-          <a:bodyPr wrap="square" rtlCol="0">
-            <a:spAutoFit/>
-          </a:bodyPr>
-          <a:lstStyle/>
-          <a:p>
-            <a:r>
-              <a:rPr lang="en-US" sz="1200" dirty="0" smtClean="0">
-                <a:solidFill>
-                  <a:schemeClr val="bg2"/>
-                </a:solidFill>
-                <a:latin typeface="FreightSans Pro Medium"/>
-                <a:cs typeface="FreightSans Pro Medium"/>
-              </a:rPr>
-              <a:t>Jenkins Enterprise</a:t>
-            </a:r>
-          </a:p>
-        </p:txBody>
-      </p:sp>
-      <p:sp>
-        <p:nvSpPr>
-          <p:cNvPr id="43" name="TextBox 42"/>
-          <p:cNvSpPr txBox="1"/>
-          <p:nvPr/>
-        </p:nvSpPr>
-        <p:spPr>
-          <a:xfrm>
-            <a:off x="6055359" y="3256012"/>
-            <a:ext cx="1005841" cy="276999"/>
-          </a:xfrm>
-          <a:prstGeom prst="rect">
-            <a:avLst/>
-          </a:prstGeom>
-          <a:noFill/>
-        </p:spPr>
-        <p:txBody>
-          <a:bodyPr wrap="square" rtlCol="0">
-            <a:spAutoFit/>
-          </a:bodyPr>
-          <a:lstStyle/>
-          <a:p>
-            <a:r>
-              <a:rPr lang="en-US" sz="1200" dirty="0" smtClean="0">
-                <a:solidFill>
-                  <a:schemeClr val="bg2"/>
-                </a:solidFill>
-                <a:latin typeface="FreightSans Pro Medium"/>
-                <a:cs typeface="FreightSans Pro Medium"/>
-              </a:rPr>
-              <a:t>Spring XD</a:t>
-            </a:r>
-          </a:p>
-        </p:txBody>
-      </p:sp>
-      <p:sp>
-        <p:nvSpPr>
-          <p:cNvPr id="44" name="TextBox 43"/>
-          <p:cNvSpPr txBox="1"/>
-          <p:nvPr/>
-        </p:nvSpPr>
-        <p:spPr>
-          <a:xfrm>
-            <a:off x="6055359" y="3840480"/>
-            <a:ext cx="1005841" cy="461665"/>
-          </a:xfrm>
-          <a:prstGeom prst="rect">
-            <a:avLst/>
-          </a:prstGeom>
-          <a:noFill/>
-        </p:spPr>
-        <p:txBody>
-          <a:bodyPr wrap="square" rtlCol="0">
-            <a:spAutoFit/>
-          </a:bodyPr>
-          <a:lstStyle/>
-          <a:p>
-            <a:r>
-              <a:rPr lang="en-US" sz="1200" dirty="0" smtClean="0">
-                <a:solidFill>
-                  <a:schemeClr val="bg2"/>
-                </a:solidFill>
-                <a:latin typeface="FreightSans Pro Medium"/>
-                <a:cs typeface="FreightSans Pro Medium"/>
-              </a:rPr>
-              <a:t>Single Sign-on</a:t>
-            </a:r>
-          </a:p>
-        </p:txBody>
-      </p:sp>
-      <p:sp>
-        <p:nvSpPr>
-          <p:cNvPr id="45" name="TextBox 44"/>
-          <p:cNvSpPr txBox="1"/>
-          <p:nvPr/>
-        </p:nvSpPr>
-        <p:spPr>
-          <a:xfrm>
-            <a:off x="8006079" y="1712227"/>
-            <a:ext cx="1005841" cy="461665"/>
-          </a:xfrm>
-          <a:prstGeom prst="rect">
-            <a:avLst/>
-          </a:prstGeom>
-          <a:noFill/>
-        </p:spPr>
-        <p:txBody>
-          <a:bodyPr wrap="square" rtlCol="0">
-            <a:spAutoFit/>
-          </a:bodyPr>
-          <a:lstStyle/>
-          <a:p>
-            <a:r>
-              <a:rPr lang="en-US" sz="1200" dirty="0" err="1" smtClean="0">
-                <a:solidFill>
-                  <a:schemeClr val="bg2"/>
-                </a:solidFill>
-                <a:latin typeface="FreightSans Pro Medium"/>
-                <a:cs typeface="FreightSans Pro Medium"/>
-              </a:rPr>
-              <a:t>Config</a:t>
-            </a:r>
-            <a:r>
-              <a:rPr lang="en-US" sz="1200" dirty="0" smtClean="0">
-                <a:solidFill>
-                  <a:schemeClr val="bg2"/>
-                </a:solidFill>
-                <a:latin typeface="FreightSans Pro Medium"/>
-                <a:cs typeface="FreightSans Pro Medium"/>
-              </a:rPr>
-              <a:t> Server</a:t>
-            </a:r>
-          </a:p>
-        </p:txBody>
-      </p:sp>
-      <p:sp>
-        <p:nvSpPr>
-          <p:cNvPr id="46" name="TextBox 45"/>
-          <p:cNvSpPr txBox="1"/>
-          <p:nvPr/>
-        </p:nvSpPr>
-        <p:spPr>
-          <a:xfrm>
-            <a:off x="8009287" y="2436796"/>
-            <a:ext cx="1005841" cy="461665"/>
-          </a:xfrm>
-          <a:prstGeom prst="rect">
-            <a:avLst/>
-          </a:prstGeom>
-          <a:noFill/>
-        </p:spPr>
-        <p:txBody>
-          <a:bodyPr wrap="square" rtlCol="0">
-            <a:spAutoFit/>
-          </a:bodyPr>
-          <a:lstStyle/>
-          <a:p>
-            <a:r>
-              <a:rPr lang="en-US" sz="1200" dirty="0" smtClean="0">
-                <a:solidFill>
-                  <a:schemeClr val="bg2"/>
-                </a:solidFill>
-                <a:latin typeface="FreightSans Pro Medium"/>
-                <a:cs typeface="FreightSans Pro Medium"/>
-              </a:rPr>
-              <a:t>Service Directory</a:t>
-            </a:r>
-          </a:p>
-        </p:txBody>
-      </p:sp>
-      <p:sp>
-        <p:nvSpPr>
-          <p:cNvPr id="47" name="TextBox 46"/>
-          <p:cNvSpPr txBox="1"/>
-          <p:nvPr/>
-        </p:nvSpPr>
-        <p:spPr>
-          <a:xfrm>
-            <a:off x="8006079" y="3155483"/>
-            <a:ext cx="1005841" cy="461665"/>
-          </a:xfrm>
-          <a:prstGeom prst="rect">
-            <a:avLst/>
-          </a:prstGeom>
-          <a:noFill/>
-        </p:spPr>
-        <p:txBody>
-          <a:bodyPr wrap="square" rtlCol="0">
-            <a:spAutoFit/>
-          </a:bodyPr>
-          <a:lstStyle/>
-          <a:p>
-            <a:r>
-              <a:rPr lang="en-US" sz="1200" dirty="0" smtClean="0">
-                <a:solidFill>
-                  <a:schemeClr val="bg2"/>
-                </a:solidFill>
-                <a:latin typeface="FreightSans Pro Medium"/>
-                <a:cs typeface="FreightSans Pro Medium"/>
-              </a:rPr>
-              <a:t>Circuit Breaker</a:t>
-            </a:r>
-          </a:p>
-        </p:txBody>
-      </p:sp>
-      <p:sp>
-        <p:nvSpPr>
-          <p:cNvPr id="49" name="TextBox 48"/>
-          <p:cNvSpPr txBox="1"/>
-          <p:nvPr/>
-        </p:nvSpPr>
-        <p:spPr>
-          <a:xfrm>
-            <a:off x="4185919" y="1625600"/>
-            <a:ext cx="1005841" cy="461665"/>
-          </a:xfrm>
-          <a:prstGeom prst="rect">
-            <a:avLst/>
-          </a:prstGeom>
-          <a:noFill/>
-        </p:spPr>
-        <p:txBody>
-          <a:bodyPr wrap="square" rtlCol="0">
-            <a:spAutoFit/>
-          </a:bodyPr>
-          <a:lstStyle/>
-          <a:p>
-            <a:r>
-              <a:rPr lang="en-US" sz="1200" dirty="0" err="1" smtClean="0">
-                <a:solidFill>
-                  <a:schemeClr val="bg2"/>
-                </a:solidFill>
-                <a:latin typeface="FreightSans Pro Medium"/>
-                <a:cs typeface="FreightSans Pro Medium"/>
-              </a:rPr>
-              <a:t>DataStax</a:t>
-            </a:r>
-            <a:r>
-              <a:rPr lang="en-US" sz="1200" dirty="0" smtClean="0">
-                <a:solidFill>
-                  <a:schemeClr val="bg2"/>
-                </a:solidFill>
-                <a:latin typeface="FreightSans Pro Medium"/>
-                <a:cs typeface="FreightSans Pro Medium"/>
-              </a:rPr>
-              <a:t> Cassandra</a:t>
-            </a:r>
-          </a:p>
-        </p:txBody>
-      </p:sp>
-      <p:sp>
-        <p:nvSpPr>
-          <p:cNvPr id="50" name="TextBox 49"/>
-          <p:cNvSpPr txBox="1"/>
-          <p:nvPr/>
-        </p:nvSpPr>
-        <p:spPr>
-          <a:xfrm>
-            <a:off x="4175759" y="2336800"/>
-            <a:ext cx="1005841" cy="276999"/>
-          </a:xfrm>
-          <a:prstGeom prst="rect">
-            <a:avLst/>
-          </a:prstGeom>
-          <a:noFill/>
-        </p:spPr>
-        <p:txBody>
-          <a:bodyPr wrap="square" rtlCol="0">
-            <a:spAutoFit/>
-          </a:bodyPr>
-          <a:lstStyle/>
-          <a:p>
-            <a:r>
-              <a:rPr lang="en-US" sz="1200" dirty="0" err="1" smtClean="0">
-                <a:solidFill>
-                  <a:schemeClr val="bg2"/>
-                </a:solidFill>
-                <a:latin typeface="FreightSans Pro Medium"/>
-                <a:cs typeface="FreightSans Pro Medium"/>
-              </a:rPr>
-              <a:t>GemFire</a:t>
-            </a:r>
-            <a:endParaRPr lang="en-US" sz="1200" dirty="0" smtClean="0">
-              <a:solidFill>
-                <a:schemeClr val="bg2"/>
-              </a:solidFill>
-              <a:latin typeface="FreightSans Pro Medium"/>
-              <a:cs typeface="FreightSans Pro Medium"/>
-            </a:endParaRPr>
-          </a:p>
-        </p:txBody>
-      </p:sp>
-      <p:sp>
-        <p:nvSpPr>
-          <p:cNvPr id="51" name="TextBox 50"/>
-          <p:cNvSpPr txBox="1"/>
-          <p:nvPr/>
-        </p:nvSpPr>
-        <p:spPr>
-          <a:xfrm>
-            <a:off x="4185919" y="3957052"/>
-            <a:ext cx="1005841" cy="276999"/>
-          </a:xfrm>
-          <a:prstGeom prst="rect">
-            <a:avLst/>
-          </a:prstGeom>
-          <a:noFill/>
-        </p:spPr>
-        <p:txBody>
-          <a:bodyPr wrap="square" rtlCol="0">
-            <a:spAutoFit/>
-          </a:bodyPr>
-          <a:lstStyle/>
-          <a:p>
-            <a:r>
-              <a:rPr lang="en-US" sz="1200" dirty="0" err="1" smtClean="0">
-                <a:solidFill>
-                  <a:schemeClr val="bg2"/>
-                </a:solidFill>
-                <a:latin typeface="FreightSans Pro Medium"/>
-                <a:cs typeface="FreightSans Pro Medium"/>
-              </a:rPr>
-              <a:t>MongoDB</a:t>
-            </a:r>
-            <a:endParaRPr lang="en-US" sz="1200" dirty="0" smtClean="0">
-              <a:solidFill>
-                <a:schemeClr val="bg2"/>
-              </a:solidFill>
-              <a:latin typeface="FreightSans Pro Medium"/>
-              <a:cs typeface="FreightSans Pro Medium"/>
-            </a:endParaRPr>
-          </a:p>
-        </p:txBody>
-      </p:sp>
-      <p:sp>
-        <p:nvSpPr>
-          <p:cNvPr id="52" name="TextBox 51"/>
-          <p:cNvSpPr txBox="1"/>
-          <p:nvPr/>
-        </p:nvSpPr>
-        <p:spPr>
-          <a:xfrm>
-            <a:off x="4185919" y="3259221"/>
-            <a:ext cx="1005841" cy="276999"/>
-          </a:xfrm>
-          <a:prstGeom prst="rect">
-            <a:avLst/>
-          </a:prstGeom>
-          <a:noFill/>
-        </p:spPr>
-        <p:txBody>
-          <a:bodyPr wrap="square" rtlCol="0">
-            <a:spAutoFit/>
-          </a:bodyPr>
-          <a:lstStyle/>
-          <a:p>
-            <a:r>
-              <a:rPr lang="en-US" sz="1200" dirty="0" err="1" smtClean="0">
-                <a:solidFill>
-                  <a:schemeClr val="bg2"/>
-                </a:solidFill>
-                <a:latin typeface="FreightSans Pro Medium"/>
-                <a:cs typeface="FreightSans Pro Medium"/>
-              </a:rPr>
-              <a:t>PivotalHD</a:t>
-            </a:r>
-            <a:endParaRPr lang="en-US" sz="1200" dirty="0" smtClean="0">
-              <a:solidFill>
-                <a:schemeClr val="bg2"/>
-              </a:solidFill>
-              <a:latin typeface="FreightSans Pro Medium"/>
-              <a:cs typeface="FreightSans Pro Medium"/>
-            </a:endParaRPr>
-          </a:p>
-        </p:txBody>
-      </p:sp>
-      <p:sp>
-        <p:nvSpPr>
-          <p:cNvPr id="53" name="TextBox 52"/>
-          <p:cNvSpPr txBox="1"/>
-          <p:nvPr/>
-        </p:nvSpPr>
-        <p:spPr>
-          <a:xfrm>
-            <a:off x="2733039" y="1625600"/>
-            <a:ext cx="1005841" cy="276999"/>
-          </a:xfrm>
-          <a:prstGeom prst="rect">
-            <a:avLst/>
-          </a:prstGeom>
-          <a:noFill/>
-        </p:spPr>
-        <p:txBody>
-          <a:bodyPr wrap="square" rtlCol="0">
-            <a:spAutoFit/>
-          </a:bodyPr>
-          <a:lstStyle/>
-          <a:p>
-            <a:r>
-              <a:rPr lang="en-US" sz="1200" dirty="0" err="1" smtClean="0">
-                <a:solidFill>
-                  <a:schemeClr val="bg2"/>
-                </a:solidFill>
-                <a:latin typeface="FreightSans Pro Medium"/>
-                <a:cs typeface="FreightSans Pro Medium"/>
-              </a:rPr>
-              <a:t>Redis</a:t>
-            </a:r>
-            <a:endParaRPr lang="en-US" sz="1200" dirty="0" smtClean="0">
-              <a:solidFill>
-                <a:schemeClr val="bg2"/>
-              </a:solidFill>
-              <a:latin typeface="FreightSans Pro Medium"/>
-              <a:cs typeface="FreightSans Pro Medium"/>
-            </a:endParaRPr>
-          </a:p>
-        </p:txBody>
-      </p:sp>
-      <p:sp>
-        <p:nvSpPr>
-          <p:cNvPr id="54" name="TextBox 53"/>
-          <p:cNvSpPr txBox="1"/>
-          <p:nvPr/>
-        </p:nvSpPr>
-        <p:spPr>
-          <a:xfrm>
-            <a:off x="2722879" y="2336800"/>
-            <a:ext cx="1005841" cy="276999"/>
-          </a:xfrm>
-          <a:prstGeom prst="rect">
-            <a:avLst/>
-          </a:prstGeom>
-          <a:noFill/>
-        </p:spPr>
-        <p:txBody>
-          <a:bodyPr wrap="square" rtlCol="0">
-            <a:spAutoFit/>
-          </a:bodyPr>
-          <a:lstStyle/>
-          <a:p>
-            <a:r>
-              <a:rPr lang="en-US" sz="1200" dirty="0" smtClean="0">
-                <a:solidFill>
-                  <a:schemeClr val="bg2"/>
-                </a:solidFill>
-                <a:latin typeface="FreightSans Pro Medium"/>
-                <a:cs typeface="FreightSans Pro Medium"/>
-              </a:rPr>
-              <a:t>MySQL</a:t>
-            </a:r>
-          </a:p>
-        </p:txBody>
-      </p:sp>
-      <p:sp>
-        <p:nvSpPr>
-          <p:cNvPr id="55" name="TextBox 54"/>
-          <p:cNvSpPr txBox="1"/>
-          <p:nvPr/>
-        </p:nvSpPr>
-        <p:spPr>
-          <a:xfrm>
-            <a:off x="2733039" y="3957053"/>
-            <a:ext cx="1005841" cy="276999"/>
-          </a:xfrm>
-          <a:prstGeom prst="rect">
-            <a:avLst/>
-          </a:prstGeom>
-          <a:noFill/>
-        </p:spPr>
-        <p:txBody>
-          <a:bodyPr wrap="square" rtlCol="0">
-            <a:spAutoFit/>
-          </a:bodyPr>
-          <a:lstStyle/>
-          <a:p>
-            <a:r>
-              <a:rPr lang="en-US" sz="1200" dirty="0" smtClean="0">
-                <a:solidFill>
-                  <a:schemeClr val="bg2"/>
-                </a:solidFill>
-                <a:latin typeface="FreightSans Pro Medium"/>
-                <a:cs typeface="FreightSans Pro Medium"/>
-              </a:rPr>
-              <a:t>Neo4j</a:t>
-            </a:r>
-          </a:p>
-        </p:txBody>
-      </p:sp>
-      <p:sp>
-        <p:nvSpPr>
-          <p:cNvPr id="56" name="TextBox 55"/>
-          <p:cNvSpPr txBox="1"/>
-          <p:nvPr/>
-        </p:nvSpPr>
-        <p:spPr>
-          <a:xfrm>
-            <a:off x="2733039" y="3098800"/>
-            <a:ext cx="934721" cy="646331"/>
-          </a:xfrm>
-          <a:prstGeom prst="rect">
-            <a:avLst/>
-          </a:prstGeom>
-          <a:noFill/>
-        </p:spPr>
-        <p:txBody>
-          <a:bodyPr wrap="square" rtlCol="0">
-            <a:spAutoFit/>
-          </a:bodyPr>
-          <a:lstStyle/>
-          <a:p>
-            <a:r>
-              <a:rPr lang="en-US" sz="1200" dirty="0" smtClean="0">
-                <a:solidFill>
-                  <a:schemeClr val="bg2"/>
-                </a:solidFill>
-                <a:latin typeface="FreightSans Pro Medium"/>
-                <a:cs typeface="FreightSans Pro Medium"/>
-              </a:rPr>
-              <a:t>Session state caching</a:t>
-            </a:r>
-            <a:endParaRPr lang="en-US" sz="1000" dirty="0" smtClean="0">
-              <a:solidFill>
-                <a:schemeClr val="bg2"/>
+                <a:schemeClr val="tx1"/>
               </a:solidFill>
               <a:latin typeface="FreightSans Pro Medium"/>
               <a:cs typeface="FreightSans Pro Medium"/>
@@ -17717,7 +17957,7 @@
     </p:spTree>
     <p:extLst>
       <p:ext uri="{BB962C8B-B14F-4D97-AF65-F5344CB8AC3E}">
-        <p14:creationId xmlns:p14="http://schemas.microsoft.com/office/powerpoint/2010/main" val="4023211362"/>
+        <p14:creationId xmlns:p14="http://schemas.microsoft.com/office/powerpoint/2010/main" val="3509676229"/>
       </p:ext>
     </p:extLst>
   </p:cSld>

</xml_diff>

<commit_message>
Updated with final edits
</commit_message>
<xml_diff>
--- a/presentations/Session_4_Services_Overview.pptx
+++ b/presentations/Session_4_Services_Overview.pptx
@@ -8,7 +8,7 @@
     <p:notesMasterId r:id="rId24"/>
   </p:notesMasterIdLst>
   <p:sldIdLst>
-    <p:sldId id="256" r:id="rId2"/>
+    <p:sldId id="499" r:id="rId2"/>
     <p:sldId id="476" r:id="rId3"/>
     <p:sldId id="477" r:id="rId4"/>
     <p:sldId id="478" r:id="rId5"/>
@@ -249,7 +249,7 @@
       <p14:sectionLst xmlns:p14="http://schemas.microsoft.com/office/powerpoint/2010/main">
         <p14:section name="Architecture and Containers" id="{034C3DF1-856F-4249-ADCC-42CE91373AA9}">
           <p14:sldIdLst>
-            <p14:sldId id="256"/>
+            <p14:sldId id="499"/>
             <p14:sldId id="476"/>
             <p14:sldId id="477"/>
             <p14:sldId id="478"/>
@@ -549,11 +549,11 @@
 </file>
 
 <file path=ppt/notesSlides/notesSlide1.xml><?xml version="1.0" encoding="utf-8"?>
-<p:notes xmlns:a="http://schemas.openxmlformats.org/drawingml/2006/main" xmlns:r="http://schemas.openxmlformats.org/officeDocument/2006/relationships" xmlns:p="http://schemas.openxmlformats.org/presentationml/2006/main" showMasterSp="0" showMasterPhAnim="0">
+<p:notes xmlns:a="http://schemas.openxmlformats.org/drawingml/2006/main" xmlns:r="http://schemas.openxmlformats.org/officeDocument/2006/relationships" xmlns:p="http://schemas.openxmlformats.org/presentationml/2006/main">
   <p:cSld>
     <p:spTree>
       <p:nvGrpSpPr>
-        <p:cNvPr id="1" name="Shape 153"/>
+        <p:cNvPr id="1" name=""/>
         <p:cNvGrpSpPr/>
         <p:nvPr/>
       </p:nvGrpSpPr>
@@ -567,12 +567,12 @@
       </p:grpSpPr>
       <p:sp>
         <p:nvSpPr>
-          <p:cNvPr id="154" name="Shape 154"/>
+          <p:cNvPr id="2" name="Slide Image Placeholder 1"/>
           <p:cNvSpPr>
             <a:spLocks noGrp="1" noRot="1" noChangeAspect="1"/>
           </p:cNvSpPr>
           <p:nvPr>
-            <p:ph type="sldImg" idx="2"/>
+            <p:ph type="sldImg"/>
           </p:nvPr>
         </p:nvSpPr>
         <p:spPr>
@@ -580,78 +580,92 @@
             <a:off x="381000" y="685800"/>
             <a:ext cx="6096000" cy="3429000"/>
           </a:xfrm>
-          <a:custGeom>
-            <a:avLst/>
-            <a:gdLst/>
-            <a:ahLst/>
-            <a:cxnLst/>
-            <a:rect l="0" t="0" r="0" b="0"/>
-            <a:pathLst>
-              <a:path w="120000" h="120000" extrusionOk="0">
-                <a:moveTo>
-                  <a:pt x="0" y="0"/>
-                </a:moveTo>
-                <a:lnTo>
-                  <a:pt x="120000" y="0"/>
-                </a:lnTo>
-                <a:lnTo>
-                  <a:pt x="120000" y="120000"/>
-                </a:lnTo>
-                <a:lnTo>
-                  <a:pt x="0" y="120000"/>
-                </a:lnTo>
-                <a:close/>
-              </a:path>
-            </a:pathLst>
-          </a:custGeom>
-          <a:noFill/>
-          <a:ln w="9525" cap="flat">
-            <a:solidFill>
-              <a:srgbClr val="000000"/>
-            </a:solidFill>
-            <a:prstDash val="solid"/>
-            <a:round/>
-            <a:headEnd type="none" w="med" len="med"/>
-            <a:tailEnd type="none" w="med" len="med"/>
-          </a:ln>
         </p:spPr>
       </p:sp>
       <p:sp>
         <p:nvSpPr>
-          <p:cNvPr id="155" name="Shape 155"/>
-          <p:cNvSpPr txBox="1">
+          <p:cNvPr id="3" name="Notes Placeholder 2"/>
+          <p:cNvSpPr>
             <a:spLocks noGrp="1"/>
           </p:cNvSpPr>
           <p:nvPr>
             <p:ph type="body" idx="1"/>
           </p:nvPr>
         </p:nvSpPr>
+        <p:spPr/>
+        <p:txBody>
+          <a:bodyPr/>
+          <a:lstStyle/>
+          <a:p>
+            <a:pPr>
+              <a:spcBef>
+                <a:spcPts val="1199"/>
+              </a:spcBef>
+              <a:buClr>
+                <a:schemeClr val="dk1"/>
+              </a:buClr>
+              <a:buSzPct val="25000"/>
+            </a:pPr>
+            <a:endParaRPr lang="en-US" sz="1200" dirty="0">
+              <a:solidFill>
+                <a:schemeClr val="dk1"/>
+              </a:solidFill>
+              <a:latin typeface="Verdana"/>
+              <a:ea typeface="Verdana"/>
+              <a:cs typeface="Verdana"/>
+              <a:sym typeface="Verdana"/>
+            </a:endParaRPr>
+          </a:p>
+        </p:txBody>
+      </p:sp>
+      <p:sp>
+        <p:nvSpPr>
+          <p:cNvPr id="4" name="Slide Number Placeholder 3"/>
+          <p:cNvSpPr>
+            <a:spLocks noGrp="1"/>
+          </p:cNvSpPr>
+          <p:nvPr>
+            <p:ph type="sldNum" sz="quarter" idx="10"/>
+          </p:nvPr>
+        </p:nvSpPr>
         <p:spPr>
           <a:xfrm>
-            <a:off x="685800" y="4343400"/>
-            <a:ext cx="5486399" cy="4114800"/>
+            <a:off x="3884613" y="8685213"/>
+            <a:ext cx="2971800" cy="457200"/>
           </a:xfrm>
           <a:prstGeom prst="rect">
             <a:avLst/>
           </a:prstGeom>
         </p:spPr>
         <p:txBody>
-          <a:bodyPr lIns="91425" tIns="91425" rIns="91425" bIns="91425" anchor="t" anchorCtr="0">
-            <a:noAutofit/>
-          </a:bodyPr>
+          <a:bodyPr lIns="91432" tIns="45716" rIns="91432" bIns="45716"/>
           <a:lstStyle/>
           <a:p>
-            <a:pPr>
-              <a:spcBef>
-                <a:spcPts val="0"/>
-              </a:spcBef>
-              <a:buNone/>
-            </a:pPr>
-            <a:endParaRPr/>
+            <a:fld id="{9BEDBE90-FDBE-A44D-9062-5A5D1585D5B8}" type="slidenum">
+              <a:rPr lang="en-US" smtClean="0">
+                <a:solidFill>
+                  <a:prstClr val="black"/>
+                </a:solidFill>
+                <a:latin typeface="Calibri"/>
+              </a:rPr>
+              <a:pPr/>
+              <a:t>1</a:t>
+            </a:fld>
+            <a:endParaRPr lang="en-US">
+              <a:solidFill>
+                <a:prstClr val="black"/>
+              </a:solidFill>
+              <a:latin typeface="Calibri"/>
+            </a:endParaRPr>
           </a:p>
         </p:txBody>
       </p:sp>
     </p:spTree>
+    <p:extLst>
+      <p:ext uri="{BB962C8B-B14F-4D97-AF65-F5344CB8AC3E}">
+        <p14:creationId xmlns:p14="http://schemas.microsoft.com/office/powerpoint/2010/main" val="4023181885"/>
+      </p:ext>
+    </p:extLst>
   </p:cSld>
   <p:clrMapOvr>
     <a:masterClrMapping/>
@@ -2647,91 +2661,6 @@
 </file>
 
 <file path=ppt/slideLayouts/slideLayout10.xml><?xml version="1.0" encoding="utf-8"?>
-<p:sldLayout xmlns:a="http://schemas.openxmlformats.org/drawingml/2006/main" xmlns:r="http://schemas.openxmlformats.org/officeDocument/2006/relationships" xmlns:p="http://schemas.openxmlformats.org/presentationml/2006/main" userDrawn="1">
-  <p:cSld name="Title Only, no circles">
-    <p:spTree>
-      <p:nvGrpSpPr>
-        <p:cNvPr id="1" name=""/>
-        <p:cNvGrpSpPr/>
-        <p:nvPr/>
-      </p:nvGrpSpPr>
-      <p:grpSpPr>
-        <a:xfrm>
-          <a:off x="0" y="0"/>
-          <a:ext cx="0" cy="0"/>
-          <a:chOff x="0" y="0"/>
-          <a:chExt cx="0" cy="0"/>
-        </a:xfrm>
-      </p:grpSpPr>
-      <p:sp>
-        <p:nvSpPr>
-          <p:cNvPr id="4" name="Title 1"/>
-          <p:cNvSpPr>
-            <a:spLocks noGrp="1"/>
-          </p:cNvSpPr>
-          <p:nvPr>
-            <p:ph type="title" hasCustomPrompt="1"/>
-          </p:nvPr>
-        </p:nvSpPr>
-        <p:spPr bwMode="gray">
-          <a:xfrm>
-            <a:off x="366713" y="325438"/>
-            <a:ext cx="8410575" cy="460375"/>
-          </a:xfrm>
-          <a:prstGeom prst="rect">
-            <a:avLst/>
-          </a:prstGeom>
-          <a:noFill/>
-        </p:spPr>
-        <p:txBody>
-          <a:bodyPr lIns="0" tIns="0" rIns="0" bIns="0" anchor="t" anchorCtr="0"/>
-          <a:lstStyle>
-            <a:lvl1pPr>
-              <a:lnSpc>
-                <a:spcPct val="90000"/>
-              </a:lnSpc>
-              <a:defRPr sz="3200">
-                <a:solidFill>
-                  <a:srgbClr val="00685D"/>
-                </a:solidFill>
-                <a:latin typeface="Arial"/>
-                <a:cs typeface="Arial"/>
-              </a:defRPr>
-            </a:lvl1pPr>
-          </a:lstStyle>
-          <a:p>
-            <a:r>
-              <a:rPr lang="en-US" dirty="0" smtClean="0"/>
-              <a:t>Click to Edit Master Title Style</a:t>
-            </a:r>
-            <a:endParaRPr lang="en-US" dirty="0"/>
-          </a:p>
-        </p:txBody>
-      </p:sp>
-    </p:spTree>
-    <p:extLst>
-      <p:ext uri="{BB962C8B-B14F-4D97-AF65-F5344CB8AC3E}">
-        <p14:creationId xmlns:p14="http://schemas.microsoft.com/office/powerpoint/2010/main" val="4161830973"/>
-      </p:ext>
-    </p:extLst>
-  </p:cSld>
-  <p:clrMapOvr>
-    <a:masterClrMapping/>
-  </p:clrMapOvr>
-  <p:transition xmlns:p14="http://schemas.microsoft.com/office/powerpoint/2010/main">
-    <p:fade/>
-  </p:transition>
-  <p:timing>
-    <p:tnLst>
-      <p:par>
-        <p:cTn xmlns:p14="http://schemas.microsoft.com/office/powerpoint/2010/main" id="1" dur="indefinite" restart="never" nodeType="tmRoot"/>
-      </p:par>
-    </p:tnLst>
-  </p:timing>
-</p:sldLayout>
-</file>
-
-<file path=ppt/slideLayouts/slideLayout11.xml><?xml version="1.0" encoding="utf-8"?>
 <p:sldLayout xmlns:a="http://schemas.openxmlformats.org/drawingml/2006/main" xmlns:r="http://schemas.openxmlformats.org/officeDocument/2006/relationships" xmlns:p="http://schemas.openxmlformats.org/presentationml/2006/main" type="tx">
   <p:cSld name="Title and Content">
     <p:spTree>
@@ -2979,7 +2908,7 @@
 </p:sldLayout>
 </file>
 
-<file path=ppt/slideLayouts/slideLayout12.xml><?xml version="1.0" encoding="utf-8"?>
+<file path=ppt/slideLayouts/slideLayout11.xml><?xml version="1.0" encoding="utf-8"?>
 <p:sldLayout xmlns:a="http://schemas.openxmlformats.org/drawingml/2006/main" xmlns:r="http://schemas.openxmlformats.org/officeDocument/2006/relationships" xmlns:p="http://schemas.openxmlformats.org/presentationml/2006/main" userDrawn="1">
   <p:cSld name="Title Only">
     <p:spTree>
@@ -3054,6 +2983,99 @@
   <p:transition xmlns:p14="http://schemas.microsoft.com/office/powerpoint/2010/main">
     <p:fade/>
   </p:transition>
+  <p:timing>
+    <p:tnLst>
+      <p:par>
+        <p:cTn xmlns:p14="http://schemas.microsoft.com/office/powerpoint/2010/main" id="1" dur="indefinite" restart="never" nodeType="tmRoot"/>
+      </p:par>
+    </p:tnLst>
+  </p:timing>
+</p:sldLayout>
+</file>
+
+<file path=ppt/slideLayouts/slideLayout12.xml><?xml version="1.0" encoding="utf-8"?>
+<p:sldLayout xmlns:a="http://schemas.openxmlformats.org/drawingml/2006/main" xmlns:r="http://schemas.openxmlformats.org/officeDocument/2006/relationships" xmlns:p="http://schemas.openxmlformats.org/presentationml/2006/main" userDrawn="1">
+  <p:cSld name=" Blank logo">
+    <p:spTree>
+      <p:nvGrpSpPr>
+        <p:cNvPr id="1" name=""/>
+        <p:cNvGrpSpPr/>
+        <p:nvPr/>
+      </p:nvGrpSpPr>
+      <p:grpSpPr>
+        <a:xfrm>
+          <a:off x="0" y="0"/>
+          <a:ext cx="0" cy="0"/>
+          <a:chOff x="0" y="0"/>
+          <a:chExt cx="0" cy="0"/>
+        </a:xfrm>
+      </p:grpSpPr>
+      <p:sp>
+        <p:nvSpPr>
+          <p:cNvPr id="5" name="Slide Number Placeholder 5"/>
+          <p:cNvSpPr>
+            <a:spLocks noGrp="1"/>
+          </p:cNvSpPr>
+          <p:nvPr>
+            <p:ph type="sldNum" sz="quarter" idx="12"/>
+          </p:nvPr>
+        </p:nvSpPr>
+        <p:spPr>
+          <a:xfrm>
+            <a:off x="48247" y="4861463"/>
+            <a:ext cx="373338" cy="273844"/>
+          </a:xfrm>
+          <a:prstGeom prst="rect">
+            <a:avLst/>
+          </a:prstGeom>
+        </p:spPr>
+        <p:txBody>
+          <a:bodyPr/>
+          <a:lstStyle>
+            <a:lvl1pPr>
+              <a:defRPr sz="900">
+                <a:solidFill>
+                  <a:schemeClr val="bg1">
+                    <a:lumMod val="65000"/>
+                  </a:schemeClr>
+                </a:solidFill>
+              </a:defRPr>
+            </a:lvl1pPr>
+          </a:lstStyle>
+          <a:p>
+            <a:fld id="{ADA07C09-8A41-3B46-A636-3955072BBB4F}" type="slidenum">
+              <a:rPr lang="en-US" smtClean="0">
+                <a:solidFill>
+                  <a:srgbClr val="FFFFFF">
+                    <a:lumMod val="65000"/>
+                  </a:srgbClr>
+                </a:solidFill>
+                <a:latin typeface="Arial"/>
+              </a:rPr>
+              <a:pPr/>
+              <a:t>‹#›</a:t>
+            </a:fld>
+            <a:endParaRPr lang="en-US">
+              <a:solidFill>
+                <a:srgbClr val="FFFFFF">
+                  <a:lumMod val="65000"/>
+                </a:srgbClr>
+              </a:solidFill>
+              <a:latin typeface="Arial"/>
+            </a:endParaRPr>
+          </a:p>
+        </p:txBody>
+      </p:sp>
+    </p:spTree>
+    <p:extLst>
+      <p:ext uri="{BB962C8B-B14F-4D97-AF65-F5344CB8AC3E}">
+        <p14:creationId xmlns:p14="http://schemas.microsoft.com/office/powerpoint/2010/main" val="2355120294"/>
+      </p:ext>
+    </p:extLst>
+  </p:cSld>
+  <p:clrMapOvr>
+    <a:masterClrMapping/>
+  </p:clrMapOvr>
   <p:timing>
     <p:tnLst>
       <p:par>
@@ -5449,11 +5471,11 @@
 </file>
 
 <file path=ppt/slideLayouts/slideLayout9.xml><?xml version="1.0" encoding="utf-8"?>
-<p:sldLayout xmlns:a="http://schemas.openxmlformats.org/drawingml/2006/main" xmlns:r="http://schemas.openxmlformats.org/officeDocument/2006/relationships" xmlns:p="http://schemas.openxmlformats.org/presentationml/2006/main" type="title">
-  <p:cSld name="Title Slide 1">
+<p:sldLayout xmlns:a="http://schemas.openxmlformats.org/drawingml/2006/main" xmlns:r="http://schemas.openxmlformats.org/officeDocument/2006/relationships" xmlns:p="http://schemas.openxmlformats.org/presentationml/2006/main" userDrawn="1">
+  <p:cSld name="Title Only, no circles">
     <p:spTree>
       <p:nvGrpSpPr>
-        <p:cNvPr id="1" name="Shape 74"/>
+        <p:cNvPr id="1" name=""/>
         <p:cNvGrpSpPr/>
         <p:nvPr/>
       </p:nvGrpSpPr>
@@ -5467,321 +5489,69 @@
       </p:grpSpPr>
       <p:sp>
         <p:nvSpPr>
-          <p:cNvPr id="75" name="Shape 75"/>
-          <p:cNvSpPr txBox="1">
+          <p:cNvPr id="4" name="Title 1"/>
+          <p:cNvSpPr>
             <a:spLocks noGrp="1"/>
           </p:cNvSpPr>
           <p:nvPr>
-            <p:ph type="ctrTitle"/>
+            <p:ph type="title" hasCustomPrompt="1"/>
           </p:nvPr>
         </p:nvSpPr>
-        <p:spPr>
+        <p:spPr bwMode="gray">
           <a:xfrm>
-            <a:off x="685800" y="1583342"/>
-            <a:ext cx="7772400" cy="1159799"/>
+            <a:off x="366713" y="325438"/>
+            <a:ext cx="8410575" cy="460375"/>
           </a:xfrm>
           <a:prstGeom prst="rect">
             <a:avLst/>
           </a:prstGeom>
           <a:noFill/>
-          <a:ln>
-            <a:noFill/>
-          </a:ln>
         </p:spPr>
         <p:txBody>
-          <a:bodyPr lIns="91425" tIns="91425" rIns="91425" bIns="91425" anchor="ctr" anchorCtr="0"/>
+          <a:bodyPr lIns="0" tIns="0" rIns="0" bIns="0" anchor="t" anchorCtr="0"/>
           <a:lstStyle>
-            <a:lvl1pPr algn="ctr" rtl="0">
-              <a:spcBef>
-                <a:spcPts val="0"/>
-              </a:spcBef>
-              <a:buSzPct val="100000"/>
-              <a:defRPr sz="4800"/>
-            </a:lvl1pPr>
-            <a:lvl2pPr algn="ctr" rtl="0">
-              <a:spcBef>
-                <a:spcPts val="0"/>
-              </a:spcBef>
-              <a:buSzPct val="100000"/>
-              <a:defRPr sz="4800"/>
-            </a:lvl2pPr>
-            <a:lvl3pPr algn="ctr" rtl="0">
-              <a:spcBef>
-                <a:spcPts val="0"/>
-              </a:spcBef>
-              <a:buSzPct val="100000"/>
-              <a:defRPr sz="4800"/>
-            </a:lvl3pPr>
-            <a:lvl4pPr algn="ctr" rtl="0">
-              <a:spcBef>
-                <a:spcPts val="0"/>
-              </a:spcBef>
-              <a:buSzPct val="100000"/>
-              <a:defRPr sz="4800"/>
-            </a:lvl4pPr>
-            <a:lvl5pPr algn="ctr" rtl="0">
-              <a:spcBef>
-                <a:spcPts val="0"/>
-              </a:spcBef>
-              <a:buSzPct val="100000"/>
-              <a:defRPr sz="4800"/>
-            </a:lvl5pPr>
-            <a:lvl6pPr algn="ctr" rtl="0">
-              <a:spcBef>
-                <a:spcPts val="0"/>
-              </a:spcBef>
-              <a:buSzPct val="100000"/>
-              <a:defRPr sz="4800"/>
-            </a:lvl6pPr>
-            <a:lvl7pPr algn="ctr" rtl="0">
-              <a:spcBef>
-                <a:spcPts val="0"/>
-              </a:spcBef>
-              <a:buSzPct val="100000"/>
-              <a:defRPr sz="4800"/>
-            </a:lvl7pPr>
-            <a:lvl8pPr algn="ctr" rtl="0">
-              <a:spcBef>
-                <a:spcPts val="0"/>
-              </a:spcBef>
-              <a:buSzPct val="100000"/>
-              <a:defRPr sz="4800"/>
-            </a:lvl8pPr>
-            <a:lvl9pPr algn="ctr" rtl="0">
-              <a:spcBef>
-                <a:spcPts val="0"/>
-              </a:spcBef>
-              <a:buSzPct val="100000"/>
-              <a:defRPr sz="4800"/>
-            </a:lvl9pPr>
-          </a:lstStyle>
-          <a:p>
-            <a:endParaRPr/>
-          </a:p>
-        </p:txBody>
-      </p:sp>
-      <p:sp>
-        <p:nvSpPr>
-          <p:cNvPr id="76" name="Shape 76"/>
-          <p:cNvSpPr txBox="1">
-            <a:spLocks noGrp="1"/>
-          </p:cNvSpPr>
-          <p:nvPr>
-            <p:ph type="subTitle" idx="1"/>
-          </p:nvPr>
-        </p:nvSpPr>
-        <p:spPr>
-          <a:xfrm>
-            <a:off x="685800" y="2840053"/>
-            <a:ext cx="7772400" cy="784799"/>
-          </a:xfrm>
-          <a:prstGeom prst="rect">
-            <a:avLst/>
-          </a:prstGeom>
-          <a:noFill/>
-          <a:ln>
-            <a:noFill/>
-          </a:ln>
-        </p:spPr>
-        <p:txBody>
-          <a:bodyPr lIns="91425" tIns="91425" rIns="91425" bIns="91425" anchor="ctr" anchorCtr="0"/>
-          <a:lstStyle>
-            <a:lvl1pPr algn="ctr" rtl="0">
-              <a:spcBef>
-                <a:spcPts val="0"/>
-              </a:spcBef>
-              <a:buClr>
-                <a:schemeClr val="dk2"/>
-              </a:buClr>
-              <a:buNone/>
-              <a:defRPr>
-                <a:solidFill>
-                  <a:schemeClr val="dk2"/>
-                </a:solidFill>
+            <a:lvl1pPr>
+              <a:lnSpc>
+                <a:spcPct val="90000"/>
+              </a:lnSpc>
+              <a:defRPr sz="3200">
+                <a:solidFill>
+                  <a:srgbClr val="00685D"/>
+                </a:solidFill>
+                <a:latin typeface="Arial"/>
+                <a:cs typeface="Arial"/>
               </a:defRPr>
             </a:lvl1pPr>
-            <a:lvl2pPr algn="ctr" rtl="0">
-              <a:spcBef>
-                <a:spcPts val="0"/>
-              </a:spcBef>
-              <a:buClr>
-                <a:schemeClr val="dk2"/>
-              </a:buClr>
-              <a:buSzPct val="100000"/>
-              <a:buNone/>
-              <a:defRPr sz="3000">
-                <a:solidFill>
-                  <a:schemeClr val="dk2"/>
-                </a:solidFill>
-              </a:defRPr>
-            </a:lvl2pPr>
-            <a:lvl3pPr algn="ctr" rtl="0">
-              <a:spcBef>
-                <a:spcPts val="0"/>
-              </a:spcBef>
-              <a:buClr>
-                <a:schemeClr val="dk2"/>
-              </a:buClr>
-              <a:buSzPct val="100000"/>
-              <a:buNone/>
-              <a:defRPr sz="3000">
-                <a:solidFill>
-                  <a:schemeClr val="dk2"/>
-                </a:solidFill>
-              </a:defRPr>
-            </a:lvl3pPr>
-            <a:lvl4pPr algn="ctr" rtl="0">
-              <a:spcBef>
-                <a:spcPts val="0"/>
-              </a:spcBef>
-              <a:buClr>
-                <a:schemeClr val="dk2"/>
-              </a:buClr>
-              <a:buSzPct val="100000"/>
-              <a:buNone/>
-              <a:defRPr sz="3000">
-                <a:solidFill>
-                  <a:schemeClr val="dk2"/>
-                </a:solidFill>
-              </a:defRPr>
-            </a:lvl4pPr>
-            <a:lvl5pPr algn="ctr" rtl="0">
-              <a:spcBef>
-                <a:spcPts val="0"/>
-              </a:spcBef>
-              <a:buClr>
-                <a:schemeClr val="dk2"/>
-              </a:buClr>
-              <a:buSzPct val="100000"/>
-              <a:buNone/>
-              <a:defRPr sz="3000">
-                <a:solidFill>
-                  <a:schemeClr val="dk2"/>
-                </a:solidFill>
-              </a:defRPr>
-            </a:lvl5pPr>
-            <a:lvl6pPr algn="ctr" rtl="0">
-              <a:spcBef>
-                <a:spcPts val="0"/>
-              </a:spcBef>
-              <a:buClr>
-                <a:schemeClr val="dk2"/>
-              </a:buClr>
-              <a:buSzPct val="100000"/>
-              <a:buNone/>
-              <a:defRPr sz="3000">
-                <a:solidFill>
-                  <a:schemeClr val="dk2"/>
-                </a:solidFill>
-              </a:defRPr>
-            </a:lvl6pPr>
-            <a:lvl7pPr algn="ctr" rtl="0">
-              <a:spcBef>
-                <a:spcPts val="0"/>
-              </a:spcBef>
-              <a:buClr>
-                <a:schemeClr val="dk2"/>
-              </a:buClr>
-              <a:buSzPct val="100000"/>
-              <a:buNone/>
-              <a:defRPr sz="3000">
-                <a:solidFill>
-                  <a:schemeClr val="dk2"/>
-                </a:solidFill>
-              </a:defRPr>
-            </a:lvl7pPr>
-            <a:lvl8pPr algn="ctr" rtl="0">
-              <a:spcBef>
-                <a:spcPts val="0"/>
-              </a:spcBef>
-              <a:buClr>
-                <a:schemeClr val="dk2"/>
-              </a:buClr>
-              <a:buSzPct val="100000"/>
-              <a:buNone/>
-              <a:defRPr sz="3000">
-                <a:solidFill>
-                  <a:schemeClr val="dk2"/>
-                </a:solidFill>
-              </a:defRPr>
-            </a:lvl8pPr>
-            <a:lvl9pPr algn="ctr" rtl="0">
-              <a:spcBef>
-                <a:spcPts val="0"/>
-              </a:spcBef>
-              <a:buClr>
-                <a:schemeClr val="dk2"/>
-              </a:buClr>
-              <a:buSzPct val="100000"/>
-              <a:buNone/>
-              <a:defRPr sz="3000">
-                <a:solidFill>
-                  <a:schemeClr val="dk2"/>
-                </a:solidFill>
-              </a:defRPr>
-            </a:lvl9pPr>
           </a:lstStyle>
           <a:p>
-            <a:endParaRPr/>
-          </a:p>
-        </p:txBody>
-      </p:sp>
-      <p:sp>
-        <p:nvSpPr>
-          <p:cNvPr id="77" name="Shape 77"/>
-          <p:cNvSpPr txBox="1">
-            <a:spLocks noGrp="1"/>
-          </p:cNvSpPr>
-          <p:nvPr>
-            <p:ph type="sldNum" idx="12"/>
-          </p:nvPr>
-        </p:nvSpPr>
-        <p:spPr>
-          <a:xfrm>
-            <a:off x="8556791" y="4749850"/>
-            <a:ext cx="548699" cy="393600"/>
-          </a:xfrm>
-          <a:prstGeom prst="rect">
-            <a:avLst/>
-          </a:prstGeom>
-          <a:noFill/>
-          <a:ln>
-            <a:noFill/>
-          </a:ln>
-        </p:spPr>
-        <p:txBody>
-          <a:bodyPr lIns="91425" tIns="91425" rIns="91425" bIns="91425" anchor="ctr" anchorCtr="0">
-            <a:noAutofit/>
-          </a:bodyPr>
-          <a:lstStyle>
-            <a:lvl1pPr rtl="0">
-              <a:spcBef>
-                <a:spcPts val="0"/>
-              </a:spcBef>
-              <a:buNone/>
-              <a:defRPr/>
-            </a:lvl1pPr>
-          </a:lstStyle>
-          <a:p>
-            <a:pPr lvl="0">
-              <a:spcBef>
-                <a:spcPts val="0"/>
-              </a:spcBef>
-              <a:buNone/>
-            </a:pPr>
-            <a:fld id="{00000000-1234-1234-1234-123412341234}" type="slidenum">
-              <a:rPr lang="en"/>
-              <a:t>‹#›</a:t>
-            </a:fld>
-            <a:endParaRPr lang="en"/>
+            <a:r>
+              <a:rPr lang="en-US" dirty="0" smtClean="0"/>
+              <a:t>Click to Edit Master Title Style</a:t>
+            </a:r>
+            <a:endParaRPr lang="en-US" dirty="0"/>
           </a:p>
         </p:txBody>
       </p:sp>
     </p:spTree>
+    <p:extLst>
+      <p:ext uri="{BB962C8B-B14F-4D97-AF65-F5344CB8AC3E}">
+        <p14:creationId xmlns:p14="http://schemas.microsoft.com/office/powerpoint/2010/main" val="4161830973"/>
+      </p:ext>
+    </p:extLst>
   </p:cSld>
   <p:clrMapOvr>
     <a:masterClrMapping/>
   </p:clrMapOvr>
+  <p:transition xmlns:p14="http://schemas.microsoft.com/office/powerpoint/2010/main">
+    <p:fade/>
+  </p:transition>
+  <p:timing>
+    <p:tnLst>
+      <p:par>
+        <p:cTn xmlns:p14="http://schemas.microsoft.com/office/powerpoint/2010/main" id="1" dur="indefinite" restart="never" nodeType="tmRoot"/>
+      </p:par>
+    </p:tnLst>
+  </p:timing>
 </p:sldLayout>
 </file>
 
@@ -6031,10 +5801,10 @@
     <p:sldLayoutId id="2147483657" r:id="rId6"/>
     <p:sldLayoutId id="2147483658" r:id="rId7"/>
     <p:sldLayoutId id="2147483662" r:id="rId8"/>
-    <p:sldLayoutId id="2147483663" r:id="rId9"/>
-    <p:sldLayoutId id="2147483683" r:id="rId10"/>
-    <p:sldLayoutId id="2147483684" r:id="rId11"/>
-    <p:sldLayoutId id="2147483685" r:id="rId12"/>
+    <p:sldLayoutId id="2147483683" r:id="rId9"/>
+    <p:sldLayoutId id="2147483684" r:id="rId10"/>
+    <p:sldLayoutId id="2147483685" r:id="rId11"/>
+    <p:sldLayoutId id="2147483686" r:id="rId12"/>
   </p:sldLayoutIdLst>
   <p:hf sldNum="0" hdr="0" ftr="0" dt="0"/>
   <p:txStyles>
@@ -6526,7 +6296,7 @@
   <p:cSld>
     <p:spTree>
       <p:nvGrpSpPr>
-        <p:cNvPr id="1" name="Shape 150"/>
+        <p:cNvPr id="1" name=""/>
         <p:cNvGrpSpPr/>
         <p:nvPr/>
       </p:nvGrpSpPr>
@@ -6538,340 +6308,361 @@
           <a:chExt cx="0" cy="0"/>
         </a:xfrm>
       </p:grpSpPr>
-      <p:sp>
-        <p:nvSpPr>
-          <p:cNvPr id="151" name="Shape 151"/>
-          <p:cNvSpPr txBox="1">
-            <a:spLocks noGrp="1"/>
-          </p:cNvSpPr>
-          <p:nvPr>
-            <p:ph type="ctrTitle"/>
-          </p:nvPr>
-        </p:nvSpPr>
+      <p:pic>
+        <p:nvPicPr>
+          <p:cNvPr id="4" name="Picture 3"/>
+          <p:cNvPicPr>
+            <a:picLocks/>
+          </p:cNvPicPr>
+          <p:nvPr/>
+        </p:nvPicPr>
+        <p:blipFill rotWithShape="1">
+          <a:blip r:embed="rId3">
+            <a:extLst>
+              <a:ext uri="{28A0092B-C50C-407E-A947-70E740481C1C}">
+                <a14:useLocalDpi xmlns:a14="http://schemas.microsoft.com/office/drawing/2010/main" val="0"/>
+              </a:ext>
+            </a:extLst>
+          </a:blip>
+          <a:srcRect t="5795" b="5795"/>
+          <a:stretch/>
+        </p:blipFill>
         <p:spPr>
           <a:xfrm>
-            <a:off x="685800" y="1583342"/>
-            <a:ext cx="7772400" cy="1159856"/>
+            <a:off x="-13167" y="0"/>
+            <a:ext cx="9157167" cy="5143500"/>
           </a:xfrm>
           <a:prstGeom prst="rect">
             <a:avLst/>
           </a:prstGeom>
         </p:spPr>
-        <p:txBody>
-          <a:bodyPr lIns="91425" tIns="91425" rIns="91425" bIns="91425" anchor="ctr" anchorCtr="0">
-            <a:noAutofit/>
-          </a:bodyPr>
-          <a:lstStyle/>
-          <a:p>
-            <a:pPr>
-              <a:spcBef>
-                <a:spcPts val="0"/>
-              </a:spcBef>
-              <a:buNone/>
-            </a:pPr>
-            <a:r>
-              <a:rPr lang="en-US" dirty="0" smtClean="0">
-                <a:solidFill>
-                  <a:srgbClr val="2C95DD"/>
-                </a:solidFill>
-              </a:rPr>
-              <a:t>Pivotal Cloud Foundry</a:t>
-            </a:r>
-            <a:endParaRPr lang="en" dirty="0">
-              <a:solidFill>
-                <a:srgbClr val="2C95DD"/>
-              </a:solidFill>
-            </a:endParaRPr>
-          </a:p>
-        </p:txBody>
-      </p:sp>
+      </p:pic>
       <p:sp>
         <p:nvSpPr>
-          <p:cNvPr id="4" name="Shape 152"/>
-          <p:cNvSpPr txBox="1">
-            <a:spLocks/>
-          </p:cNvSpPr>
+          <p:cNvPr id="14" name="Shape 251"/>
+          <p:cNvSpPr/>
           <p:nvPr/>
         </p:nvSpPr>
         <p:spPr>
           <a:xfrm>
-            <a:off x="618066" y="2917310"/>
-            <a:ext cx="7772400" cy="784737"/>
+            <a:off x="0" y="0"/>
+            <a:ext cx="9144000" cy="5143500"/>
+          </a:xfrm>
+          <a:prstGeom prst="rect">
+            <a:avLst/>
+          </a:prstGeom>
+          <a:solidFill>
+            <a:srgbClr val="182730">
+              <a:alpha val="77000"/>
+            </a:srgbClr>
+          </a:solidFill>
+          <a:ln>
+            <a:noFill/>
+          </a:ln>
+        </p:spPr>
+        <p:txBody>
+          <a:bodyPr lIns="91425" tIns="45700" rIns="91425" bIns="45700" anchor="ctr" anchorCtr="0">
+            <a:noAutofit/>
+          </a:bodyPr>
+          <a:lstStyle/>
+          <a:p>
+            <a:pPr algn="ctr"/>
+            <a:endParaRPr>
+              <a:solidFill>
+                <a:srgbClr val="FFFFFF"/>
+              </a:solidFill>
+              <a:latin typeface="Arial"/>
+              <a:ea typeface="Arial"/>
+              <a:cs typeface="Arial"/>
+              <a:sym typeface="Arial"/>
+            </a:endParaRPr>
+          </a:p>
+        </p:txBody>
+      </p:sp>
+      <p:pic>
+        <p:nvPicPr>
+          <p:cNvPr id="8" name="Picture 7" descr="pivotal_white.png"/>
+          <p:cNvPicPr>
+            <a:picLocks noChangeAspect="1"/>
+          </p:cNvPicPr>
+          <p:nvPr/>
+        </p:nvPicPr>
+        <p:blipFill>
+          <a:blip r:embed="rId4">
+            <a:extLst>
+              <a:ext uri="{28A0092B-C50C-407E-A947-70E740481C1C}">
+                <a14:useLocalDpi xmlns:a14="http://schemas.microsoft.com/office/drawing/2010/main" val="0"/>
+              </a:ext>
+            </a:extLst>
+          </a:blip>
+          <a:stretch>
+            <a:fillRect/>
+          </a:stretch>
+        </p:blipFill>
+        <p:spPr>
+          <a:xfrm>
+            <a:off x="753110" y="978442"/>
+            <a:ext cx="1368554" cy="336279"/>
+          </a:xfrm>
+          <a:prstGeom prst="rect">
+            <a:avLst/>
+          </a:prstGeom>
+        </p:spPr>
+      </p:pic>
+      <p:pic>
+        <p:nvPicPr>
+          <p:cNvPr id="7" name="Picture 6" descr="pivotal_teal.png"/>
+          <p:cNvPicPr>
+            <a:picLocks noChangeAspect="1"/>
+          </p:cNvPicPr>
+          <p:nvPr/>
+        </p:nvPicPr>
+        <p:blipFill>
+          <a:blip r:embed="rId5">
+            <a:lum bright="70000" contrast="-70000"/>
+            <a:extLst>
+              <a:ext uri="{BEBA8EAE-BF5A-486C-A8C5-ECC9F3942E4B}">
+                <a14:imgProps xmlns:a14="http://schemas.microsoft.com/office/drawing/2010/main">
+                  <a14:imgLayer r:embed="rId6">
+                    <a14:imgEffect>
+                      <a14:colorTemperature colorTemp="11500"/>
+                    </a14:imgEffect>
+                    <a14:imgEffect>
+                      <a14:saturation sat="0"/>
+                    </a14:imgEffect>
+                  </a14:imgLayer>
+                </a14:imgProps>
+              </a:ext>
+              <a:ext uri="{28A0092B-C50C-407E-A947-70E740481C1C}">
+                <a14:useLocalDpi xmlns:a14="http://schemas.microsoft.com/office/drawing/2010/main" val="0"/>
+              </a:ext>
+            </a:extLst>
+          </a:blip>
+          <a:stretch>
+            <a:fillRect/>
+          </a:stretch>
+        </p:blipFill>
+        <p:spPr>
+          <a:xfrm>
+            <a:off x="8272780" y="4855076"/>
+            <a:ext cx="731520" cy="171298"/>
+          </a:xfrm>
+          <a:prstGeom prst="rect">
+            <a:avLst/>
+          </a:prstGeom>
+        </p:spPr>
+      </p:pic>
+      <p:sp>
+        <p:nvSpPr>
+          <p:cNvPr id="10" name="TextBox 9"/>
+          <p:cNvSpPr txBox="1"/>
+          <p:nvPr/>
+        </p:nvSpPr>
+        <p:spPr>
+          <a:xfrm>
+            <a:off x="623455" y="1609787"/>
+            <a:ext cx="7897090" cy="1231106"/>
           </a:xfrm>
           <a:prstGeom prst="rect">
             <a:avLst/>
           </a:prstGeom>
           <a:noFill/>
-          <a:ln>
-            <a:noFill/>
-          </a:ln>
+          <a:effectLst>
+            <a:outerShdw blurRad="63500" sx="102000" sy="102000" algn="ctr" rotWithShape="0">
+              <a:prstClr val="black">
+                <a:alpha val="40000"/>
+              </a:prstClr>
+            </a:outerShdw>
+          </a:effectLst>
         </p:spPr>
         <p:txBody>
-          <a:bodyPr lIns="91425" tIns="91425" rIns="91425" bIns="91425" anchor="ctr" anchorCtr="0">
-            <a:noAutofit/>
+          <a:bodyPr wrap="square" rtlCol="0">
+            <a:spAutoFit/>
           </a:bodyPr>
-          <a:lstStyle>
-            <a:defPPr marR="0" algn="l" rtl="0">
+          <a:lstStyle/>
+          <a:p>
+            <a:pPr>
+              <a:spcAft>
+                <a:spcPts val="1200"/>
+              </a:spcAft>
+            </a:pPr>
+            <a:r>
+              <a:rPr lang="en-US" sz="4200" b="1" spc="-100" dirty="0" smtClean="0">
+                <a:solidFill>
+                  <a:srgbClr val="00AE9E"/>
+                </a:solidFill>
+                <a:effectLst>
+                  <a:outerShdw blurRad="50800" dist="38100" dir="5400000" algn="t" rotWithShape="0">
+                    <a:prstClr val="black">
+                      <a:alpha val="40000"/>
+                    </a:prstClr>
+                  </a:outerShdw>
+                </a:effectLst>
+                <a:cs typeface="Arial"/>
+              </a:rPr>
+              <a:t>Pivotal Cloud Foundry</a:t>
+            </a:r>
+            <a:endParaRPr lang="en-US" sz="4200" b="1" spc="-100" dirty="0" smtClean="0">
+              <a:solidFill>
+                <a:srgbClr val="00AE9E"/>
+              </a:solidFill>
+              <a:effectLst>
+                <a:outerShdw blurRad="50800" dist="38100" dir="5400000" algn="t" rotWithShape="0">
+                  <a:prstClr val="black">
+                    <a:alpha val="40000"/>
+                  </a:prstClr>
+                </a:outerShdw>
+              </a:effectLst>
+              <a:cs typeface="Arial"/>
+            </a:endParaRPr>
+          </a:p>
+          <a:p>
+            <a:pPr>
               <a:lnSpc>
-                <a:spcPct val="100000"/>
+                <a:spcPct val="90000"/>
               </a:lnSpc>
-              <a:spcBef>
-                <a:spcPts val="0"/>
-              </a:spcBef>
               <a:spcAft>
-                <a:spcPts val="0"/>
+                <a:spcPts val="1200"/>
               </a:spcAft>
-            </a:defPPr>
-            <a:lvl1pPr marR="0" algn="ctr" rtl="0">
-              <a:lnSpc>
-                <a:spcPct val="100000"/>
-              </a:lnSpc>
-              <a:spcBef>
-                <a:spcPts val="0"/>
-              </a:spcBef>
+            </a:pPr>
+            <a:r>
+              <a:rPr lang="en-US" sz="2400" b="1" spc="-100" dirty="0" smtClean="0">
+                <a:solidFill>
+                  <a:schemeClr val="bg1"/>
+                </a:solidFill>
+                <a:effectLst>
+                  <a:outerShdw blurRad="50800" dist="38100" dir="5400000" algn="t" rotWithShape="0">
+                    <a:prstClr val="black">
+                      <a:alpha val="40000"/>
+                    </a:prstClr>
+                  </a:outerShdw>
+                </a:effectLst>
+                <a:cs typeface="Arial"/>
+              </a:rPr>
+              <a:t>Services Overview</a:t>
+            </a:r>
+            <a:endParaRPr lang="en-US" sz="2400" b="1" spc="-100" dirty="0">
+              <a:solidFill>
+                <a:schemeClr val="bg1"/>
+              </a:solidFill>
+              <a:effectLst>
+                <a:outerShdw blurRad="50800" dist="38100" dir="5400000" algn="t" rotWithShape="0">
+                  <a:prstClr val="black">
+                    <a:alpha val="40000"/>
+                  </a:prstClr>
+                </a:outerShdw>
+              </a:effectLst>
+              <a:cs typeface="Arial"/>
+            </a:endParaRPr>
+          </a:p>
+        </p:txBody>
+      </p:sp>
+      <p:sp>
+        <p:nvSpPr>
+          <p:cNvPr id="11" name="TextBox 10"/>
+          <p:cNvSpPr txBox="1"/>
+          <p:nvPr/>
+        </p:nvSpPr>
+        <p:spPr>
+          <a:xfrm>
+            <a:off x="623455" y="4162894"/>
+            <a:ext cx="7897090" cy="623248"/>
+          </a:xfrm>
+          <a:prstGeom prst="rect">
+            <a:avLst/>
+          </a:prstGeom>
+          <a:noFill/>
+        </p:spPr>
+        <p:txBody>
+          <a:bodyPr wrap="square" rtlCol="0">
+            <a:spAutoFit/>
+          </a:bodyPr>
+          <a:lstStyle/>
+          <a:p>
+            <a:pPr>
               <a:spcAft>
-                <a:spcPts val="0"/>
+                <a:spcPts val="300"/>
               </a:spcAft>
-              <a:buClr>
-                <a:schemeClr val="dk2"/>
-              </a:buClr>
-              <a:buNone/>
-              <a:defRPr sz="1400" b="0" i="0" u="none" strike="noStrike" cap="none" baseline="0">
-                <a:solidFill>
-                  <a:schemeClr val="dk2"/>
-                </a:solidFill>
-                <a:latin typeface="Arial"/>
-                <a:ea typeface="Arial"/>
+            </a:pPr>
+            <a:r>
+              <a:rPr lang="en-US" sz="1600" dirty="0" smtClean="0">
+                <a:solidFill>
+                  <a:srgbClr val="FFFFFF"/>
+                </a:solidFill>
                 <a:cs typeface="Arial"/>
-                <a:sym typeface="Arial"/>
-                <a:rtl val="0"/>
-              </a:defRPr>
-            </a:lvl1pPr>
-            <a:lvl2pPr marR="0" algn="ctr" rtl="0">
-              <a:lnSpc>
-                <a:spcPct val="100000"/>
-              </a:lnSpc>
-              <a:spcBef>
-                <a:spcPts val="0"/>
-              </a:spcBef>
+              </a:rPr>
+              <a:t>Your Name / Title</a:t>
+            </a:r>
+            <a:endParaRPr lang="en-US" sz="1600" dirty="0">
+              <a:solidFill>
+                <a:srgbClr val="FFFFFF"/>
+              </a:solidFill>
+              <a:cs typeface="Arial"/>
+            </a:endParaRPr>
+          </a:p>
+          <a:p>
+            <a:pPr>
               <a:spcAft>
-                <a:spcPts val="0"/>
+                <a:spcPts val="300"/>
               </a:spcAft>
-              <a:buClr>
-                <a:schemeClr val="dk2"/>
-              </a:buClr>
-              <a:buSzPct val="100000"/>
-              <a:buNone/>
-              <a:defRPr sz="3000" b="0" i="0" u="none" strike="noStrike" cap="none" baseline="0">
-                <a:solidFill>
-                  <a:schemeClr val="dk2"/>
-                </a:solidFill>
-                <a:latin typeface="Arial"/>
-                <a:ea typeface="Arial"/>
+            </a:pPr>
+            <a:r>
+              <a:rPr lang="en-US" sz="1600" dirty="0" err="1" smtClean="0">
+                <a:solidFill>
+                  <a:srgbClr val="FFFFFF"/>
+                </a:solidFill>
+              </a:rPr>
+              <a:t>you</a:t>
+            </a:r>
+            <a:r>
+              <a:rPr lang="en-US" sz="1600" dirty="0" err="1" smtClean="0">
+                <a:solidFill>
+                  <a:srgbClr val="FFFFFF"/>
+                </a:solidFill>
                 <a:cs typeface="Arial"/>
-                <a:sym typeface="Arial"/>
-                <a:rtl val="0"/>
-              </a:defRPr>
-            </a:lvl2pPr>
-            <a:lvl3pPr marR="0" algn="ctr" rtl="0">
-              <a:lnSpc>
-                <a:spcPct val="100000"/>
-              </a:lnSpc>
-              <a:spcBef>
-                <a:spcPts val="0"/>
-              </a:spcBef>
-              <a:spcAft>
-                <a:spcPts val="0"/>
-              </a:spcAft>
-              <a:buClr>
-                <a:schemeClr val="dk2"/>
-              </a:buClr>
-              <a:buSzPct val="100000"/>
-              <a:buNone/>
-              <a:defRPr sz="3000" b="0" i="0" u="none" strike="noStrike" cap="none" baseline="0">
-                <a:solidFill>
-                  <a:schemeClr val="dk2"/>
-                </a:solidFill>
-                <a:latin typeface="Arial"/>
-                <a:ea typeface="Arial"/>
+              </a:rPr>
+              <a:t>@</a:t>
+            </a:r>
+            <a:r>
+              <a:rPr lang="en-US" sz="1600" dirty="0" err="1" smtClean="0">
+                <a:solidFill>
+                  <a:srgbClr val="FFFFFF"/>
+                </a:solidFill>
                 <a:cs typeface="Arial"/>
-                <a:sym typeface="Arial"/>
-                <a:rtl val="0"/>
-              </a:defRPr>
-            </a:lvl3pPr>
-            <a:lvl4pPr marR="0" algn="ctr" rtl="0">
-              <a:lnSpc>
-                <a:spcPct val="100000"/>
-              </a:lnSpc>
-              <a:spcBef>
-                <a:spcPts val="0"/>
-              </a:spcBef>
-              <a:spcAft>
-                <a:spcPts val="0"/>
-              </a:spcAft>
-              <a:buClr>
-                <a:schemeClr val="dk2"/>
-              </a:buClr>
-              <a:buSzPct val="100000"/>
-              <a:buNone/>
-              <a:defRPr sz="3000" b="0" i="0" u="none" strike="noStrike" cap="none" baseline="0">
-                <a:solidFill>
-                  <a:schemeClr val="dk2"/>
-                </a:solidFill>
-                <a:latin typeface="Arial"/>
-                <a:ea typeface="Arial"/>
-                <a:cs typeface="Arial"/>
-                <a:sym typeface="Arial"/>
-                <a:rtl val="0"/>
-              </a:defRPr>
-            </a:lvl4pPr>
-            <a:lvl5pPr marR="0" algn="ctr" rtl="0">
-              <a:lnSpc>
-                <a:spcPct val="100000"/>
-              </a:lnSpc>
-              <a:spcBef>
-                <a:spcPts val="0"/>
-              </a:spcBef>
-              <a:spcAft>
-                <a:spcPts val="0"/>
-              </a:spcAft>
-              <a:buClr>
-                <a:schemeClr val="dk2"/>
-              </a:buClr>
-              <a:buSzPct val="100000"/>
-              <a:buNone/>
-              <a:defRPr sz="3000" b="0" i="0" u="none" strike="noStrike" cap="none" baseline="0">
-                <a:solidFill>
-                  <a:schemeClr val="dk2"/>
-                </a:solidFill>
-                <a:latin typeface="Arial"/>
-                <a:ea typeface="Arial"/>
-                <a:cs typeface="Arial"/>
-                <a:sym typeface="Arial"/>
-                <a:rtl val="0"/>
-              </a:defRPr>
-            </a:lvl5pPr>
-            <a:lvl6pPr marR="0" algn="ctr" rtl="0">
-              <a:lnSpc>
-                <a:spcPct val="100000"/>
-              </a:lnSpc>
-              <a:spcBef>
-                <a:spcPts val="0"/>
-              </a:spcBef>
-              <a:spcAft>
-                <a:spcPts val="0"/>
-              </a:spcAft>
-              <a:buClr>
-                <a:schemeClr val="dk2"/>
-              </a:buClr>
-              <a:buSzPct val="100000"/>
-              <a:buNone/>
-              <a:defRPr sz="3000" b="0" i="0" u="none" strike="noStrike" cap="none" baseline="0">
-                <a:solidFill>
-                  <a:schemeClr val="dk2"/>
-                </a:solidFill>
-                <a:latin typeface="Arial"/>
-                <a:ea typeface="Arial"/>
-                <a:cs typeface="Arial"/>
-                <a:sym typeface="Arial"/>
-                <a:rtl val="0"/>
-              </a:defRPr>
-            </a:lvl6pPr>
-            <a:lvl7pPr marR="0" algn="ctr" rtl="0">
-              <a:lnSpc>
-                <a:spcPct val="100000"/>
-              </a:lnSpc>
-              <a:spcBef>
-                <a:spcPts val="0"/>
-              </a:spcBef>
-              <a:spcAft>
-                <a:spcPts val="0"/>
-              </a:spcAft>
-              <a:buClr>
-                <a:schemeClr val="dk2"/>
-              </a:buClr>
-              <a:buSzPct val="100000"/>
-              <a:buNone/>
-              <a:defRPr sz="3000" b="0" i="0" u="none" strike="noStrike" cap="none" baseline="0">
-                <a:solidFill>
-                  <a:schemeClr val="dk2"/>
-                </a:solidFill>
-                <a:latin typeface="Arial"/>
-                <a:ea typeface="Arial"/>
-                <a:cs typeface="Arial"/>
-                <a:sym typeface="Arial"/>
-                <a:rtl val="0"/>
-              </a:defRPr>
-            </a:lvl7pPr>
-            <a:lvl8pPr marR="0" algn="ctr" rtl="0">
-              <a:lnSpc>
-                <a:spcPct val="100000"/>
-              </a:lnSpc>
-              <a:spcBef>
-                <a:spcPts val="0"/>
-              </a:spcBef>
-              <a:spcAft>
-                <a:spcPts val="0"/>
-              </a:spcAft>
-              <a:buClr>
-                <a:schemeClr val="dk2"/>
-              </a:buClr>
-              <a:buSzPct val="100000"/>
-              <a:buNone/>
-              <a:defRPr sz="3000" b="0" i="0" u="none" strike="noStrike" cap="none" baseline="0">
-                <a:solidFill>
-                  <a:schemeClr val="dk2"/>
-                </a:solidFill>
-                <a:latin typeface="Arial"/>
-                <a:ea typeface="Arial"/>
-                <a:cs typeface="Arial"/>
-                <a:sym typeface="Arial"/>
-                <a:rtl val="0"/>
-              </a:defRPr>
-            </a:lvl8pPr>
-            <a:lvl9pPr marR="0" algn="ctr" rtl="0">
-              <a:lnSpc>
-                <a:spcPct val="100000"/>
-              </a:lnSpc>
-              <a:spcBef>
-                <a:spcPts val="0"/>
-              </a:spcBef>
-              <a:spcAft>
-                <a:spcPts val="0"/>
-              </a:spcAft>
-              <a:buClr>
-                <a:schemeClr val="dk2"/>
-              </a:buClr>
-              <a:buSzPct val="100000"/>
-              <a:buNone/>
-              <a:defRPr sz="3000" b="0" i="0" u="none" strike="noStrike" cap="none" baseline="0">
-                <a:solidFill>
-                  <a:schemeClr val="dk2"/>
-                </a:solidFill>
-                <a:latin typeface="Arial"/>
-                <a:ea typeface="Arial"/>
-                <a:cs typeface="Arial"/>
-                <a:sym typeface="Arial"/>
-                <a:rtl val="0"/>
-              </a:defRPr>
-            </a:lvl9pPr>
-          </a:lstStyle>
-          <a:p>
-            <a:r>
-              <a:rPr lang="en-US" sz="2800" dirty="0" smtClean="0"/>
-              <a:t>Services</a:t>
-            </a:r>
+              </a:rPr>
+              <a:t>pivotal.io</a:t>
+            </a:r>
+            <a:endParaRPr lang="en-US" sz="1600" dirty="0">
+              <a:solidFill>
+                <a:srgbClr val="FFFFFF"/>
+              </a:solidFill>
+              <a:cs typeface="Arial"/>
+            </a:endParaRPr>
           </a:p>
         </p:txBody>
       </p:sp>
     </p:spTree>
+    <p:extLst>
+      <p:ext uri="{BB962C8B-B14F-4D97-AF65-F5344CB8AC3E}">
+        <p14:creationId xmlns:p14="http://schemas.microsoft.com/office/powerpoint/2010/main" val="3130142771"/>
+      </p:ext>
+    </p:extLst>
   </p:cSld>
   <p:clrMapOvr>
     <a:masterClrMapping/>
   </p:clrMapOvr>
-  <p:transition xmlns:p14="http://schemas.microsoft.com/office/powerpoint/2010/main" spd="slow">
-    <p:cut/>
-  </p:transition>
+  <mc:AlternateContent xmlns:mc="http://schemas.openxmlformats.org/markup-compatibility/2006" xmlns:p14="http://schemas.microsoft.com/office/powerpoint/2010/main">
+    <mc:Choice Requires="p14">
+      <p:transition spd="med" p14:dur="700">
+        <p:fade/>
+      </p:transition>
+    </mc:Choice>
+    <mc:Fallback xmlns="">
+      <p:transition xmlns:p14="http://schemas.microsoft.com/office/powerpoint/2010/main" spd="med">
+        <p:fade/>
+      </p:transition>
+    </mc:Fallback>
+  </mc:AlternateContent>
   <p:timing>
     <p:tnLst>
       <p:par>

</xml_diff>

<commit_message>
Removed Elk and EOL Mobile services
</commit_message>
<xml_diff>
--- a/presentations/Session_4_Services_Overview.pptx
+++ b/presentations/Session_4_Services_Overview.pptx
@@ -5,7 +5,7 @@
     <p:sldMasterId id="2147483679" r:id="rId1"/>
   </p:sldMasterIdLst>
   <p:notesMasterIdLst>
-    <p:notesMasterId r:id="rId24"/>
+    <p:notesMasterId r:id="rId22"/>
   </p:notesMasterIdLst>
   <p:sldIdLst>
     <p:sldId id="499" r:id="rId2"/>
@@ -26,10 +26,8 @@
     <p:sldId id="490" r:id="rId17"/>
     <p:sldId id="491" r:id="rId18"/>
     <p:sldId id="492" r:id="rId19"/>
-    <p:sldId id="493" r:id="rId20"/>
-    <p:sldId id="494" r:id="rId21"/>
-    <p:sldId id="495" r:id="rId22"/>
-    <p:sldId id="497" r:id="rId23"/>
+    <p:sldId id="494" r:id="rId20"/>
+    <p:sldId id="497" r:id="rId21"/>
   </p:sldIdLst>
   <p:sldSz cx="9144000" cy="5143500" type="screen16x9"/>
   <p:notesSz cx="6858000" cy="9144000"/>
@@ -267,9 +265,7 @@
             <p14:sldId id="490"/>
             <p14:sldId id="491"/>
             <p14:sldId id="492"/>
-            <p14:sldId id="493"/>
             <p14:sldId id="494"/>
-            <p14:sldId id="495"/>
             <p14:sldId id="497"/>
           </p14:sldIdLst>
         </p14:section>
@@ -1014,7 +1010,7 @@
     </p:spTree>
     <p:extLst>
       <p:ext uri="{BB962C8B-B14F-4D97-AF65-F5344CB8AC3E}">
-        <p14:creationId xmlns:p14="http://schemas.microsoft.com/office/powerpoint/2010/main" val="2046182566"/>
+        <p14:creationId xmlns:p14="http://schemas.microsoft.com/office/powerpoint/2010/main" val="2041210676"/>
       </p:ext>
     </p:extLst>
   </p:cSld>
@@ -1025,138 +1021,6 @@
 </file>
 
 <file path=ppt/notesSlides/notesSlide15.xml><?xml version="1.0" encoding="utf-8"?>
-<p:notes xmlns:a="http://schemas.openxmlformats.org/drawingml/2006/main" xmlns:r="http://schemas.openxmlformats.org/officeDocument/2006/relationships" xmlns:p="http://schemas.openxmlformats.org/presentationml/2006/main">
-  <p:cSld>
-    <p:spTree>
-      <p:nvGrpSpPr>
-        <p:cNvPr id="1" name=""/>
-        <p:cNvGrpSpPr/>
-        <p:nvPr/>
-      </p:nvGrpSpPr>
-      <p:grpSpPr>
-        <a:xfrm>
-          <a:off x="0" y="0"/>
-          <a:ext cx="0" cy="0"/>
-          <a:chOff x="0" y="0"/>
-          <a:chExt cx="0" cy="0"/>
-        </a:xfrm>
-      </p:grpSpPr>
-      <p:sp>
-        <p:nvSpPr>
-          <p:cNvPr id="2" name="Slide Image Placeholder 1"/>
-          <p:cNvSpPr>
-            <a:spLocks noGrp="1" noRot="1" noChangeAspect="1"/>
-          </p:cNvSpPr>
-          <p:nvPr>
-            <p:ph type="sldImg"/>
-          </p:nvPr>
-        </p:nvSpPr>
-        <p:spPr>
-          <a:xfrm>
-            <a:off x="381000" y="685800"/>
-            <a:ext cx="6096000" cy="3429000"/>
-          </a:xfrm>
-        </p:spPr>
-      </p:sp>
-      <p:sp>
-        <p:nvSpPr>
-          <p:cNvPr id="3" name="Notes Placeholder 2"/>
-          <p:cNvSpPr>
-            <a:spLocks noGrp="1"/>
-          </p:cNvSpPr>
-          <p:nvPr>
-            <p:ph type="body" idx="1"/>
-          </p:nvPr>
-        </p:nvSpPr>
-        <p:spPr/>
-        <p:txBody>
-          <a:bodyPr/>
-          <a:lstStyle/>
-          <a:p>
-            <a:endParaRPr lang="en-US"/>
-          </a:p>
-        </p:txBody>
-      </p:sp>
-    </p:spTree>
-    <p:extLst>
-      <p:ext uri="{BB962C8B-B14F-4D97-AF65-F5344CB8AC3E}">
-        <p14:creationId xmlns:p14="http://schemas.microsoft.com/office/powerpoint/2010/main" val="2041210676"/>
-      </p:ext>
-    </p:extLst>
-  </p:cSld>
-  <p:clrMapOvr>
-    <a:masterClrMapping/>
-  </p:clrMapOvr>
-</p:notes>
-</file>
-
-<file path=ppt/notesSlides/notesSlide16.xml><?xml version="1.0" encoding="utf-8"?>
-<p:notes xmlns:a="http://schemas.openxmlformats.org/drawingml/2006/main" xmlns:r="http://schemas.openxmlformats.org/officeDocument/2006/relationships" xmlns:p="http://schemas.openxmlformats.org/presentationml/2006/main">
-  <p:cSld>
-    <p:spTree>
-      <p:nvGrpSpPr>
-        <p:cNvPr id="1" name=""/>
-        <p:cNvGrpSpPr/>
-        <p:nvPr/>
-      </p:nvGrpSpPr>
-      <p:grpSpPr>
-        <a:xfrm>
-          <a:off x="0" y="0"/>
-          <a:ext cx="0" cy="0"/>
-          <a:chOff x="0" y="0"/>
-          <a:chExt cx="0" cy="0"/>
-        </a:xfrm>
-      </p:grpSpPr>
-      <p:sp>
-        <p:nvSpPr>
-          <p:cNvPr id="2" name="Slide Image Placeholder 1"/>
-          <p:cNvSpPr>
-            <a:spLocks noGrp="1" noRot="1" noChangeAspect="1"/>
-          </p:cNvSpPr>
-          <p:nvPr>
-            <p:ph type="sldImg"/>
-          </p:nvPr>
-        </p:nvSpPr>
-        <p:spPr>
-          <a:xfrm>
-            <a:off x="381000" y="685800"/>
-            <a:ext cx="6096000" cy="3429000"/>
-          </a:xfrm>
-        </p:spPr>
-      </p:sp>
-      <p:sp>
-        <p:nvSpPr>
-          <p:cNvPr id="3" name="Notes Placeholder 2"/>
-          <p:cNvSpPr>
-            <a:spLocks noGrp="1"/>
-          </p:cNvSpPr>
-          <p:nvPr>
-            <p:ph type="body" idx="1"/>
-          </p:nvPr>
-        </p:nvSpPr>
-        <p:spPr/>
-        <p:txBody>
-          <a:bodyPr/>
-          <a:lstStyle/>
-          <a:p>
-            <a:endParaRPr lang="en-US"/>
-          </a:p>
-        </p:txBody>
-      </p:sp>
-    </p:spTree>
-    <p:extLst>
-      <p:ext uri="{BB962C8B-B14F-4D97-AF65-F5344CB8AC3E}">
-        <p14:creationId xmlns:p14="http://schemas.microsoft.com/office/powerpoint/2010/main" val="2041210676"/>
-      </p:ext>
-    </p:extLst>
-  </p:cSld>
-  <p:clrMapOvr>
-    <a:masterClrMapping/>
-  </p:clrMapOvr>
-</p:notes>
-</file>
-
-<file path=ppt/notesSlides/notesSlide17.xml><?xml version="1.0" encoding="utf-8"?>
 <p:notes xmlns:a="http://schemas.openxmlformats.org/drawingml/2006/main" xmlns:r="http://schemas.openxmlformats.org/officeDocument/2006/relationships" xmlns:p="http://schemas.openxmlformats.org/presentationml/2006/main" showMasterSp="0" showMasterPhAnim="0">
   <p:cSld>
     <p:spTree>
@@ -1469,8 +1333,8 @@
               <a:t>An application runs in a </a:t>
             </a:r>
             <a:r>
-              <a:rPr lang="en-US" b="1" dirty="0"/>
-              <a:t>DEA, </a:t>
+              <a:rPr lang="en-US" b="1" dirty="0" smtClean="0"/>
+              <a:t>CELL, </a:t>
             </a:r>
             <a:r>
               <a:rPr lang="en-US" dirty="0"/>
@@ -6502,19 +6366,6 @@
               </a:rPr>
               <a:t>Pivotal Cloud Foundry</a:t>
             </a:r>
-            <a:endParaRPr lang="en-US" sz="4200" b="1" spc="-100" dirty="0" smtClean="0">
-              <a:solidFill>
-                <a:srgbClr val="00AE9E"/>
-              </a:solidFill>
-              <a:effectLst>
-                <a:outerShdw blurRad="50800" dist="38100" dir="5400000" algn="t" rotWithShape="0">
-                  <a:prstClr val="black">
-                    <a:alpha val="40000"/>
-                  </a:prstClr>
-                </a:outerShdw>
-              </a:effectLst>
-              <a:cs typeface="Arial"/>
-            </a:endParaRPr>
           </a:p>
           <a:p>
             <a:pPr>
@@ -6621,16 +6472,7 @@
                 </a:solidFill>
                 <a:cs typeface="Arial"/>
               </a:rPr>
-              <a:t>@</a:t>
-            </a:r>
-            <a:r>
-              <a:rPr lang="en-US" sz="1600" dirty="0" err="1" smtClean="0">
-                <a:solidFill>
-                  <a:srgbClr val="FFFFFF"/>
-                </a:solidFill>
-                <a:cs typeface="Arial"/>
-              </a:rPr>
-              <a:t>pivotal.io</a:t>
+              <a:t>@pivotal.io</a:t>
             </a:r>
             <a:endParaRPr lang="en-US" sz="1600" dirty="0">
               <a:solidFill>
@@ -7001,8 +6843,21 @@
                   <a:schemeClr val="bg2"/>
                 </a:solidFill>
               </a:rPr>
-              <a:t> (includes HAWQ), Spring XD</a:t>
-            </a:r>
+              <a:t> (includes HAWQ), </a:t>
+            </a:r>
+            <a:r>
+              <a:rPr lang="en-US" dirty="0" smtClean="0">
+                <a:solidFill>
+                  <a:schemeClr val="bg2"/>
+                </a:solidFill>
+              </a:rPr>
+              <a:t>Data Flow</a:t>
+            </a:r>
+            <a:endParaRPr lang="en-US" dirty="0" smtClean="0">
+              <a:solidFill>
+                <a:schemeClr val="bg2"/>
+              </a:solidFill>
+            </a:endParaRPr>
           </a:p>
         </p:txBody>
       </p:sp>
@@ -10844,7 +10699,7 @@
         </p:nvSpPr>
         <p:spPr>
           <a:xfrm>
-            <a:off x="4876800" y="2190750"/>
+            <a:off x="5780088" y="2190750"/>
             <a:ext cx="914400" cy="405826"/>
           </a:xfrm>
           <a:prstGeom prst="roundRect">
@@ -10901,7 +10756,7 @@
         </p:nvSpPr>
         <p:spPr>
           <a:xfrm>
-            <a:off x="5867400" y="2190750"/>
+            <a:off x="6770688" y="2190750"/>
             <a:ext cx="914400" cy="381000"/>
           </a:xfrm>
           <a:prstGeom prst="roundRect">
@@ -10945,63 +10800,6 @@
             <a:r>
               <a:rPr lang="en-US" sz="1000" dirty="0" smtClean="0"/>
               <a:t>Gateway</a:t>
-            </a:r>
-            <a:endParaRPr lang="en-US" sz="1000" dirty="0"/>
-          </a:p>
-        </p:txBody>
-      </p:sp>
-      <p:sp>
-        <p:nvSpPr>
-          <p:cNvPr id="26" name="Rounded Rectangle 25"/>
-          <p:cNvSpPr/>
-          <p:nvPr/>
-        </p:nvSpPr>
-        <p:spPr>
-          <a:xfrm>
-            <a:off x="6858000" y="2190750"/>
-            <a:ext cx="914400" cy="381000"/>
-          </a:xfrm>
-          <a:prstGeom prst="roundRect">
-            <a:avLst/>
-          </a:prstGeom>
-          <a:solidFill>
-            <a:schemeClr val="tx1"/>
-          </a:solidFill>
-          <a:ln w="12700">
-            <a:noFill/>
-          </a:ln>
-        </p:spPr>
-        <p:style>
-          <a:lnRef idx="2">
-            <a:schemeClr val="accent1">
-              <a:shade val="50000"/>
-            </a:schemeClr>
-          </a:lnRef>
-          <a:fillRef idx="1">
-            <a:schemeClr val="accent1"/>
-          </a:fillRef>
-          <a:effectRef idx="0">
-            <a:schemeClr val="accent1"/>
-          </a:effectRef>
-          <a:fontRef idx="minor">
-            <a:schemeClr val="lt1"/>
-          </a:fontRef>
-        </p:style>
-        <p:txBody>
-          <a:bodyPr rtlCol="0" anchor="ctr"/>
-          <a:lstStyle/>
-          <a:p>
-            <a:pPr algn="ctr"/>
-            <a:r>
-              <a:rPr lang="en-US" sz="1000" dirty="0" smtClean="0"/>
-              <a:t>Data</a:t>
-            </a:r>
-          </a:p>
-          <a:p>
-            <a:pPr algn="ctr"/>
-            <a:r>
-              <a:rPr lang="en-US" sz="1000" dirty="0" smtClean="0"/>
-              <a:t>Sync</a:t>
             </a:r>
             <a:endParaRPr lang="en-US" sz="1000" dirty="0"/>
           </a:p>
@@ -11066,63 +10864,6 @@
                 <a:schemeClr val="accent5"/>
               </a:solidFill>
             </a:endParaRPr>
-          </a:p>
-        </p:txBody>
-      </p:sp>
-      <p:sp>
-        <p:nvSpPr>
-          <p:cNvPr id="17" name="Rounded Rectangle 16"/>
-          <p:cNvSpPr/>
-          <p:nvPr/>
-        </p:nvSpPr>
-        <p:spPr>
-          <a:xfrm>
-            <a:off x="7848600" y="2190750"/>
-            <a:ext cx="914400" cy="381000"/>
-          </a:xfrm>
-          <a:prstGeom prst="roundRect">
-            <a:avLst/>
-          </a:prstGeom>
-          <a:solidFill>
-            <a:schemeClr val="tx1"/>
-          </a:solidFill>
-          <a:ln w="12700">
-            <a:noFill/>
-          </a:ln>
-        </p:spPr>
-        <p:style>
-          <a:lnRef idx="2">
-            <a:schemeClr val="accent1">
-              <a:shade val="50000"/>
-            </a:schemeClr>
-          </a:lnRef>
-          <a:fillRef idx="1">
-            <a:schemeClr val="accent1"/>
-          </a:fillRef>
-          <a:effectRef idx="0">
-            <a:schemeClr val="accent1"/>
-          </a:effectRef>
-          <a:fontRef idx="minor">
-            <a:schemeClr val="lt1"/>
-          </a:fontRef>
-        </p:style>
-        <p:txBody>
-          <a:bodyPr rtlCol="0" anchor="ctr"/>
-          <a:lstStyle/>
-          <a:p>
-            <a:pPr algn="ctr"/>
-            <a:r>
-              <a:rPr lang="en-US" sz="1000" dirty="0" smtClean="0"/>
-              <a:t>App</a:t>
-            </a:r>
-          </a:p>
-          <a:p>
-            <a:pPr algn="ctr"/>
-            <a:r>
-              <a:rPr lang="en-US" sz="1000" dirty="0" smtClean="0"/>
-              <a:t>Distribution</a:t>
-            </a:r>
-            <a:endParaRPr lang="en-US" sz="1000" dirty="0"/>
           </a:p>
         </p:txBody>
       </p:sp>
@@ -11505,19 +11246,7 @@
                   <a:srgbClr val="2C95DD"/>
                 </a:solidFill>
               </a:rPr>
-              <a:t>Data</a:t>
-            </a:r>
-            <a:r>
-              <a:rPr lang="en-US" dirty="0" smtClean="0"/>
-              <a:t> </a:t>
-            </a:r>
-            <a:r>
-              <a:rPr lang="en-US" sz="2800" dirty="0">
-                <a:solidFill>
-                  <a:srgbClr val="2C95DD"/>
-                </a:solidFill>
-              </a:rPr>
-              <a:t>Sync</a:t>
+              <a:t>API Gateway</a:t>
             </a:r>
           </a:p>
         </p:txBody>
@@ -11534,8 +11263,8 @@
         </p:nvSpPr>
         <p:spPr>
           <a:xfrm>
-            <a:off x="366716" y="898980"/>
-            <a:ext cx="6457960" cy="3382962"/>
+            <a:off x="381000" y="884464"/>
+            <a:ext cx="6589089" cy="2362200"/>
           </a:xfrm>
           <a:prstGeom prst="rect">
             <a:avLst/>
@@ -11560,28 +11289,12 @@
               <a:buChar char="•"/>
             </a:pPr>
             <a:r>
-              <a:rPr lang="en-US" sz="1800" dirty="0">
+              <a:rPr lang="en-US" sz="1800" dirty="0" smtClean="0">
                 <a:solidFill>
                   <a:srgbClr val="FFFFFF"/>
                 </a:solidFill>
               </a:rPr>
-              <a:t>Apps</a:t>
-            </a:r>
-            <a:r>
-              <a:rPr lang="en-US" sz="1800" dirty="0" smtClean="0">
-                <a:solidFill>
-                  <a:srgbClr val="FFFFFF"/>
-                </a:solidFill>
-              </a:rPr>
-              <a:t> </a:t>
-            </a:r>
-            <a:r>
-              <a:rPr lang="en-US" sz="1800" dirty="0">
-                <a:solidFill>
-                  <a:srgbClr val="FFFFFF"/>
-                </a:solidFill>
-              </a:rPr>
-              <a:t>need to store mobile-specific data, but the existing backend cannot accommodate </a:t>
+              <a:t>Legacy APIs are not optimized for mobile</a:t>
             </a:r>
           </a:p>
           <a:p>
@@ -11595,7 +11308,7 @@
                   <a:srgbClr val="FFFFFF"/>
                 </a:solidFill>
               </a:rPr>
-              <a:t>Data sync / store is difficult for an app developer to set up</a:t>
+              <a:t>Too much unnecessary content delivered to devices</a:t>
             </a:r>
           </a:p>
           <a:p>
@@ -11604,12 +11317,26 @@
               <a:buChar char="•"/>
             </a:pPr>
             <a:r>
+              <a:rPr lang="en-US" sz="1800" dirty="0">
+                <a:solidFill>
+                  <a:srgbClr val="FFFFFF"/>
+                </a:solidFill>
+              </a:rPr>
+              <a:t>Mobile very sensitive to latency (often weak or no signal)</a:t>
+            </a:r>
+          </a:p>
+          <a:p>
+            <a:pPr marL="285750" lvl="1" indent="-285750">
+              <a:buFont typeface="Arial"/>
+              <a:buChar char="•"/>
+            </a:pPr>
+            <a:r>
               <a:rPr lang="en-US" sz="1800" dirty="0" smtClean="0">
                 <a:solidFill>
                   <a:srgbClr val="FFFFFF"/>
                 </a:solidFill>
               </a:rPr>
-              <a:t>Existing services provide public cloud “black box” storage</a:t>
+              <a:t>Mobile apps often require several API calls to display a single page of content</a:t>
             </a:r>
           </a:p>
           <a:p>
@@ -11641,7 +11368,21 @@
                   <a:srgbClr val="FFFFFF"/>
                 </a:solidFill>
               </a:rPr>
-              <a:t>Mobile-optimized API for access to multiple types of storage </a:t>
+              <a:t>Allows mobile developers to easily transform APIs</a:t>
+            </a:r>
+          </a:p>
+          <a:p>
+            <a:pPr marL="285750" lvl="2" indent="-285750">
+              <a:buFont typeface="Arial"/>
+              <a:buChar char="•"/>
+            </a:pPr>
+            <a:r>
+              <a:rPr lang="en-US" sz="1800" dirty="0">
+                <a:solidFill>
+                  <a:srgbClr val="FFFFFF"/>
+                </a:solidFill>
+              </a:rPr>
+              <a:t>Deliver mobile-optimized, device specific content </a:t>
             </a:r>
           </a:p>
           <a:p>
@@ -11654,9 +11395,15 @@
                 <a:solidFill>
                   <a:srgbClr val="FFFFFF"/>
                 </a:solidFill>
-              </a:rPr>
-              <a:t>Simple for developers, yet enterprise-grade and highly scalable</a:t>
-            </a:r>
+                <a:sym typeface="Wingdings"/>
+              </a:rPr>
+              <a:t>Results in improved performance and user experience</a:t>
+            </a:r>
+            <a:endParaRPr lang="en-US" sz="1800" dirty="0">
+              <a:solidFill>
+                <a:srgbClr val="FFFFFF"/>
+              </a:solidFill>
+            </a:endParaRPr>
           </a:p>
           <a:p>
             <a:endParaRPr lang="en-US" sz="2200" dirty="0" smtClean="0">
@@ -11667,40 +11414,10 @@
           </a:p>
         </p:txBody>
       </p:sp>
-      <p:pic>
-        <p:nvPicPr>
-          <p:cNvPr id="5" name="Picture 4" descr="settings.png"/>
-          <p:cNvPicPr>
-            <a:picLocks noChangeAspect="1"/>
-          </p:cNvPicPr>
-          <p:nvPr/>
-        </p:nvPicPr>
-        <p:blipFill>
-          <a:blip r:embed="rId3">
-            <a:extLst>
-              <a:ext uri="{28A0092B-C50C-407E-A947-70E740481C1C}">
-                <a14:useLocalDpi xmlns:a14="http://schemas.microsoft.com/office/drawing/2010/main" val="0"/>
-              </a:ext>
-            </a:extLst>
-          </a:blip>
-          <a:stretch>
-            <a:fillRect/>
-          </a:stretch>
-        </p:blipFill>
-        <p:spPr>
-          <a:xfrm>
-            <a:off x="7162800" y="742950"/>
-            <a:ext cx="1600200" cy="3378199"/>
-          </a:xfrm>
-          <a:prstGeom prst="rect">
-            <a:avLst/>
-          </a:prstGeom>
-        </p:spPr>
-      </p:pic>
     </p:spTree>
     <p:extLst>
       <p:ext uri="{BB962C8B-B14F-4D97-AF65-F5344CB8AC3E}">
-        <p14:creationId xmlns:p14="http://schemas.microsoft.com/office/powerpoint/2010/main" val="2503070687"/>
+        <p14:creationId xmlns:p14="http://schemas.microsoft.com/office/powerpoint/2010/main" val="3694444729"/>
       </p:ext>
     </p:extLst>
   </p:cSld>
@@ -14705,498 +14422,6 @@
   <p:cSld>
     <p:spTree>
       <p:nvGrpSpPr>
-        <p:cNvPr id="1" name=""/>
-        <p:cNvGrpSpPr/>
-        <p:nvPr/>
-      </p:nvGrpSpPr>
-      <p:grpSpPr>
-        <a:xfrm>
-          <a:off x="0" y="0"/>
-          <a:ext cx="0" cy="0"/>
-          <a:chOff x="0" y="0"/>
-          <a:chExt cx="0" cy="0"/>
-        </a:xfrm>
-      </p:grpSpPr>
-      <p:sp>
-        <p:nvSpPr>
-          <p:cNvPr id="2" name="Title 1"/>
-          <p:cNvSpPr>
-            <a:spLocks noGrp="1"/>
-          </p:cNvSpPr>
-          <p:nvPr>
-            <p:ph type="title"/>
-          </p:nvPr>
-        </p:nvSpPr>
-        <p:spPr/>
-        <p:txBody>
-          <a:bodyPr/>
-          <a:lstStyle/>
-          <a:p>
-            <a:r>
-              <a:rPr lang="en-US" sz="2800" dirty="0">
-                <a:solidFill>
-                  <a:srgbClr val="2C95DD"/>
-                </a:solidFill>
-              </a:rPr>
-              <a:t>API Gateway</a:t>
-            </a:r>
-          </a:p>
-        </p:txBody>
-      </p:sp>
-      <p:sp>
-        <p:nvSpPr>
-          <p:cNvPr id="3" name="Content Placeholder 2"/>
-          <p:cNvSpPr>
-            <a:spLocks noGrp="1"/>
-          </p:cNvSpPr>
-          <p:nvPr>
-            <p:ph sz="quarter" idx="4294967295"/>
-          </p:nvPr>
-        </p:nvSpPr>
-        <p:spPr>
-          <a:xfrm>
-            <a:off x="381000" y="884464"/>
-            <a:ext cx="6589089" cy="2362200"/>
-          </a:xfrm>
-          <a:prstGeom prst="rect">
-            <a:avLst/>
-          </a:prstGeom>
-        </p:spPr>
-        <p:txBody>
-          <a:bodyPr/>
-          <a:lstStyle/>
-          <a:p>
-            <a:r>
-              <a:rPr lang="en-US" sz="2000" dirty="0" smtClean="0">
-                <a:solidFill>
-                  <a:srgbClr val="FFFFFF"/>
-                </a:solidFill>
-              </a:rPr>
-              <a:t>Problem</a:t>
-            </a:r>
-          </a:p>
-          <a:p>
-            <a:pPr marL="285750" lvl="1" indent="-285750">
-              <a:buFont typeface="Arial"/>
-              <a:buChar char="•"/>
-            </a:pPr>
-            <a:r>
-              <a:rPr lang="en-US" sz="1800" dirty="0" smtClean="0">
-                <a:solidFill>
-                  <a:srgbClr val="FFFFFF"/>
-                </a:solidFill>
-              </a:rPr>
-              <a:t>Legacy APIs are not optimized for mobile</a:t>
-            </a:r>
-          </a:p>
-          <a:p>
-            <a:pPr marL="285750" lvl="1" indent="-285750">
-              <a:buFont typeface="Arial"/>
-              <a:buChar char="•"/>
-            </a:pPr>
-            <a:r>
-              <a:rPr lang="en-US" sz="1800" dirty="0" smtClean="0">
-                <a:solidFill>
-                  <a:srgbClr val="FFFFFF"/>
-                </a:solidFill>
-              </a:rPr>
-              <a:t>Too much unnecessary content delivered to devices</a:t>
-            </a:r>
-          </a:p>
-          <a:p>
-            <a:pPr marL="285750" lvl="1" indent="-285750">
-              <a:buFont typeface="Arial"/>
-              <a:buChar char="•"/>
-            </a:pPr>
-            <a:r>
-              <a:rPr lang="en-US" sz="1800" dirty="0">
-                <a:solidFill>
-                  <a:srgbClr val="FFFFFF"/>
-                </a:solidFill>
-              </a:rPr>
-              <a:t>Mobile very sensitive to latency (often weak or no signal)</a:t>
-            </a:r>
-          </a:p>
-          <a:p>
-            <a:pPr marL="285750" lvl="1" indent="-285750">
-              <a:buFont typeface="Arial"/>
-              <a:buChar char="•"/>
-            </a:pPr>
-            <a:r>
-              <a:rPr lang="en-US" sz="1800" dirty="0" smtClean="0">
-                <a:solidFill>
-                  <a:srgbClr val="FFFFFF"/>
-                </a:solidFill>
-              </a:rPr>
-              <a:t>Mobile apps often require several API calls to display a single page of content</a:t>
-            </a:r>
-          </a:p>
-          <a:p>
-            <a:pPr lvl="1"/>
-            <a:endParaRPr lang="en-US" sz="1800" dirty="0" smtClean="0">
-              <a:solidFill>
-                <a:srgbClr val="FFFFFF"/>
-              </a:solidFill>
-            </a:endParaRPr>
-          </a:p>
-          <a:p>
-            <a:r>
-              <a:rPr lang="en-US" sz="2000" dirty="0">
-                <a:solidFill>
-                  <a:srgbClr val="FFFFFF"/>
-                </a:solidFill>
-              </a:rPr>
-              <a:t>Solution / Benefits</a:t>
-            </a:r>
-          </a:p>
-          <a:p>
-            <a:pPr marL="285750" lvl="1" indent="-285750">
-              <a:buFont typeface="Arial"/>
-              <a:buChar char="•"/>
-            </a:pPr>
-            <a:r>
-              <a:rPr lang="en-US" sz="1800" dirty="0">
-                <a:solidFill>
-                  <a:srgbClr val="FFFFFF"/>
-                </a:solidFill>
-              </a:rPr>
-              <a:t>Allows mobile developers to easily transform APIs</a:t>
-            </a:r>
-          </a:p>
-          <a:p>
-            <a:pPr marL="285750" lvl="2" indent="-285750">
-              <a:buFont typeface="Arial"/>
-              <a:buChar char="•"/>
-            </a:pPr>
-            <a:r>
-              <a:rPr lang="en-US" sz="1800" dirty="0">
-                <a:solidFill>
-                  <a:srgbClr val="FFFFFF"/>
-                </a:solidFill>
-              </a:rPr>
-              <a:t>Deliver mobile-optimized, device specific content </a:t>
-            </a:r>
-          </a:p>
-          <a:p>
-            <a:pPr marL="285750" lvl="1" indent="-285750">
-              <a:buFont typeface="Arial"/>
-              <a:buChar char="•"/>
-            </a:pPr>
-            <a:r>
-              <a:rPr lang="en-US" sz="1800" dirty="0">
-                <a:solidFill>
-                  <a:srgbClr val="FFFFFF"/>
-                </a:solidFill>
-                <a:sym typeface="Wingdings"/>
-              </a:rPr>
-              <a:t>Results in improved performance and user experience</a:t>
-            </a:r>
-            <a:endParaRPr lang="en-US" sz="1800" dirty="0">
-              <a:solidFill>
-                <a:srgbClr val="FFFFFF"/>
-              </a:solidFill>
-            </a:endParaRPr>
-          </a:p>
-          <a:p>
-            <a:endParaRPr lang="en-US" sz="2200" dirty="0" smtClean="0">
-              <a:solidFill>
-                <a:srgbClr val="FFFFFF"/>
-              </a:solidFill>
-            </a:endParaRPr>
-          </a:p>
-        </p:txBody>
-      </p:sp>
-    </p:spTree>
-    <p:extLst>
-      <p:ext uri="{BB962C8B-B14F-4D97-AF65-F5344CB8AC3E}">
-        <p14:creationId xmlns:p14="http://schemas.microsoft.com/office/powerpoint/2010/main" val="3694444729"/>
-      </p:ext>
-    </p:extLst>
-  </p:cSld>
-  <p:clrMapOvr>
-    <a:masterClrMapping/>
-  </p:clrMapOvr>
-  <mc:AlternateContent xmlns:mc="http://schemas.openxmlformats.org/markup-compatibility/2006" xmlns:p14="http://schemas.microsoft.com/office/powerpoint/2010/main">
-    <mc:Choice Requires="p14">
-      <p:transition spd="slow" p14:dur="2000"/>
-    </mc:Choice>
-    <mc:Fallback xmlns="">
-      <p:transition xmlns:p14="http://schemas.microsoft.com/office/powerpoint/2010/main" spd="slow"/>
-    </mc:Fallback>
-  </mc:AlternateContent>
-  <p:timing>
-    <p:tnLst>
-      <p:par>
-        <p:cTn xmlns:p14="http://schemas.microsoft.com/office/powerpoint/2010/main" id="1" dur="indefinite" restart="never" nodeType="tmRoot"/>
-      </p:par>
-    </p:tnLst>
-  </p:timing>
-</p:sld>
-</file>
-
-<file path=ppt/slides/slide21.xml><?xml version="1.0" encoding="utf-8"?>
-<p:sld xmlns:a="http://schemas.openxmlformats.org/drawingml/2006/main" xmlns:r="http://schemas.openxmlformats.org/officeDocument/2006/relationships" xmlns:p="http://schemas.openxmlformats.org/presentationml/2006/main">
-  <p:cSld>
-    <p:spTree>
-      <p:nvGrpSpPr>
-        <p:cNvPr id="1" name=""/>
-        <p:cNvGrpSpPr/>
-        <p:nvPr/>
-      </p:nvGrpSpPr>
-      <p:grpSpPr>
-        <a:xfrm>
-          <a:off x="0" y="0"/>
-          <a:ext cx="0" cy="0"/>
-          <a:chOff x="0" y="0"/>
-          <a:chExt cx="0" cy="0"/>
-        </a:xfrm>
-      </p:grpSpPr>
-      <p:sp>
-        <p:nvSpPr>
-          <p:cNvPr id="2" name="Title 1"/>
-          <p:cNvSpPr>
-            <a:spLocks noGrp="1"/>
-          </p:cNvSpPr>
-          <p:nvPr>
-            <p:ph type="title"/>
-          </p:nvPr>
-        </p:nvSpPr>
-        <p:spPr/>
-        <p:txBody>
-          <a:bodyPr/>
-          <a:lstStyle/>
-          <a:p>
-            <a:r>
-              <a:rPr lang="en-US" sz="2800" dirty="0">
-                <a:solidFill>
-                  <a:srgbClr val="2C95DD"/>
-                </a:solidFill>
-              </a:rPr>
-              <a:t>App Distribution</a:t>
-            </a:r>
-          </a:p>
-        </p:txBody>
-      </p:sp>
-      <p:sp>
-        <p:nvSpPr>
-          <p:cNvPr id="3" name="Content Placeholder 2"/>
-          <p:cNvSpPr>
-            <a:spLocks noGrp="1"/>
-          </p:cNvSpPr>
-          <p:nvPr>
-            <p:ph sz="quarter" idx="4294967295"/>
-          </p:nvPr>
-        </p:nvSpPr>
-        <p:spPr>
-          <a:xfrm>
-            <a:off x="381001" y="993321"/>
-            <a:ext cx="4292600" cy="1447800"/>
-          </a:xfrm>
-          <a:prstGeom prst="rect">
-            <a:avLst/>
-          </a:prstGeom>
-        </p:spPr>
-        <p:txBody>
-          <a:bodyPr/>
-          <a:lstStyle/>
-          <a:p>
-            <a:r>
-              <a:rPr lang="en-US" sz="2000" b="1" dirty="0" smtClean="0">
-                <a:solidFill>
-                  <a:srgbClr val="FFFFFF"/>
-                </a:solidFill>
-              </a:rPr>
-              <a:t>Problem</a:t>
-            </a:r>
-          </a:p>
-          <a:p>
-            <a:pPr marL="285750" lvl="1" indent="-285750">
-              <a:buFont typeface="Arial"/>
-              <a:buChar char="•"/>
-            </a:pPr>
-            <a:r>
-              <a:rPr lang="en-US" sz="1800" dirty="0" smtClean="0">
-                <a:solidFill>
-                  <a:srgbClr val="FFFFFF"/>
-                </a:solidFill>
-              </a:rPr>
-              <a:t>Extensive user testing of apps is critical to success</a:t>
-            </a:r>
-          </a:p>
-          <a:p>
-            <a:pPr marL="285750" lvl="1" indent="-285750">
-              <a:buFont typeface="Arial"/>
-              <a:buChar char="•"/>
-            </a:pPr>
-            <a:r>
-              <a:rPr lang="en-US" sz="1800" dirty="0" smtClean="0">
-                <a:solidFill>
-                  <a:srgbClr val="FFFFFF"/>
-                </a:solidFill>
-              </a:rPr>
-              <a:t>Difficult to distribute pre-release apps to test users</a:t>
-            </a:r>
-          </a:p>
-          <a:p>
-            <a:pPr marL="285750" lvl="1" indent="-285750">
-              <a:buFont typeface="Arial"/>
-              <a:buChar char="•"/>
-            </a:pPr>
-            <a:r>
-              <a:rPr lang="en-US" sz="1800" dirty="0" smtClean="0">
-                <a:solidFill>
-                  <a:srgbClr val="FFFFFF"/>
-                </a:solidFill>
-              </a:rPr>
-              <a:t>Existing solutions are public cloud</a:t>
-            </a:r>
-          </a:p>
-          <a:p>
-            <a:pPr lvl="1"/>
-            <a:endParaRPr lang="en-US" sz="1800" dirty="0" smtClean="0">
-              <a:solidFill>
-                <a:srgbClr val="FFFFFF"/>
-              </a:solidFill>
-            </a:endParaRPr>
-          </a:p>
-          <a:p>
-            <a:r>
-              <a:rPr lang="en-US" sz="2000" b="1" dirty="0">
-                <a:solidFill>
-                  <a:srgbClr val="FFFFFF"/>
-                </a:solidFill>
-              </a:rPr>
-              <a:t>Solution / Benefits</a:t>
-            </a:r>
-          </a:p>
-          <a:p>
-            <a:pPr marL="285750" lvl="1" indent="-285750">
-              <a:buFont typeface="Arial"/>
-              <a:buChar char="•"/>
-            </a:pPr>
-            <a:r>
-              <a:rPr lang="en-US" sz="1800" dirty="0">
-                <a:solidFill>
-                  <a:srgbClr val="FFFFFF"/>
-                </a:solidFill>
-              </a:rPr>
-              <a:t>Easy OTA app distribution</a:t>
-            </a:r>
-          </a:p>
-          <a:p>
-            <a:pPr marL="285750" lvl="1" indent="-285750">
-              <a:buFont typeface="Arial"/>
-              <a:buChar char="•"/>
-            </a:pPr>
-            <a:r>
-              <a:rPr lang="en-US" sz="1800" dirty="0">
-                <a:solidFill>
-                  <a:srgbClr val="FFFFFF"/>
-                </a:solidFill>
-              </a:rPr>
-              <a:t>User / team management</a:t>
-            </a:r>
-          </a:p>
-          <a:p>
-            <a:pPr marL="285750" lvl="1" indent="-285750">
-              <a:buFont typeface="Arial"/>
-              <a:buChar char="•"/>
-            </a:pPr>
-            <a:r>
-              <a:rPr lang="en-US" sz="1800" dirty="0">
-                <a:solidFill>
-                  <a:srgbClr val="FFFFFF"/>
-                </a:solidFill>
-              </a:rPr>
-              <a:t>Supports all major platforms</a:t>
-            </a:r>
-          </a:p>
-          <a:p>
-            <a:pPr marL="285750" lvl="1" indent="-285750">
-              <a:buFont typeface="Arial"/>
-              <a:buChar char="•"/>
-            </a:pPr>
-            <a:r>
-              <a:rPr lang="en-US" sz="1800" dirty="0">
-                <a:solidFill>
-                  <a:srgbClr val="FFFFFF"/>
-                </a:solidFill>
-              </a:rPr>
-              <a:t>Private cloud for control / security</a:t>
-            </a:r>
-          </a:p>
-          <a:p>
-            <a:endParaRPr lang="en-US" sz="2200" dirty="0" smtClean="0">
-              <a:solidFill>
-                <a:srgbClr val="FFFFFF"/>
-              </a:solidFill>
-            </a:endParaRPr>
-          </a:p>
-        </p:txBody>
-      </p:sp>
-      <p:pic>
-        <p:nvPicPr>
-          <p:cNvPr id="4" name="Picture 3" descr="app-dist.png"/>
-          <p:cNvPicPr>
-            <a:picLocks noChangeAspect="1"/>
-          </p:cNvPicPr>
-          <p:nvPr/>
-        </p:nvPicPr>
-        <p:blipFill>
-          <a:blip r:embed="rId3">
-            <a:extLst>
-              <a:ext uri="{28A0092B-C50C-407E-A947-70E740481C1C}">
-                <a14:useLocalDpi xmlns:a14="http://schemas.microsoft.com/office/drawing/2010/main" val="0"/>
-              </a:ext>
-            </a:extLst>
-          </a:blip>
-          <a:stretch>
-            <a:fillRect/>
-          </a:stretch>
-        </p:blipFill>
-        <p:spPr>
-          <a:xfrm>
-            <a:off x="4761430" y="1197430"/>
-            <a:ext cx="4285649" cy="2764064"/>
-          </a:xfrm>
-          <a:prstGeom prst="rect">
-            <a:avLst/>
-          </a:prstGeom>
-        </p:spPr>
-      </p:pic>
-    </p:spTree>
-    <p:extLst>
-      <p:ext uri="{BB962C8B-B14F-4D97-AF65-F5344CB8AC3E}">
-        <p14:creationId xmlns:p14="http://schemas.microsoft.com/office/powerpoint/2010/main" val="1137540586"/>
-      </p:ext>
-    </p:extLst>
-  </p:cSld>
-  <p:clrMapOvr>
-    <a:masterClrMapping/>
-  </p:clrMapOvr>
-  <mc:AlternateContent xmlns:mc="http://schemas.openxmlformats.org/markup-compatibility/2006" xmlns:p14="http://schemas.microsoft.com/office/powerpoint/2010/main">
-    <mc:Choice Requires="p14">
-      <p:transition spd="slow" p14:dur="2000"/>
-    </mc:Choice>
-    <mc:Fallback xmlns="">
-      <p:transition xmlns:p14="http://schemas.microsoft.com/office/powerpoint/2010/main" spd="slow"/>
-    </mc:Fallback>
-  </mc:AlternateContent>
-  <p:timing>
-    <p:tnLst>
-      <p:par>
-        <p:cTn xmlns:p14="http://schemas.microsoft.com/office/powerpoint/2010/main" id="1" dur="indefinite" restart="never" nodeType="tmRoot"/>
-      </p:par>
-    </p:tnLst>
-  </p:timing>
-</p:sld>
-</file>
-
-<file path=ppt/slides/slide22.xml><?xml version="1.0" encoding="utf-8"?>
-<p:sld xmlns:a="http://schemas.openxmlformats.org/drawingml/2006/main" xmlns:r="http://schemas.openxmlformats.org/officeDocument/2006/relationships" xmlns:p="http://schemas.openxmlformats.org/presentationml/2006/main">
-  <p:cSld>
-    <p:spTree>
-      <p:nvGrpSpPr>
         <p:cNvPr id="1" name="Shape 286"/>
         <p:cNvGrpSpPr/>
         <p:nvPr/>
@@ -15955,11 +15180,6 @@
               </a:rPr>
               <a:t>CI/CD</a:t>
             </a:r>
-            <a:endParaRPr lang="en-US" sz="1800" b="1" dirty="0" smtClean="0">
-              <a:solidFill>
-                <a:srgbClr val="000000"/>
-              </a:solidFill>
-            </a:endParaRPr>
           </a:p>
           <a:p>
             <a:pPr algn="ctr"/>
@@ -16184,11 +15404,6 @@
               </a:rPr>
               <a:t>Cloud Native</a:t>
             </a:r>
-            <a:endParaRPr lang="en-US" sz="1800" b="1" dirty="0" smtClean="0">
-              <a:solidFill>
-                <a:srgbClr val="000000"/>
-              </a:solidFill>
-            </a:endParaRPr>
           </a:p>
           <a:p>
             <a:pPr algn="ctr"/>
@@ -16693,25 +15908,8 @@
                 <a:latin typeface="FreightSans Pro Medium"/>
                 <a:cs typeface="FreightSans Pro Medium"/>
               </a:rPr>
-              <a:t>Push </a:t>
-            </a:r>
-            <a:r>
-              <a:rPr lang="en-US" sz="1200" dirty="0" smtClean="0">
-                <a:solidFill>
-                  <a:schemeClr val="bg2"/>
-                </a:solidFill>
-                <a:latin typeface="FreightSans Pro Medium"/>
-                <a:cs typeface="FreightSans Pro Medium"/>
-              </a:rPr>
-              <a:t>Notifications</a:t>
-            </a:r>
-            <a:endParaRPr lang="en-US" sz="1200" dirty="0" smtClean="0">
-              <a:solidFill>
-                <a:schemeClr val="bg2"/>
-              </a:solidFill>
-              <a:latin typeface="FreightSans Pro Medium"/>
-              <a:cs typeface="FreightSans Pro Medium"/>
-            </a:endParaRPr>
+              <a:t>Push Notifications</a:t>
+            </a:r>
           </a:p>
         </p:txBody>
       </p:sp>
@@ -16824,13 +16022,6 @@
               </a:rPr>
               <a:t>Data Flow</a:t>
             </a:r>
-            <a:endParaRPr lang="en-US" sz="1200" dirty="0" smtClean="0">
-              <a:solidFill>
-                <a:schemeClr val="bg2"/>
-              </a:solidFill>
-              <a:latin typeface="FreightSans Pro Medium"/>
-              <a:cs typeface="FreightSans Pro Medium"/>
-            </a:endParaRPr>
           </a:p>
         </p:txBody>
       </p:sp>
@@ -16874,25 +16065,8 @@
                 <a:latin typeface="FreightSans Pro Medium"/>
                 <a:cs typeface="FreightSans Pro Medium"/>
               </a:rPr>
-              <a:t> </a:t>
-            </a:r>
-            <a:r>
-              <a:rPr lang="en-US" sz="1200" dirty="0" smtClean="0">
-                <a:solidFill>
-                  <a:schemeClr val="bg2"/>
-                </a:solidFill>
-                <a:latin typeface="FreightSans Pro Medium"/>
-                <a:cs typeface="FreightSans Pro Medium"/>
-              </a:rPr>
-              <a:t>Server</a:t>
-            </a:r>
-            <a:endParaRPr lang="en-US" sz="1200" dirty="0" smtClean="0">
-              <a:solidFill>
-                <a:schemeClr val="bg2"/>
-              </a:solidFill>
-              <a:latin typeface="FreightSans Pro Medium"/>
-              <a:cs typeface="FreightSans Pro Medium"/>
-            </a:endParaRPr>
+              <a:t> Server</a:t>
+            </a:r>
           </a:p>
         </p:txBody>
       </p:sp>
@@ -17202,17 +16376,7 @@
                 <a:latin typeface="FreightSans Pro Medium"/>
                 <a:cs typeface="FreightSans Pro Medium"/>
               </a:rPr>
-              <a:t>Session </a:t>
-            </a:r>
-            <a:r>
-              <a:rPr lang="en-US" sz="1200" dirty="0" smtClean="0">
-                <a:solidFill>
-                  <a:schemeClr val="bg2"/>
-                </a:solidFill>
-                <a:latin typeface="FreightSans Pro Medium"/>
-                <a:cs typeface="FreightSans Pro Medium"/>
-              </a:rPr>
-              <a:t>state caching</a:t>
+              <a:t>Session state caching</a:t>
             </a:r>
             <a:endParaRPr lang="en-US" sz="1000" dirty="0" smtClean="0">
               <a:solidFill>
@@ -17456,13 +16620,6 @@
               </a:rPr>
               <a:t> Lab</a:t>
             </a:r>
-            <a:endParaRPr lang="en-US" sz="1200" dirty="0" smtClean="0">
-              <a:solidFill>
-                <a:schemeClr val="bg2"/>
-              </a:solidFill>
-              <a:latin typeface="FreightSans Pro Medium"/>
-              <a:cs typeface="FreightSans Pro Medium"/>
-            </a:endParaRPr>
           </a:p>
         </p:txBody>
       </p:sp>
@@ -17498,13 +16655,6 @@
               </a:rPr>
               <a:t>New Relic</a:t>
             </a:r>
-            <a:endParaRPr lang="en-US" sz="1200" dirty="0" smtClean="0">
-              <a:solidFill>
-                <a:schemeClr val="bg2"/>
-              </a:solidFill>
-              <a:latin typeface="FreightSans Pro Medium"/>
-              <a:cs typeface="FreightSans Pro Medium"/>
-            </a:endParaRPr>
           </a:p>
         </p:txBody>
       </p:sp>
@@ -17538,27 +16688,7 @@
                 <a:latin typeface="FreightSans Pro Medium"/>
                 <a:cs typeface="FreightSans Pro Medium"/>
               </a:rPr>
-              <a:t>ELK (</a:t>
-            </a:r>
-            <a:r>
-              <a:rPr lang="en-US" sz="1200" dirty="0" err="1" smtClean="0">
-                <a:solidFill>
-                  <a:schemeClr val="bg2"/>
-                </a:solidFill>
-                <a:latin typeface="FreightSans Pro Medium"/>
-                <a:cs typeface="FreightSans Pro Medium"/>
-              </a:rPr>
-              <a:t>StayUp.io</a:t>
-            </a:r>
-            <a:r>
-              <a:rPr lang="en-US" sz="1200" dirty="0" smtClean="0">
-                <a:solidFill>
-                  <a:schemeClr val="bg2"/>
-                </a:solidFill>
-                <a:latin typeface="FreightSans Pro Medium"/>
-                <a:cs typeface="FreightSans Pro Medium"/>
-              </a:rPr>
-              <a:t>)</a:t>
+              <a:t>App Dynamics</a:t>
             </a:r>
             <a:endParaRPr lang="en-US" sz="1200" dirty="0" smtClean="0">
               <a:solidFill>
@@ -17735,13 +16865,6 @@
               </a:rPr>
               <a:t>Powered by</a:t>
             </a:r>
-            <a:endParaRPr lang="en-US" sz="1200" dirty="0" smtClean="0">
-              <a:solidFill>
-                <a:schemeClr val="tx1"/>
-              </a:solidFill>
-              <a:latin typeface="FreightSans Pro Medium"/>
-              <a:cs typeface="FreightSans Pro Medium"/>
-            </a:endParaRPr>
           </a:p>
         </p:txBody>
       </p:sp>
@@ -19811,9 +18934,9 @@
           <p:nvPr/>
         </p:nvCxnSpPr>
         <p:spPr>
-          <a:xfrm rot="10800000" flipH="1">
+          <a:xfrm flipV="1">
             <a:off x="7064115" y="2144233"/>
-            <a:ext cx="675000" cy="1146900"/>
+            <a:ext cx="675001" cy="749007"/>
           </a:xfrm>
           <a:prstGeom prst="straightConnector1">
             <a:avLst/>
@@ -19838,7 +18961,7 @@
         </p:nvSpPr>
         <p:spPr>
           <a:xfrm>
-            <a:off x="6944810" y="2351050"/>
+            <a:off x="6799463" y="2351050"/>
             <a:ext cx="633818" cy="246219"/>
           </a:xfrm>
           <a:prstGeom prst="rect">

</xml_diff>

<commit_message>
Updated for EOL mobile services
</commit_message>
<xml_diff>
--- a/presentations/Session_4_Services_Overview.pptx
+++ b/presentations/Session_4_Services_Overview.pptx
@@ -5,7 +5,7 @@
     <p:sldMasterId id="2147483679" r:id="rId1"/>
   </p:sldMasterIdLst>
   <p:notesMasterIdLst>
-    <p:notesMasterId r:id="rId22"/>
+    <p:notesMasterId r:id="rId20"/>
   </p:notesMasterIdLst>
   <p:sldIdLst>
     <p:sldId id="499" r:id="rId2"/>
@@ -22,12 +22,10 @@
     <p:sldId id="486" r:id="rId13"/>
     <p:sldId id="487" r:id="rId14"/>
     <p:sldId id="488" r:id="rId15"/>
-    <p:sldId id="489" r:id="rId16"/>
-    <p:sldId id="490" r:id="rId17"/>
-    <p:sldId id="491" r:id="rId18"/>
-    <p:sldId id="492" r:id="rId19"/>
-    <p:sldId id="494" r:id="rId20"/>
-    <p:sldId id="497" r:id="rId21"/>
+    <p:sldId id="490" r:id="rId16"/>
+    <p:sldId id="492" r:id="rId17"/>
+    <p:sldId id="500" r:id="rId18"/>
+    <p:sldId id="497" r:id="rId19"/>
   </p:sldIdLst>
   <p:sldSz cx="9144000" cy="5143500" type="screen16x9"/>
   <p:notesSz cx="6858000" cy="9144000"/>
@@ -261,11 +259,9 @@
             <p14:sldId id="486"/>
             <p14:sldId id="487"/>
             <p14:sldId id="488"/>
-            <p14:sldId id="489"/>
             <p14:sldId id="490"/>
-            <p14:sldId id="491"/>
             <p14:sldId id="492"/>
-            <p14:sldId id="494"/>
+            <p14:sldId id="500"/>
             <p14:sldId id="497"/>
           </p14:sldIdLst>
         </p14:section>
@@ -688,7 +684,7 @@
       </p:grpSpPr>
       <p:sp>
         <p:nvSpPr>
-          <p:cNvPr id="2" name="Slide Image Placeholder 1"/>
+          <p:cNvPr id="160" name="Shape 160"/>
           <p:cNvSpPr>
             <a:spLocks noGrp="1" noRot="1" noChangeAspect="1"/>
           </p:cNvSpPr>
@@ -698,34 +694,55 @@
         </p:nvSpPr>
         <p:spPr>
           <a:xfrm>
-            <a:off x="1610876" y="686430"/>
-            <a:ext cx="3692769" cy="2082905"/>
+            <a:off x="381000" y="685800"/>
+            <a:ext cx="6096000" cy="3429000"/>
           </a:xfrm>
+          <a:prstGeom prst="rect">
+            <a:avLst/>
+          </a:prstGeom>
         </p:spPr>
+        <p:txBody>
+          <a:bodyPr lIns="90571" tIns="45286" rIns="90571" bIns="45286"/>
+          <a:lstStyle/>
+          <a:p>
+            <a:pPr lvl="0"/>
+            <a:endParaRPr/>
+          </a:p>
+        </p:txBody>
       </p:sp>
       <p:sp>
         <p:nvSpPr>
-          <p:cNvPr id="3" name="Notes Placeholder 2"/>
+          <p:cNvPr id="161" name="Shape 161"/>
           <p:cNvSpPr>
             <a:spLocks noGrp="1"/>
           </p:cNvSpPr>
           <p:nvPr>
-            <p:ph type="body" idx="1"/>
+            <p:ph type="body" sz="quarter" idx="1"/>
           </p:nvPr>
         </p:nvSpPr>
-        <p:spPr/>
+        <p:spPr>
+          <a:prstGeom prst="rect">
+            <a:avLst/>
+          </a:prstGeom>
+        </p:spPr>
         <p:txBody>
           <a:bodyPr/>
           <a:lstStyle/>
           <a:p>
-            <a:endParaRPr lang="en-US" dirty="0"/>
+            <a:pPr lvl="0">
+              <a:defRPr sz="1800"/>
+            </a:pPr>
+            <a:r>
+              <a:rPr sz="2200"/>
+              <a:t>When we established the predominant enterprise architecture paradigms, the vast majority of our clients were usually tethered to a desk with a workstation. Now that has flipped…</a:t>
+            </a:r>
           </a:p>
         </p:txBody>
       </p:sp>
     </p:spTree>
     <p:extLst>
       <p:ext uri="{BB962C8B-B14F-4D97-AF65-F5344CB8AC3E}">
-        <p14:creationId xmlns:p14="http://schemas.microsoft.com/office/powerpoint/2010/main" val="3249664746"/>
+        <p14:creationId xmlns:p14="http://schemas.microsoft.com/office/powerpoint/2010/main" val="2846791656"/>
       </p:ext>
     </p:extLst>
   </p:cSld>
@@ -754,7 +771,7 @@
       </p:grpSpPr>
       <p:sp>
         <p:nvSpPr>
-          <p:cNvPr id="160" name="Shape 160"/>
+          <p:cNvPr id="2" name="Slide Image Placeholder 1"/>
           <p:cNvSpPr>
             <a:spLocks noGrp="1" noRot="1" noChangeAspect="1"/>
           </p:cNvSpPr>
@@ -767,52 +784,31 @@
             <a:off x="381000" y="685800"/>
             <a:ext cx="6096000" cy="3429000"/>
           </a:xfrm>
-          <a:prstGeom prst="rect">
-            <a:avLst/>
-          </a:prstGeom>
         </p:spPr>
-        <p:txBody>
-          <a:bodyPr lIns="90571" tIns="45286" rIns="90571" bIns="45286"/>
-          <a:lstStyle/>
-          <a:p>
-            <a:pPr lvl="0"/>
-            <a:endParaRPr/>
-          </a:p>
-        </p:txBody>
       </p:sp>
       <p:sp>
         <p:nvSpPr>
-          <p:cNvPr id="161" name="Shape 161"/>
+          <p:cNvPr id="3" name="Notes Placeholder 2"/>
           <p:cNvSpPr>
             <a:spLocks noGrp="1"/>
           </p:cNvSpPr>
           <p:nvPr>
-            <p:ph type="body" sz="quarter" idx="1"/>
+            <p:ph type="body" idx="1"/>
           </p:nvPr>
         </p:nvSpPr>
-        <p:spPr>
-          <a:prstGeom prst="rect">
-            <a:avLst/>
-          </a:prstGeom>
-        </p:spPr>
+        <p:spPr/>
         <p:txBody>
           <a:bodyPr/>
           <a:lstStyle/>
           <a:p>
-            <a:pPr lvl="0">
-              <a:defRPr sz="1800"/>
-            </a:pPr>
-            <a:r>
-              <a:rPr sz="2200"/>
-              <a:t>When we established the predominant enterprise architecture paradigms, the vast majority of our clients were usually tethered to a desk with a workstation. Now that has flipped…</a:t>
-            </a:r>
+            <a:endParaRPr lang="en-US"/>
           </a:p>
         </p:txBody>
       </p:sp>
     </p:spTree>
     <p:extLst>
       <p:ext uri="{BB962C8B-B14F-4D97-AF65-F5344CB8AC3E}">
-        <p14:creationId xmlns:p14="http://schemas.microsoft.com/office/powerpoint/2010/main" val="2846791656"/>
+        <p14:creationId xmlns:p14="http://schemas.microsoft.com/office/powerpoint/2010/main" val="1396480869"/>
       </p:ext>
     </p:extLst>
   </p:cSld>
@@ -871,138 +867,6 @@
           <a:bodyPr/>
           <a:lstStyle/>
           <a:p>
-            <a:endParaRPr lang="en-US" dirty="0"/>
-          </a:p>
-        </p:txBody>
-      </p:sp>
-    </p:spTree>
-    <p:extLst>
-      <p:ext uri="{BB962C8B-B14F-4D97-AF65-F5344CB8AC3E}">
-        <p14:creationId xmlns:p14="http://schemas.microsoft.com/office/powerpoint/2010/main" val="2576152889"/>
-      </p:ext>
-    </p:extLst>
-  </p:cSld>
-  <p:clrMapOvr>
-    <a:masterClrMapping/>
-  </p:clrMapOvr>
-</p:notes>
-</file>
-
-<file path=ppt/notesSlides/notesSlide13.xml><?xml version="1.0" encoding="utf-8"?>
-<p:notes xmlns:a="http://schemas.openxmlformats.org/drawingml/2006/main" xmlns:r="http://schemas.openxmlformats.org/officeDocument/2006/relationships" xmlns:p="http://schemas.openxmlformats.org/presentationml/2006/main">
-  <p:cSld>
-    <p:spTree>
-      <p:nvGrpSpPr>
-        <p:cNvPr id="1" name=""/>
-        <p:cNvGrpSpPr/>
-        <p:nvPr/>
-      </p:nvGrpSpPr>
-      <p:grpSpPr>
-        <a:xfrm>
-          <a:off x="0" y="0"/>
-          <a:ext cx="0" cy="0"/>
-          <a:chOff x="0" y="0"/>
-          <a:chExt cx="0" cy="0"/>
-        </a:xfrm>
-      </p:grpSpPr>
-      <p:sp>
-        <p:nvSpPr>
-          <p:cNvPr id="2" name="Slide Image Placeholder 1"/>
-          <p:cNvSpPr>
-            <a:spLocks noGrp="1" noRot="1" noChangeAspect="1"/>
-          </p:cNvSpPr>
-          <p:nvPr>
-            <p:ph type="sldImg"/>
-          </p:nvPr>
-        </p:nvSpPr>
-        <p:spPr>
-          <a:xfrm>
-            <a:off x="381000" y="685800"/>
-            <a:ext cx="6096000" cy="3429000"/>
-          </a:xfrm>
-        </p:spPr>
-      </p:sp>
-      <p:sp>
-        <p:nvSpPr>
-          <p:cNvPr id="3" name="Notes Placeholder 2"/>
-          <p:cNvSpPr>
-            <a:spLocks noGrp="1"/>
-          </p:cNvSpPr>
-          <p:nvPr>
-            <p:ph type="body" idx="1"/>
-          </p:nvPr>
-        </p:nvSpPr>
-        <p:spPr/>
-        <p:txBody>
-          <a:bodyPr/>
-          <a:lstStyle/>
-          <a:p>
-            <a:endParaRPr lang="en-US"/>
-          </a:p>
-        </p:txBody>
-      </p:sp>
-    </p:spTree>
-    <p:extLst>
-      <p:ext uri="{BB962C8B-B14F-4D97-AF65-F5344CB8AC3E}">
-        <p14:creationId xmlns:p14="http://schemas.microsoft.com/office/powerpoint/2010/main" val="1396480869"/>
-      </p:ext>
-    </p:extLst>
-  </p:cSld>
-  <p:clrMapOvr>
-    <a:masterClrMapping/>
-  </p:clrMapOvr>
-</p:notes>
-</file>
-
-<file path=ppt/notesSlides/notesSlide14.xml><?xml version="1.0" encoding="utf-8"?>
-<p:notes xmlns:a="http://schemas.openxmlformats.org/drawingml/2006/main" xmlns:r="http://schemas.openxmlformats.org/officeDocument/2006/relationships" xmlns:p="http://schemas.openxmlformats.org/presentationml/2006/main">
-  <p:cSld>
-    <p:spTree>
-      <p:nvGrpSpPr>
-        <p:cNvPr id="1" name=""/>
-        <p:cNvGrpSpPr/>
-        <p:nvPr/>
-      </p:nvGrpSpPr>
-      <p:grpSpPr>
-        <a:xfrm>
-          <a:off x="0" y="0"/>
-          <a:ext cx="0" cy="0"/>
-          <a:chOff x="0" y="0"/>
-          <a:chExt cx="0" cy="0"/>
-        </a:xfrm>
-      </p:grpSpPr>
-      <p:sp>
-        <p:nvSpPr>
-          <p:cNvPr id="2" name="Slide Image Placeholder 1"/>
-          <p:cNvSpPr>
-            <a:spLocks noGrp="1" noRot="1" noChangeAspect="1"/>
-          </p:cNvSpPr>
-          <p:nvPr>
-            <p:ph type="sldImg"/>
-          </p:nvPr>
-        </p:nvSpPr>
-        <p:spPr>
-          <a:xfrm>
-            <a:off x="381000" y="685800"/>
-            <a:ext cx="6096000" cy="3429000"/>
-          </a:xfrm>
-        </p:spPr>
-      </p:sp>
-      <p:sp>
-        <p:nvSpPr>
-          <p:cNvPr id="3" name="Notes Placeholder 2"/>
-          <p:cNvSpPr>
-            <a:spLocks noGrp="1"/>
-          </p:cNvSpPr>
-          <p:nvPr>
-            <p:ph type="body" idx="1"/>
-          </p:nvPr>
-        </p:nvSpPr>
-        <p:spPr/>
-        <p:txBody>
-          <a:bodyPr/>
-          <a:lstStyle/>
-          <a:p>
             <a:endParaRPr lang="en-US"/>
           </a:p>
         </p:txBody>
@@ -1020,7 +884,7 @@
 </p:notes>
 </file>
 
-<file path=ppt/notesSlides/notesSlide15.xml><?xml version="1.0" encoding="utf-8"?>
+<file path=ppt/notesSlides/notesSlide13.xml><?xml version="1.0" encoding="utf-8"?>
 <p:notes xmlns:a="http://schemas.openxmlformats.org/drawingml/2006/main" xmlns:r="http://schemas.openxmlformats.org/officeDocument/2006/relationships" xmlns:p="http://schemas.openxmlformats.org/presentationml/2006/main" showMasterSp="0" showMasterPhAnim="0">
   <p:cSld>
     <p:spTree>
@@ -6843,21 +6707,8 @@
                   <a:schemeClr val="bg2"/>
                 </a:solidFill>
               </a:rPr>
-              <a:t> (includes HAWQ), </a:t>
-            </a:r>
-            <a:r>
-              <a:rPr lang="en-US" dirty="0" smtClean="0">
-                <a:solidFill>
-                  <a:schemeClr val="bg2"/>
-                </a:solidFill>
-              </a:rPr>
-              <a:t>Data Flow</a:t>
-            </a:r>
-            <a:endParaRPr lang="en-US" dirty="0" smtClean="0">
-              <a:solidFill>
-                <a:schemeClr val="bg2"/>
-              </a:solidFill>
-            </a:endParaRPr>
+              <a:t> (includes HAWQ), Data Flow</a:t>
+            </a:r>
           </a:p>
         </p:txBody>
       </p:sp>
@@ -9565,123 +9416,6 @@
       </p:grpSpPr>
       <p:pic>
         <p:nvPicPr>
-          <p:cNvPr id="8" name="Picture 7" descr="DeconstructingMobileMyths.png"/>
-          <p:cNvPicPr>
-            <a:picLocks noChangeAspect="1"/>
-          </p:cNvPicPr>
-          <p:nvPr/>
-        </p:nvPicPr>
-        <p:blipFill rotWithShape="1">
-          <a:blip r:embed="rId3" cstate="screen">
-            <a:grayscl/>
-            <a:extLst>
-              <a:ext uri="{28A0092B-C50C-407E-A947-70E740481C1C}">
-                <a14:useLocalDpi xmlns:a14="http://schemas.microsoft.com/office/drawing/2010/main"/>
-              </a:ext>
-            </a:extLst>
-          </a:blip>
-          <a:srcRect/>
-          <a:stretch/>
-        </p:blipFill>
-        <p:spPr>
-          <a:xfrm>
-            <a:off x="0" y="0"/>
-            <a:ext cx="9144000" cy="5143500"/>
-          </a:xfrm>
-          <a:prstGeom prst="rect">
-            <a:avLst/>
-          </a:prstGeom>
-        </p:spPr>
-      </p:pic>
-      <p:sp>
-        <p:nvSpPr>
-          <p:cNvPr id="4" name="TextBox 3"/>
-          <p:cNvSpPr txBox="1"/>
-          <p:nvPr/>
-        </p:nvSpPr>
-        <p:spPr>
-          <a:xfrm>
-            <a:off x="0" y="3529829"/>
-            <a:ext cx="5615465" cy="1015663"/>
-          </a:xfrm>
-          <a:prstGeom prst="rect">
-            <a:avLst/>
-          </a:prstGeom>
-          <a:solidFill>
-            <a:schemeClr val="tx1">
-              <a:alpha val="74000"/>
-            </a:schemeClr>
-          </a:solidFill>
-        </p:spPr>
-        <p:txBody>
-          <a:bodyPr wrap="none" rtlCol="0">
-            <a:spAutoFit/>
-          </a:bodyPr>
-          <a:lstStyle/>
-          <a:p>
-            <a:r>
-              <a:rPr lang="en-US" sz="6000" dirty="0" smtClean="0">
-                <a:solidFill>
-                  <a:schemeClr val="bg1"/>
-                </a:solidFill>
-              </a:rPr>
-              <a:t>Mobile Services</a:t>
-            </a:r>
-            <a:endParaRPr lang="en-US" sz="6000" dirty="0">
-              <a:solidFill>
-                <a:schemeClr val="bg1"/>
-              </a:solidFill>
-            </a:endParaRPr>
-          </a:p>
-        </p:txBody>
-      </p:sp>
-    </p:spTree>
-    <p:extLst>
-      <p:ext uri="{BB962C8B-B14F-4D97-AF65-F5344CB8AC3E}">
-        <p14:creationId xmlns:p14="http://schemas.microsoft.com/office/powerpoint/2010/main" val="1842463734"/>
-      </p:ext>
-    </p:extLst>
-  </p:cSld>
-  <p:clrMapOvr>
-    <a:masterClrMapping/>
-  </p:clrMapOvr>
-  <mc:AlternateContent xmlns:mc="http://schemas.openxmlformats.org/markup-compatibility/2006" xmlns:p14="http://schemas.microsoft.com/office/powerpoint/2010/main">
-    <mc:Choice Requires="p14">
-      <p:transition spd="slow" p14:dur="2000"/>
-    </mc:Choice>
-    <mc:Fallback xmlns="">
-      <p:transition xmlns:p14="http://schemas.microsoft.com/office/powerpoint/2010/main" spd="slow"/>
-    </mc:Fallback>
-  </mc:AlternateContent>
-  <p:timing>
-    <p:tnLst>
-      <p:par>
-        <p:cTn xmlns:p14="http://schemas.microsoft.com/office/powerpoint/2010/main" id="1" dur="indefinite" restart="never" nodeType="tmRoot"/>
-      </p:par>
-    </p:tnLst>
-  </p:timing>
-</p:sld>
-</file>
-
-<file path=ppt/slides/slide16.xml><?xml version="1.0" encoding="utf-8"?>
-<p:sld xmlns:a="http://schemas.openxmlformats.org/drawingml/2006/main" xmlns:r="http://schemas.openxmlformats.org/officeDocument/2006/relationships" xmlns:p="http://schemas.openxmlformats.org/presentationml/2006/main">
-  <p:cSld>
-    <p:spTree>
-      <p:nvGrpSpPr>
-        <p:cNvPr id="1" name=""/>
-        <p:cNvGrpSpPr/>
-        <p:nvPr/>
-      </p:nvGrpSpPr>
-      <p:grpSpPr>
-        <a:xfrm>
-          <a:off x="0" y="0"/>
-          <a:ext cx="0" cy="0"/>
-          <a:chOff x="0" y="0"/>
-          <a:chExt cx="0" cy="0"/>
-        </a:xfrm>
-      </p:grpSpPr>
-      <p:pic>
-        <p:nvPicPr>
           <p:cNvPr id="152" name="pasted-image.pdf"/>
           <p:cNvPicPr/>
           <p:nvPr/>
@@ -9931,7 +9665,7 @@
                   </a:solidFill>
                 </a:uFill>
               </a:rPr>
-              <a:t>16</a:t>
+              <a:t>15</a:t>
             </a:fld>
             <a:endParaRPr sz="800">
               <a:solidFill>
@@ -10098,804 +9832,7 @@
 </p:sld>
 </file>
 
-<file path=ppt/slides/slide17.xml><?xml version="1.0" encoding="utf-8"?>
-<p:sld xmlns:a="http://schemas.openxmlformats.org/drawingml/2006/main" xmlns:r="http://schemas.openxmlformats.org/officeDocument/2006/relationships" xmlns:p="http://schemas.openxmlformats.org/presentationml/2006/main">
-  <p:cSld>
-    <p:spTree>
-      <p:nvGrpSpPr>
-        <p:cNvPr id="1" name=""/>
-        <p:cNvGrpSpPr/>
-        <p:nvPr/>
-      </p:nvGrpSpPr>
-      <p:grpSpPr>
-        <a:xfrm>
-          <a:off x="0" y="0"/>
-          <a:ext cx="0" cy="0"/>
-          <a:chOff x="0" y="0"/>
-          <a:chExt cx="0" cy="0"/>
-        </a:xfrm>
-      </p:grpSpPr>
-      <p:sp>
-        <p:nvSpPr>
-          <p:cNvPr id="2" name="Title 1"/>
-          <p:cNvSpPr>
-            <a:spLocks noGrp="1"/>
-          </p:cNvSpPr>
-          <p:nvPr>
-            <p:ph type="title"/>
-          </p:nvPr>
-        </p:nvSpPr>
-        <p:spPr>
-          <a:xfrm>
-            <a:off x="366713" y="241043"/>
-            <a:ext cx="8410575" cy="460375"/>
-          </a:xfrm>
-        </p:spPr>
-        <p:txBody>
-          <a:bodyPr/>
-          <a:lstStyle/>
-          <a:p>
-            <a:r>
-              <a:rPr lang="en-US" sz="2800" dirty="0">
-                <a:solidFill>
-                  <a:srgbClr val="2C95DD"/>
-                </a:solidFill>
-              </a:rPr>
-              <a:t>Pivotal</a:t>
-            </a:r>
-            <a:r>
-              <a:rPr lang="en-US" dirty="0" smtClean="0"/>
-              <a:t> </a:t>
-            </a:r>
-            <a:r>
-              <a:rPr lang="en-US" sz="2800" dirty="0">
-                <a:solidFill>
-                  <a:srgbClr val="2C95DD"/>
-                </a:solidFill>
-              </a:rPr>
-              <a:t>CF Mobile Services</a:t>
-            </a:r>
-          </a:p>
-        </p:txBody>
-      </p:sp>
-      <p:pic>
-        <p:nvPicPr>
-          <p:cNvPr id="16" name="Content Placeholder 15" descr="tablet-phone.jpeg"/>
-          <p:cNvPicPr>
-            <a:picLocks noGrp="1" noChangeAspect="1"/>
-          </p:cNvPicPr>
-          <p:nvPr>
-            <p:ph sz="quarter" idx="4294967295"/>
-          </p:nvPr>
-        </p:nvPicPr>
-        <p:blipFill>
-          <a:blip r:embed="rId3" cstate="print">
-            <a:clrChange>
-              <a:clrFrom>
-                <a:srgbClr val="FFFFFF"/>
-              </a:clrFrom>
-              <a:clrTo>
-                <a:srgbClr val="FFFFFF">
-                  <a:alpha val="0"/>
-                </a:srgbClr>
-              </a:clrTo>
-            </a:clrChange>
-            <a:extLst>
-              <a:ext uri="{28A0092B-C50C-407E-A947-70E740481C1C}">
-                <a14:useLocalDpi xmlns:a14="http://schemas.microsoft.com/office/drawing/2010/main"/>
-              </a:ext>
-            </a:extLst>
-          </a:blip>
-          <a:srcRect l="-77933" r="-77933"/>
-          <a:stretch>
-            <a:fillRect/>
-          </a:stretch>
-        </p:blipFill>
-        <p:spPr>
-          <a:xfrm>
-            <a:off x="5562600" y="3486150"/>
-            <a:ext cx="2376487" cy="955888"/>
-          </a:xfrm>
-          <a:prstGeom prst="rect">
-            <a:avLst/>
-          </a:prstGeom>
-        </p:spPr>
-      </p:pic>
-      <p:sp>
-        <p:nvSpPr>
-          <p:cNvPr id="19" name="Rounded Rectangle 18"/>
-          <p:cNvSpPr/>
-          <p:nvPr/>
-        </p:nvSpPr>
-        <p:spPr>
-          <a:xfrm>
-            <a:off x="4724400" y="857250"/>
-            <a:ext cx="4165600" cy="381000"/>
-          </a:xfrm>
-          <a:prstGeom prst="roundRect">
-            <a:avLst/>
-          </a:prstGeom>
-          <a:solidFill>
-            <a:schemeClr val="bg1">
-              <a:lumMod val="85000"/>
-            </a:schemeClr>
-          </a:solidFill>
-          <a:ln w="12700">
-            <a:noFill/>
-          </a:ln>
-        </p:spPr>
-        <p:style>
-          <a:lnRef idx="2">
-            <a:schemeClr val="accent1">
-              <a:shade val="50000"/>
-            </a:schemeClr>
-          </a:lnRef>
-          <a:fillRef idx="1">
-            <a:schemeClr val="accent1"/>
-          </a:fillRef>
-          <a:effectRef idx="0">
-            <a:schemeClr val="accent1"/>
-          </a:effectRef>
-          <a:fontRef idx="minor">
-            <a:schemeClr val="lt1"/>
-          </a:fontRef>
-        </p:style>
-        <p:txBody>
-          <a:bodyPr lIns="91440" tIns="45720" rtlCol="0" anchor="t" anchorCtr="0"/>
-          <a:lstStyle/>
-          <a:p>
-            <a:pPr algn="ctr"/>
-            <a:r>
-              <a:rPr lang="en-US" sz="1600" dirty="0" smtClean="0">
-                <a:solidFill>
-                  <a:schemeClr val="accent5"/>
-                </a:solidFill>
-              </a:rPr>
-              <a:t>Enterprise Backend Applications</a:t>
-            </a:r>
-            <a:endParaRPr lang="en-US" sz="1600" dirty="0">
-              <a:solidFill>
-                <a:schemeClr val="accent5"/>
-              </a:solidFill>
-            </a:endParaRPr>
-          </a:p>
-        </p:txBody>
-      </p:sp>
-      <p:sp>
-        <p:nvSpPr>
-          <p:cNvPr id="20" name="Up-Down Arrow 19"/>
-          <p:cNvSpPr/>
-          <p:nvPr/>
-        </p:nvSpPr>
-        <p:spPr>
-          <a:xfrm>
-            <a:off x="6553200" y="1314450"/>
-            <a:ext cx="304800" cy="495300"/>
-          </a:xfrm>
-          <a:prstGeom prst="upDownArrow">
-            <a:avLst/>
-          </a:prstGeom>
-          <a:ln/>
-        </p:spPr>
-        <p:style>
-          <a:lnRef idx="1">
-            <a:schemeClr val="dk1"/>
-          </a:lnRef>
-          <a:fillRef idx="3">
-            <a:schemeClr val="dk1"/>
-          </a:fillRef>
-          <a:effectRef idx="2">
-            <a:schemeClr val="dk1"/>
-          </a:effectRef>
-          <a:fontRef idx="minor">
-            <a:schemeClr val="lt1"/>
-          </a:fontRef>
-        </p:style>
-        <p:txBody>
-          <a:bodyPr rtlCol="0" anchor="ctr"/>
-          <a:lstStyle/>
-          <a:p>
-            <a:pPr algn="ctr"/>
-            <a:endParaRPr lang="en-US"/>
-          </a:p>
-        </p:txBody>
-      </p:sp>
-      <p:sp>
-        <p:nvSpPr>
-          <p:cNvPr id="21" name="Up-Down Arrow 20"/>
-          <p:cNvSpPr/>
-          <p:nvPr/>
-        </p:nvSpPr>
-        <p:spPr>
-          <a:xfrm>
-            <a:off x="6553200" y="3028950"/>
-            <a:ext cx="304800" cy="440790"/>
-          </a:xfrm>
-          <a:prstGeom prst="upDownArrow">
-            <a:avLst/>
-          </a:prstGeom>
-          <a:ln/>
-        </p:spPr>
-        <p:style>
-          <a:lnRef idx="1">
-            <a:schemeClr val="dk1"/>
-          </a:lnRef>
-          <a:fillRef idx="3">
-            <a:schemeClr val="dk1"/>
-          </a:fillRef>
-          <a:effectRef idx="2">
-            <a:schemeClr val="dk1"/>
-          </a:effectRef>
-          <a:fontRef idx="minor">
-            <a:schemeClr val="lt1"/>
-          </a:fontRef>
-        </p:style>
-        <p:txBody>
-          <a:bodyPr rtlCol="0" anchor="ctr"/>
-          <a:lstStyle/>
-          <a:p>
-            <a:pPr algn="ctr"/>
-            <a:endParaRPr lang="en-US"/>
-          </a:p>
-        </p:txBody>
-      </p:sp>
-      <p:sp>
-        <p:nvSpPr>
-          <p:cNvPr id="22" name="Content Placeholder 2"/>
-          <p:cNvSpPr txBox="1">
-            <a:spLocks/>
-          </p:cNvSpPr>
-          <p:nvPr/>
-        </p:nvSpPr>
-        <p:spPr bwMode="gray">
-          <a:xfrm>
-            <a:off x="289858" y="919253"/>
-            <a:ext cx="4495800" cy="2819400"/>
-          </a:xfrm>
-          <a:prstGeom prst="rect">
-            <a:avLst/>
-          </a:prstGeom>
-          <a:noFill/>
-        </p:spPr>
-        <p:txBody>
-          <a:bodyPr lIns="0" tIns="0" rIns="0" bIns="0">
-            <a:noAutofit/>
-          </a:bodyPr>
-          <a:lstStyle>
-            <a:lvl1pPr marL="228600" indent="-228600" algn="l" defTabSz="914400" rtl="0" eaLnBrk="1" latinLnBrk="0" hangingPunct="1">
-              <a:spcBef>
-                <a:spcPts val="1200"/>
-              </a:spcBef>
-              <a:buClr>
-                <a:srgbClr val="ADC339"/>
-              </a:buClr>
-              <a:buFont typeface="Wingdings" pitchFamily="2" charset="2"/>
-              <a:buChar char=""/>
-              <a:defRPr sz="2400" kern="1200">
-                <a:solidFill>
-                  <a:schemeClr val="bg2"/>
-                </a:solidFill>
-                <a:latin typeface="Arial"/>
-                <a:ea typeface="+mn-ea"/>
-                <a:cs typeface="Arial"/>
-              </a:defRPr>
-            </a:lvl1pPr>
-            <a:lvl2pPr marL="742950" indent="-285750" algn="l" defTabSz="914400" rtl="0" eaLnBrk="1" latinLnBrk="0" hangingPunct="1">
-              <a:spcBef>
-                <a:spcPts val="300"/>
-              </a:spcBef>
-              <a:buClr>
-                <a:srgbClr val="ADC339"/>
-              </a:buClr>
-              <a:buFont typeface="Verdana" pitchFamily="34" charset="0"/>
-              <a:buChar char="–"/>
-              <a:defRPr sz="2000" kern="1200">
-                <a:solidFill>
-                  <a:schemeClr val="bg2"/>
-                </a:solidFill>
-                <a:latin typeface="Arial"/>
-                <a:ea typeface="+mn-ea"/>
-                <a:cs typeface="Arial"/>
-              </a:defRPr>
-            </a:lvl2pPr>
-            <a:lvl3pPr marL="1143000" indent="-228600" algn="l" defTabSz="914400" rtl="0" eaLnBrk="1" latinLnBrk="0" hangingPunct="1">
-              <a:spcBef>
-                <a:spcPts val="300"/>
-              </a:spcBef>
-              <a:buClr>
-                <a:srgbClr val="ADC339"/>
-              </a:buClr>
-              <a:buFont typeface="Verdana" pitchFamily="34" charset="0"/>
-              <a:buChar char="▪"/>
-              <a:defRPr sz="1600" kern="1200">
-                <a:solidFill>
-                  <a:schemeClr val="bg2"/>
-                </a:solidFill>
-                <a:latin typeface="Arial"/>
-                <a:ea typeface="+mn-ea"/>
-                <a:cs typeface="Arial"/>
-              </a:defRPr>
-            </a:lvl3pPr>
-            <a:lvl4pPr marL="1658938" indent="-287338" algn="l" defTabSz="914400" rtl="0" eaLnBrk="1" latinLnBrk="0" hangingPunct="1">
-              <a:spcBef>
-                <a:spcPts val="300"/>
-              </a:spcBef>
-              <a:buClr>
-                <a:srgbClr val="ADC339"/>
-              </a:buClr>
-              <a:buFont typeface="Verdana" pitchFamily="34" charset="0"/>
-              <a:buChar char="—"/>
-              <a:defRPr sz="1200" kern="1200">
-                <a:solidFill>
-                  <a:schemeClr val="bg2"/>
-                </a:solidFill>
-                <a:latin typeface="Arial"/>
-                <a:ea typeface="+mn-ea"/>
-                <a:cs typeface="Arial"/>
-              </a:defRPr>
-            </a:lvl4pPr>
-            <a:lvl5pPr marL="2057400" indent="-228600" algn="l" defTabSz="914400" rtl="0" eaLnBrk="1" latinLnBrk="0" hangingPunct="1">
-              <a:spcBef>
-                <a:spcPts val="300"/>
-              </a:spcBef>
-              <a:buClr>
-                <a:srgbClr val="ADC339"/>
-              </a:buClr>
-              <a:buFont typeface="Verdana" pitchFamily="34" charset="0"/>
-              <a:buChar char="»"/>
-              <a:defRPr sz="1100" kern="1200">
-                <a:solidFill>
-                  <a:schemeClr val="bg2"/>
-                </a:solidFill>
-                <a:latin typeface="Arial"/>
-                <a:ea typeface="+mn-ea"/>
-                <a:cs typeface="Arial"/>
-              </a:defRPr>
-            </a:lvl5pPr>
-            <a:lvl6pPr marL="2514600" indent="-228600" algn="l" defTabSz="914400" rtl="0" eaLnBrk="1" latinLnBrk="0" hangingPunct="1">
-              <a:spcBef>
-                <a:spcPct val="20000"/>
-              </a:spcBef>
-              <a:buFont typeface="Arial" pitchFamily="34" charset="0"/>
-              <a:buChar char="•"/>
-              <a:defRPr sz="2000" kern="1200">
-                <a:solidFill>
-                  <a:schemeClr val="tx1"/>
-                </a:solidFill>
-                <a:latin typeface="+mn-lt"/>
-                <a:ea typeface="+mn-ea"/>
-                <a:cs typeface="+mn-cs"/>
-              </a:defRPr>
-            </a:lvl6pPr>
-            <a:lvl7pPr marL="2971800" indent="-228600" algn="l" defTabSz="914400" rtl="0" eaLnBrk="1" latinLnBrk="0" hangingPunct="1">
-              <a:spcBef>
-                <a:spcPct val="20000"/>
-              </a:spcBef>
-              <a:buFont typeface="Arial" pitchFamily="34" charset="0"/>
-              <a:buChar char="•"/>
-              <a:defRPr sz="2000" kern="1200">
-                <a:solidFill>
-                  <a:schemeClr val="tx1"/>
-                </a:solidFill>
-                <a:latin typeface="+mn-lt"/>
-                <a:ea typeface="+mn-ea"/>
-                <a:cs typeface="+mn-cs"/>
-              </a:defRPr>
-            </a:lvl7pPr>
-            <a:lvl8pPr marL="3429000" indent="-228600" algn="l" defTabSz="914400" rtl="0" eaLnBrk="1" latinLnBrk="0" hangingPunct="1">
-              <a:spcBef>
-                <a:spcPct val="20000"/>
-              </a:spcBef>
-              <a:buFont typeface="Arial" pitchFamily="34" charset="0"/>
-              <a:buChar char="•"/>
-              <a:defRPr sz="2000" kern="1200">
-                <a:solidFill>
-                  <a:schemeClr val="tx1"/>
-                </a:solidFill>
-                <a:latin typeface="+mn-lt"/>
-                <a:ea typeface="+mn-ea"/>
-                <a:cs typeface="+mn-cs"/>
-              </a:defRPr>
-            </a:lvl8pPr>
-            <a:lvl9pPr marL="3886200" indent="-228600" algn="l" defTabSz="914400" rtl="0" eaLnBrk="1" latinLnBrk="0" hangingPunct="1">
-              <a:spcBef>
-                <a:spcPct val="20000"/>
-              </a:spcBef>
-              <a:buFont typeface="Arial" pitchFamily="34" charset="0"/>
-              <a:buChar char="•"/>
-              <a:defRPr sz="2000" kern="1200">
-                <a:solidFill>
-                  <a:schemeClr val="tx1"/>
-                </a:solidFill>
-                <a:latin typeface="+mn-lt"/>
-                <a:ea typeface="+mn-ea"/>
-                <a:cs typeface="+mn-cs"/>
-              </a:defRPr>
-            </a:lvl9pPr>
-          </a:lstStyle>
-          <a:p>
-            <a:pPr>
-              <a:spcBef>
-                <a:spcPts val="0"/>
-              </a:spcBef>
-              <a:spcAft>
-                <a:spcPts val="600"/>
-              </a:spcAft>
-            </a:pPr>
-            <a:r>
-              <a:rPr lang="en-US" sz="2000" dirty="0" smtClean="0">
-                <a:solidFill>
-                  <a:srgbClr val="FFFFFF"/>
-                </a:solidFill>
-              </a:rPr>
-              <a:t>Consumer-grade, mobile backend services built for the enterprise</a:t>
-            </a:r>
-          </a:p>
-          <a:p>
-            <a:pPr lvl="0">
-              <a:spcBef>
-                <a:spcPts val="0"/>
-              </a:spcBef>
-              <a:spcAft>
-                <a:spcPts val="600"/>
-              </a:spcAft>
-            </a:pPr>
-            <a:r>
-              <a:rPr lang="en-US" sz="2000" dirty="0">
-                <a:solidFill>
-                  <a:srgbClr val="FFFFFF"/>
-                </a:solidFill>
-              </a:rPr>
-              <a:t>Built on Pivotal CF for simplified </a:t>
-            </a:r>
-            <a:r>
-              <a:rPr lang="en-US" sz="2000" dirty="0" smtClean="0">
-                <a:solidFill>
-                  <a:srgbClr val="FFFFFF"/>
-                </a:solidFill>
-              </a:rPr>
-              <a:t>deployment </a:t>
-            </a:r>
-            <a:r>
-              <a:rPr lang="en-US" sz="2000" dirty="0">
-                <a:solidFill>
-                  <a:srgbClr val="FFFFFF"/>
-                </a:solidFill>
-              </a:rPr>
-              <a:t>and operation </a:t>
-            </a:r>
-            <a:r>
-              <a:rPr lang="en-US" sz="2000" dirty="0" smtClean="0">
-                <a:solidFill>
-                  <a:srgbClr val="FFFFFF"/>
-                </a:solidFill>
-              </a:rPr>
-              <a:t>in private cloud</a:t>
-            </a:r>
-            <a:endParaRPr lang="en-US" sz="2000" dirty="0">
-              <a:solidFill>
-                <a:srgbClr val="FFFFFF"/>
-              </a:solidFill>
-            </a:endParaRPr>
-          </a:p>
-          <a:p>
-            <a:pPr lvl="0">
-              <a:spcBef>
-                <a:spcPts val="0"/>
-              </a:spcBef>
-              <a:spcAft>
-                <a:spcPts val="600"/>
-              </a:spcAft>
-            </a:pPr>
-            <a:r>
-              <a:rPr lang="en-US" sz="2000" dirty="0">
-                <a:solidFill>
-                  <a:srgbClr val="FFFFFF"/>
-                </a:solidFill>
-              </a:rPr>
-              <a:t>Enables businesses to apply the power of </a:t>
-            </a:r>
-            <a:r>
-              <a:rPr lang="en-US" sz="2000" dirty="0" err="1">
-                <a:solidFill>
-                  <a:srgbClr val="FFFFFF"/>
-                </a:solidFill>
-              </a:rPr>
-              <a:t>Pivotal’s</a:t>
-            </a:r>
-            <a:r>
-              <a:rPr lang="en-US" sz="2000" dirty="0">
-                <a:solidFill>
-                  <a:srgbClr val="FFFFFF"/>
-                </a:solidFill>
-              </a:rPr>
-              <a:t> Big Data Suite to mobile solutions </a:t>
-            </a:r>
-          </a:p>
-          <a:p>
-            <a:pPr>
-              <a:spcBef>
-                <a:spcPts val="0"/>
-              </a:spcBef>
-              <a:spcAft>
-                <a:spcPts val="600"/>
-              </a:spcAft>
-            </a:pPr>
-            <a:endParaRPr lang="en-US" sz="2000" dirty="0" smtClean="0">
-              <a:solidFill>
-                <a:srgbClr val="FFFFFF"/>
-              </a:solidFill>
-            </a:endParaRPr>
-          </a:p>
-        </p:txBody>
-      </p:sp>
-      <p:sp>
-        <p:nvSpPr>
-          <p:cNvPr id="13" name="Rounded Rectangle 12"/>
-          <p:cNvSpPr/>
-          <p:nvPr/>
-        </p:nvSpPr>
-        <p:spPr>
-          <a:xfrm>
-            <a:off x="4724400" y="1885950"/>
-            <a:ext cx="4165600" cy="762000"/>
-          </a:xfrm>
-          <a:prstGeom prst="roundRect">
-            <a:avLst>
-              <a:gd name="adj" fmla="val 9429"/>
-            </a:avLst>
-          </a:prstGeom>
-          <a:solidFill>
-            <a:schemeClr val="bg1">
-              <a:lumMod val="85000"/>
-            </a:schemeClr>
-          </a:solidFill>
-          <a:ln w="12700">
-            <a:noFill/>
-          </a:ln>
-        </p:spPr>
-        <p:style>
-          <a:lnRef idx="2">
-            <a:schemeClr val="accent1">
-              <a:shade val="50000"/>
-            </a:schemeClr>
-          </a:lnRef>
-          <a:fillRef idx="1">
-            <a:schemeClr val="accent1"/>
-          </a:fillRef>
-          <a:effectRef idx="0">
-            <a:schemeClr val="accent1"/>
-          </a:effectRef>
-          <a:fontRef idx="minor">
-            <a:schemeClr val="lt1"/>
-          </a:fontRef>
-        </p:style>
-        <p:txBody>
-          <a:bodyPr lIns="0" tIns="0" rtlCol="0" anchor="t" anchorCtr="0"/>
-          <a:lstStyle/>
-          <a:p>
-            <a:pPr algn="ctr"/>
-            <a:r>
-              <a:rPr lang="en-US" sz="1200" dirty="0" smtClean="0">
-                <a:solidFill>
-                  <a:schemeClr val="accent5"/>
-                </a:solidFill>
-              </a:rPr>
-              <a:t>Pivotal CF Mobile Services</a:t>
-            </a:r>
-            <a:endParaRPr lang="en-US" sz="1200" dirty="0">
-              <a:solidFill>
-                <a:schemeClr val="accent5"/>
-              </a:solidFill>
-            </a:endParaRPr>
-          </a:p>
-        </p:txBody>
-      </p:sp>
-      <p:sp>
-        <p:nvSpPr>
-          <p:cNvPr id="14" name="Rounded Rectangle 13"/>
-          <p:cNvSpPr/>
-          <p:nvPr/>
-        </p:nvSpPr>
-        <p:spPr>
-          <a:xfrm>
-            <a:off x="5780088" y="2190750"/>
-            <a:ext cx="914400" cy="405826"/>
-          </a:xfrm>
-          <a:prstGeom prst="roundRect">
-            <a:avLst/>
-          </a:prstGeom>
-          <a:solidFill>
-            <a:schemeClr val="tx1"/>
-          </a:solidFill>
-          <a:ln w="12700">
-            <a:noFill/>
-          </a:ln>
-        </p:spPr>
-        <p:style>
-          <a:lnRef idx="2">
-            <a:schemeClr val="accent1">
-              <a:shade val="50000"/>
-            </a:schemeClr>
-          </a:lnRef>
-          <a:fillRef idx="1">
-            <a:schemeClr val="accent1"/>
-          </a:fillRef>
-          <a:effectRef idx="0">
-            <a:schemeClr val="accent1"/>
-          </a:effectRef>
-          <a:fontRef idx="minor">
-            <a:schemeClr val="lt1"/>
-          </a:fontRef>
-        </p:style>
-        <p:txBody>
-          <a:bodyPr rtlCol="0" anchor="ctr"/>
-          <a:lstStyle/>
-          <a:p>
-            <a:pPr algn="ctr"/>
-            <a:r>
-              <a:rPr lang="en-US" sz="1000" dirty="0" smtClean="0"/>
-              <a:t>Push</a:t>
-            </a:r>
-          </a:p>
-          <a:p>
-            <a:pPr algn="ctr"/>
-            <a:r>
-              <a:rPr lang="en-US" sz="1000" dirty="0" smtClean="0"/>
-              <a:t>Notifications</a:t>
-            </a:r>
-            <a:endParaRPr lang="en-US" sz="1000" dirty="0"/>
-          </a:p>
-        </p:txBody>
-      </p:sp>
-      <p:sp>
-        <p:nvSpPr>
-          <p:cNvPr id="15" name="Rounded Rectangle 14"/>
-          <p:cNvSpPr/>
-          <p:nvPr/>
-        </p:nvSpPr>
-        <p:spPr>
-          <a:xfrm>
-            <a:off x="6770688" y="2190750"/>
-            <a:ext cx="914400" cy="381000"/>
-          </a:xfrm>
-          <a:prstGeom prst="roundRect">
-            <a:avLst/>
-          </a:prstGeom>
-          <a:solidFill>
-            <a:schemeClr val="tx1"/>
-          </a:solidFill>
-          <a:ln w="12700">
-            <a:noFill/>
-          </a:ln>
-        </p:spPr>
-        <p:style>
-          <a:lnRef idx="2">
-            <a:schemeClr val="accent1">
-              <a:shade val="50000"/>
-            </a:schemeClr>
-          </a:lnRef>
-          <a:fillRef idx="1">
-            <a:schemeClr val="accent1"/>
-          </a:fillRef>
-          <a:effectRef idx="0">
-            <a:schemeClr val="accent1"/>
-          </a:effectRef>
-          <a:fontRef idx="minor">
-            <a:schemeClr val="lt1"/>
-          </a:fontRef>
-        </p:style>
-        <p:txBody>
-          <a:bodyPr rtlCol="0" anchor="ctr"/>
-          <a:lstStyle/>
-          <a:p>
-            <a:pPr algn="ctr"/>
-            <a:r>
-              <a:rPr lang="en-US" sz="1000" dirty="0" smtClean="0"/>
-              <a:t>API</a:t>
-            </a:r>
-          </a:p>
-          <a:p>
-            <a:pPr algn="ctr"/>
-            <a:r>
-              <a:rPr lang="en-US" sz="1000" dirty="0" smtClean="0"/>
-              <a:t>Gateway</a:t>
-            </a:r>
-            <a:endParaRPr lang="en-US" sz="1000" dirty="0"/>
-          </a:p>
-        </p:txBody>
-      </p:sp>
-      <p:sp>
-        <p:nvSpPr>
-          <p:cNvPr id="12" name="Rounded Rectangle 11"/>
-          <p:cNvSpPr/>
-          <p:nvPr/>
-        </p:nvSpPr>
-        <p:spPr>
-          <a:xfrm>
-            <a:off x="4724400" y="2724150"/>
-            <a:ext cx="4142442" cy="253426"/>
-          </a:xfrm>
-          <a:prstGeom prst="roundRect">
-            <a:avLst>
-              <a:gd name="adj" fmla="val 9429"/>
-            </a:avLst>
-          </a:prstGeom>
-          <a:solidFill>
-            <a:schemeClr val="bg1">
-              <a:lumMod val="85000"/>
-            </a:schemeClr>
-          </a:solidFill>
-          <a:ln w="12700">
-            <a:noFill/>
-          </a:ln>
-        </p:spPr>
-        <p:style>
-          <a:lnRef idx="2">
-            <a:schemeClr val="accent1">
-              <a:shade val="50000"/>
-            </a:schemeClr>
-          </a:lnRef>
-          <a:fillRef idx="1">
-            <a:schemeClr val="accent1"/>
-          </a:fillRef>
-          <a:effectRef idx="0">
-            <a:schemeClr val="accent1"/>
-          </a:effectRef>
-          <a:fontRef idx="minor">
-            <a:schemeClr val="lt1"/>
-          </a:fontRef>
-        </p:style>
-        <p:txBody>
-          <a:bodyPr lIns="0" tIns="0" rtlCol="0" anchor="t" anchorCtr="0"/>
-          <a:lstStyle/>
-          <a:p>
-            <a:pPr algn="ctr"/>
-            <a:r>
-              <a:rPr lang="en-US" sz="1200" dirty="0" smtClean="0">
-                <a:solidFill>
-                  <a:schemeClr val="accent5"/>
-                </a:solidFill>
-              </a:rPr>
-              <a:t>Pivotal CF</a:t>
-            </a:r>
-            <a:endParaRPr lang="en-US" sz="1200" dirty="0">
-              <a:solidFill>
-                <a:schemeClr val="accent5"/>
-              </a:solidFill>
-            </a:endParaRPr>
-          </a:p>
-        </p:txBody>
-      </p:sp>
-    </p:spTree>
-    <p:extLst>
-      <p:ext uri="{BB962C8B-B14F-4D97-AF65-F5344CB8AC3E}">
-        <p14:creationId xmlns:p14="http://schemas.microsoft.com/office/powerpoint/2010/main" val="2292891630"/>
-      </p:ext>
-    </p:extLst>
-  </p:cSld>
-  <p:clrMapOvr>
-    <a:masterClrMapping/>
-  </p:clrMapOvr>
-  <mc:AlternateContent xmlns:mc="http://schemas.openxmlformats.org/markup-compatibility/2006" xmlns:p14="http://schemas.microsoft.com/office/powerpoint/2010/main">
-    <mc:Choice Requires="p14">
-      <p:transition spd="slow" p14:dur="2000"/>
-    </mc:Choice>
-    <mc:Fallback xmlns="">
-      <p:transition xmlns:p14="http://schemas.microsoft.com/office/powerpoint/2010/main" spd="slow"/>
-    </mc:Fallback>
-  </mc:AlternateContent>
-  <p:timing>
-    <p:tnLst>
-      <p:par>
-        <p:cTn xmlns:p14="http://schemas.microsoft.com/office/powerpoint/2010/main" id="1" dur="indefinite" restart="never" nodeType="tmRoot"/>
-      </p:par>
-    </p:tnLst>
-  </p:timing>
-</p:sld>
-</file>
-
-<file path=ppt/slides/slide18.xml><?xml version="1.0" encoding="utf-8"?>
+<file path=ppt/slides/slide16.xml><?xml version="1.0" encoding="utf-8"?>
 <p:sld xmlns:a="http://schemas.openxmlformats.org/drawingml/2006/main" xmlns:r="http://schemas.openxmlformats.org/officeDocument/2006/relationships" xmlns:p="http://schemas.openxmlformats.org/presentationml/2006/main">
   <p:cSld>
     <p:spTree>
@@ -11208,7 +10145,7 @@
 </p:sld>
 </file>
 
-<file path=ppt/slides/slide19.xml><?xml version="1.0" encoding="utf-8"?>
+<file path=ppt/slides/slide17.xml><?xml version="1.0" encoding="utf-8"?>
 <p:sld xmlns:a="http://schemas.openxmlformats.org/drawingml/2006/main" xmlns:r="http://schemas.openxmlformats.org/officeDocument/2006/relationships" xmlns:p="http://schemas.openxmlformats.org/presentationml/2006/main">
   <p:cSld>
     <p:spTree>
@@ -11246,7 +10183,7 @@
                   <a:srgbClr val="2C95DD"/>
                 </a:solidFill>
               </a:rPr>
-              <a:t>API Gateway</a:t>
+              <a:t>App Distribution</a:t>
             </a:r>
           </a:p>
         </p:txBody>
@@ -11263,8 +10200,8 @@
         </p:nvSpPr>
         <p:spPr>
           <a:xfrm>
-            <a:off x="381000" y="884464"/>
-            <a:ext cx="6589089" cy="2362200"/>
+            <a:off x="381001" y="993321"/>
+            <a:ext cx="4292600" cy="1447800"/>
           </a:xfrm>
           <a:prstGeom prst="rect">
             <a:avLst/>
@@ -11275,7 +10212,7 @@
           <a:lstStyle/>
           <a:p>
             <a:r>
-              <a:rPr lang="en-US" sz="2000" dirty="0" smtClean="0">
+              <a:rPr lang="en-US" sz="2000" b="1" dirty="0" smtClean="0">
                 <a:solidFill>
                   <a:srgbClr val="FFFFFF"/>
                 </a:solidFill>
@@ -11294,7 +10231,7 @@
                   <a:srgbClr val="FFFFFF"/>
                 </a:solidFill>
               </a:rPr>
-              <a:t>Legacy APIs are not optimized for mobile</a:t>
+              <a:t>Extensive user testing of apps is critical to success</a:t>
             </a:r>
           </a:p>
           <a:p>
@@ -11308,7 +10245,7 @@
                   <a:srgbClr val="FFFFFF"/>
                 </a:solidFill>
               </a:rPr>
-              <a:t>Too much unnecessary content delivered to devices</a:t>
+              <a:t>Difficult to distribute pre-release apps to test users</a:t>
             </a:r>
           </a:p>
           <a:p>
@@ -11317,26 +10254,12 @@
               <a:buChar char="•"/>
             </a:pPr>
             <a:r>
-              <a:rPr lang="en-US" sz="1800" dirty="0">
+              <a:rPr lang="en-US" sz="1800" dirty="0" smtClean="0">
                 <a:solidFill>
                   <a:srgbClr val="FFFFFF"/>
                 </a:solidFill>
               </a:rPr>
-              <a:t>Mobile very sensitive to latency (often weak or no signal)</a:t>
-            </a:r>
-          </a:p>
-          <a:p>
-            <a:pPr marL="285750" lvl="1" indent="-285750">
-              <a:buFont typeface="Arial"/>
-              <a:buChar char="•"/>
-            </a:pPr>
-            <a:r>
-              <a:rPr lang="en-US" sz="1800" dirty="0" smtClean="0">
-                <a:solidFill>
-                  <a:srgbClr val="FFFFFF"/>
-                </a:solidFill>
-              </a:rPr>
-              <a:t>Mobile apps often require several API calls to display a single page of content</a:t>
+              <a:t>Existing solutions are public cloud</a:t>
             </a:r>
           </a:p>
           <a:p>
@@ -11349,7 +10272,7 @@
           </a:p>
           <a:p>
             <a:r>
-              <a:rPr lang="en-US" sz="2000" dirty="0">
+              <a:rPr lang="en-US" sz="2000" b="1" dirty="0">
                 <a:solidFill>
                   <a:srgbClr val="FFFFFF"/>
                 </a:solidFill>
@@ -11368,21 +10291,7 @@
                   <a:srgbClr val="FFFFFF"/>
                 </a:solidFill>
               </a:rPr>
-              <a:t>Allows mobile developers to easily transform APIs</a:t>
-            </a:r>
-          </a:p>
-          <a:p>
-            <a:pPr marL="285750" lvl="2" indent="-285750">
-              <a:buFont typeface="Arial"/>
-              <a:buChar char="•"/>
-            </a:pPr>
-            <a:r>
-              <a:rPr lang="en-US" sz="1800" dirty="0">
-                <a:solidFill>
-                  <a:srgbClr val="FFFFFF"/>
-                </a:solidFill>
-              </a:rPr>
-              <a:t>Deliver mobile-optimized, device specific content </a:t>
+              <a:t>Easy OTA app distribution</a:t>
             </a:r>
           </a:p>
           <a:p>
@@ -11395,15 +10304,37 @@
                 <a:solidFill>
                   <a:srgbClr val="FFFFFF"/>
                 </a:solidFill>
-                <a:sym typeface="Wingdings"/>
-              </a:rPr>
-              <a:t>Results in improved performance and user experience</a:t>
-            </a:r>
-            <a:endParaRPr lang="en-US" sz="1800" dirty="0">
-              <a:solidFill>
-                <a:srgbClr val="FFFFFF"/>
-              </a:solidFill>
-            </a:endParaRPr>
+              </a:rPr>
+              <a:t>User / team management</a:t>
+            </a:r>
+          </a:p>
+          <a:p>
+            <a:pPr marL="285750" lvl="1" indent="-285750">
+              <a:buFont typeface="Arial"/>
+              <a:buChar char="•"/>
+            </a:pPr>
+            <a:r>
+              <a:rPr lang="en-US" sz="1800" dirty="0">
+                <a:solidFill>
+                  <a:srgbClr val="FFFFFF"/>
+                </a:solidFill>
+              </a:rPr>
+              <a:t>Supports all major platforms</a:t>
+            </a:r>
+          </a:p>
+          <a:p>
+            <a:pPr marL="285750" lvl="1" indent="-285750">
+              <a:buFont typeface="Arial"/>
+              <a:buChar char="•"/>
+            </a:pPr>
+            <a:r>
+              <a:rPr lang="en-US" sz="1800" dirty="0">
+                <a:solidFill>
+                  <a:srgbClr val="FFFFFF"/>
+                </a:solidFill>
+              </a:rPr>
+              <a:t>Private cloud for control / security</a:t>
+            </a:r>
           </a:p>
           <a:p>
             <a:endParaRPr lang="en-US" sz="2200" dirty="0" smtClean="0">
@@ -11414,10 +10345,40 @@
           </a:p>
         </p:txBody>
       </p:sp>
+      <p:pic>
+        <p:nvPicPr>
+          <p:cNvPr id="4" name="Picture 3" descr="app-dist.png"/>
+          <p:cNvPicPr>
+            <a:picLocks noChangeAspect="1"/>
+          </p:cNvPicPr>
+          <p:nvPr/>
+        </p:nvPicPr>
+        <p:blipFill>
+          <a:blip r:embed="rId3">
+            <a:extLst>
+              <a:ext uri="{28A0092B-C50C-407E-A947-70E740481C1C}">
+                <a14:useLocalDpi xmlns:a14="http://schemas.microsoft.com/office/drawing/2010/main" val="0"/>
+              </a:ext>
+            </a:extLst>
+          </a:blip>
+          <a:stretch>
+            <a:fillRect/>
+          </a:stretch>
+        </p:blipFill>
+        <p:spPr>
+          <a:xfrm>
+            <a:off x="4761430" y="1197430"/>
+            <a:ext cx="4285649" cy="2764064"/>
+          </a:xfrm>
+          <a:prstGeom prst="rect">
+            <a:avLst/>
+          </a:prstGeom>
+        </p:spPr>
+      </p:pic>
     </p:spTree>
     <p:extLst>
       <p:ext uri="{BB962C8B-B14F-4D97-AF65-F5344CB8AC3E}">
-        <p14:creationId xmlns:p14="http://schemas.microsoft.com/office/powerpoint/2010/main" val="3694444729"/>
+        <p14:creationId xmlns:p14="http://schemas.microsoft.com/office/powerpoint/2010/main" val="336890159"/>
       </p:ext>
     </p:extLst>
   </p:cSld>
@@ -11432,6 +10393,46 @@
       <p:transition xmlns:p14="http://schemas.microsoft.com/office/powerpoint/2010/main" spd="slow"/>
     </mc:Fallback>
   </mc:AlternateContent>
+  <p:timing>
+    <p:tnLst>
+      <p:par>
+        <p:cTn xmlns:p14="http://schemas.microsoft.com/office/powerpoint/2010/main" id="1" dur="indefinite" restart="never" nodeType="tmRoot"/>
+      </p:par>
+    </p:tnLst>
+  </p:timing>
+</p:sld>
+</file>
+
+<file path=ppt/slides/slide18.xml><?xml version="1.0" encoding="utf-8"?>
+<p:sld xmlns:a="http://schemas.openxmlformats.org/drawingml/2006/main" xmlns:r="http://schemas.openxmlformats.org/officeDocument/2006/relationships" xmlns:p="http://schemas.openxmlformats.org/presentationml/2006/main">
+  <p:cSld>
+    <p:spTree>
+      <p:nvGrpSpPr>
+        <p:cNvPr id="1" name="Shape 286"/>
+        <p:cNvGrpSpPr/>
+        <p:nvPr/>
+      </p:nvGrpSpPr>
+      <p:grpSpPr>
+        <a:xfrm>
+          <a:off x="0" y="0"/>
+          <a:ext cx="0" cy="0"/>
+          <a:chOff x="0" y="0"/>
+          <a:chExt cx="0" cy="0"/>
+        </a:xfrm>
+      </p:grpSpPr>
+    </p:spTree>
+    <p:extLst>
+      <p:ext uri="{BB962C8B-B14F-4D97-AF65-F5344CB8AC3E}">
+        <p14:creationId xmlns:p14="http://schemas.microsoft.com/office/powerpoint/2010/main" val="2366141541"/>
+      </p:ext>
+    </p:extLst>
+  </p:cSld>
+  <p:clrMapOvr>
+    <a:masterClrMapping/>
+  </p:clrMapOvr>
+  <p:transition xmlns:p14="http://schemas.microsoft.com/office/powerpoint/2010/main" spd="slow">
+    <p:cut/>
+  </p:transition>
   <p:timing>
     <p:tnLst>
       <p:par>
@@ -14417,46 +13418,6 @@
 </p:sld>
 </file>
 
-<file path=ppt/slides/slide20.xml><?xml version="1.0" encoding="utf-8"?>
-<p:sld xmlns:a="http://schemas.openxmlformats.org/drawingml/2006/main" xmlns:r="http://schemas.openxmlformats.org/officeDocument/2006/relationships" xmlns:p="http://schemas.openxmlformats.org/presentationml/2006/main">
-  <p:cSld>
-    <p:spTree>
-      <p:nvGrpSpPr>
-        <p:cNvPr id="1" name="Shape 286"/>
-        <p:cNvGrpSpPr/>
-        <p:nvPr/>
-      </p:nvGrpSpPr>
-      <p:grpSpPr>
-        <a:xfrm>
-          <a:off x="0" y="0"/>
-          <a:ext cx="0" cy="0"/>
-          <a:chOff x="0" y="0"/>
-          <a:chExt cx="0" cy="0"/>
-        </a:xfrm>
-      </p:grpSpPr>
-    </p:spTree>
-    <p:extLst>
-      <p:ext uri="{BB962C8B-B14F-4D97-AF65-F5344CB8AC3E}">
-        <p14:creationId xmlns:p14="http://schemas.microsoft.com/office/powerpoint/2010/main" val="2366141541"/>
-      </p:ext>
-    </p:extLst>
-  </p:cSld>
-  <p:clrMapOvr>
-    <a:masterClrMapping/>
-  </p:clrMapOvr>
-  <p:transition xmlns:p14="http://schemas.microsoft.com/office/powerpoint/2010/main" spd="slow">
-    <p:cut/>
-  </p:transition>
-  <p:timing>
-    <p:tnLst>
-      <p:par>
-        <p:cTn xmlns:p14="http://schemas.microsoft.com/office/powerpoint/2010/main" id="1" dur="indefinite" restart="never" nodeType="tmRoot"/>
-      </p:par>
-    </p:tnLst>
-  </p:timing>
-</p:sld>
-</file>
-
 <file path=ppt/slides/slide3.xml><?xml version="1.0" encoding="utf-8"?>
 <p:sld xmlns:a="http://schemas.openxmlformats.org/drawingml/2006/main" xmlns:r="http://schemas.openxmlformats.org/officeDocument/2006/relationships" xmlns:p="http://schemas.openxmlformats.org/presentationml/2006/main">
   <p:cSld>
@@ -16690,13 +15651,6 @@
               </a:rPr>
               <a:t>App Dynamics</a:t>
             </a:r>
-            <a:endParaRPr lang="en-US" sz="1200" dirty="0" smtClean="0">
-              <a:solidFill>
-                <a:schemeClr val="bg2"/>
-              </a:solidFill>
-              <a:latin typeface="FreightSans Pro Medium"/>
-              <a:cs typeface="FreightSans Pro Medium"/>
-            </a:endParaRPr>
           </a:p>
         </p:txBody>
       </p:sp>

</xml_diff>